<commit_message>
Fixing mistake in topic 9 presentation
</commit_message>
<xml_diff>
--- a/Courses/Software-Sciences/Module-3-Databases-New/09-Complex-Joins-and-Subqueries/09-Complex-Joins-and-Subqueries.pptx
+++ b/Courses/Software-Sciences/Module-3-Databases-New/09-Complex-Joins-and-Subqueries/09-Complex-Joins-and-Subqueries.pptx
@@ -138,7 +138,7 @@
   </p:defaultTextStyle>
   <p:extLst>
     <p:ext uri="{521415D9-36F7-43E2-AB2F-B90AF26B5E84}">
-      <p14:sectionLst xmlns="" xmlns:p14="http://schemas.microsoft.com/office/powerpoint/2010/main">
+      <p14:sectionLst xmlns:p14="http://schemas.microsoft.com/office/powerpoint/2010/main" xmlns="">
         <p14:section name="Въведение" id="{A0C7653D-1924-4F56-9E27-AA2B21F1DA92}">
           <p14:sldIdLst>
             <p14:sldId id="503"/>
@@ -197,7 +197,7 @@
       </p14:sectionLst>
     </p:ext>
     <p:ext uri="{EFAFB233-063F-42B5-8137-9DF3F51BA10A}">
-      <p15:sldGuideLst xmlns="" xmlns:p15="http://schemas.microsoft.com/office/powerpoint/2012/main">
+      <p15:sldGuideLst xmlns:p15="http://schemas.microsoft.com/office/powerpoint/2012/main" xmlns="">
         <p15:guide id="1" orient="horz" pos="2184" userDrawn="1">
           <p15:clr>
             <a:srgbClr val="A4A3A4"/>
@@ -211,7 +211,7 @@
       </p15:sldGuideLst>
     </p:ext>
     <p:ext uri="{2D200454-40CA-4A62-9FC3-DE9A4176ACB9}">
-      <p15:notesGuideLst xmlns="" xmlns:p15="http://schemas.microsoft.com/office/powerpoint/2012/main"/>
+      <p15:notesGuideLst xmlns:p15="http://schemas.microsoft.com/office/powerpoint/2012/main" xmlns=""/>
     </p:ext>
   </p:extLst>
 </p:presentation>
@@ -244,7 +244,7 @@
           <p:cNvPr id="2" name="Header Placeholder 1">
             <a:extLst>
               <a:ext uri="{FF2B5EF4-FFF2-40B4-BE49-F238E27FC236}">
-                <a16:creationId xmlns="" xmlns:a16="http://schemas.microsoft.com/office/drawing/2014/main" id="{56F20103-83CC-4A54-8FDE-9D37FC2629C0}"/>
+                <a16:creationId xmlns:a16="http://schemas.microsoft.com/office/drawing/2014/main" xmlns="" id="{56F20103-83CC-4A54-8FDE-9D37FC2629C0}"/>
               </a:ext>
             </a:extLst>
           </p:cNvPr>
@@ -281,7 +281,7 @@
           <p:cNvPr id="3" name="Date Placeholder 2">
             <a:extLst>
               <a:ext uri="{FF2B5EF4-FFF2-40B4-BE49-F238E27FC236}">
-                <a16:creationId xmlns="" xmlns:a16="http://schemas.microsoft.com/office/drawing/2014/main" id="{27A53962-26EF-44E4-9E69-61B1727AB1C2}"/>
+                <a16:creationId xmlns:a16="http://schemas.microsoft.com/office/drawing/2014/main" xmlns="" id="{27A53962-26EF-44E4-9E69-61B1727AB1C2}"/>
               </a:ext>
             </a:extLst>
           </p:cNvPr>
@@ -312,7 +312,7 @@
             <a:fld id="{4E087215-0C8F-4762-A664-737A353EC9A4}" type="datetimeFigureOut">
               <a:rPr lang="bg-BG" smtClean="0"/>
               <a:pPr/>
-              <a:t>24.8.2023 г.</a:t>
+              <a:t>25.8.2023 г.</a:t>
             </a:fld>
             <a:endParaRPr lang="bg-BG" dirty="0"/>
           </a:p>
@@ -323,7 +323,7 @@
           <p:cNvPr id="4" name="Footer Placeholder 3">
             <a:extLst>
               <a:ext uri="{FF2B5EF4-FFF2-40B4-BE49-F238E27FC236}">
-                <a16:creationId xmlns="" xmlns:a16="http://schemas.microsoft.com/office/drawing/2014/main" id="{28A6967E-448F-4887-8FCB-34482EFBCC74}"/>
+                <a16:creationId xmlns:a16="http://schemas.microsoft.com/office/drawing/2014/main" xmlns="" id="{28A6967E-448F-4887-8FCB-34482EFBCC74}"/>
               </a:ext>
             </a:extLst>
           </p:cNvPr>
@@ -373,7 +373,7 @@
           <p:cNvPr id="5" name="Slide Number Placeholder 4">
             <a:extLst>
               <a:ext uri="{FF2B5EF4-FFF2-40B4-BE49-F238E27FC236}">
-                <a16:creationId xmlns="" xmlns:a16="http://schemas.microsoft.com/office/drawing/2014/main" id="{8B6554C2-DDBA-40E2-9536-53A07EC50274}"/>
+                <a16:creationId xmlns:a16="http://schemas.microsoft.com/office/drawing/2014/main" xmlns="" id="{8B6554C2-DDBA-40E2-9536-53A07EC50274}"/>
               </a:ext>
             </a:extLst>
           </p:cNvPr>
@@ -413,7 +413,7 @@
     </p:spTree>
     <p:extLst>
       <p:ext uri="{BB962C8B-B14F-4D97-AF65-F5344CB8AC3E}">
-        <p14:creationId xmlns="" xmlns:p14="http://schemas.microsoft.com/office/powerpoint/2010/main" val="4150602968"/>
+        <p14:creationId xmlns:p14="http://schemas.microsoft.com/office/powerpoint/2010/main" xmlns="" val="4150602968"/>
       </p:ext>
     </p:extLst>
   </p:cSld>
@@ -505,7 +505,7 @@
             <a:fld id="{72D84649-876A-46C9-8472-14CB09C070D8}" type="datetimeFigureOut">
               <a:rPr lang="en-US" smtClean="0"/>
               <a:pPr/>
-              <a:t>8/24/2023</a:t>
+              <a:t>8/25/2023</a:t>
             </a:fld>
             <a:endParaRPr lang="en-US" dirty="0"/>
           </a:p>
@@ -644,7 +644,7 @@
           <p:cNvPr id="8" name="Footer Placeholder 7">
             <a:extLst>
               <a:ext uri="{FF2B5EF4-FFF2-40B4-BE49-F238E27FC236}">
-                <a16:creationId xmlns="" xmlns:a16="http://schemas.microsoft.com/office/drawing/2014/main" id="{CAC3A49B-3196-44DF-AC28-085C72EFBFF0}"/>
+                <a16:creationId xmlns:a16="http://schemas.microsoft.com/office/drawing/2014/main" xmlns="" id="{CAC3A49B-3196-44DF-AC28-085C72EFBFF0}"/>
               </a:ext>
             </a:extLst>
           </p:cNvPr>
@@ -692,7 +692,7 @@
     </p:spTree>
     <p:extLst>
       <p:ext uri="{BB962C8B-B14F-4D97-AF65-F5344CB8AC3E}">
-        <p14:creationId xmlns="" xmlns:p14="http://schemas.microsoft.com/office/powerpoint/2010/main" val="1530847692"/>
+        <p14:creationId xmlns:p14="http://schemas.microsoft.com/office/powerpoint/2010/main" xmlns="" val="1530847692"/>
       </p:ext>
     </p:extLst>
   </p:cSld>
@@ -839,7 +839,7 @@
           <p:cNvPr id="8" name="Slide Image Placeholder 7">
             <a:extLst>
               <a:ext uri="{FF2B5EF4-FFF2-40B4-BE49-F238E27FC236}">
-                <a16:creationId xmlns="" xmlns:a16="http://schemas.microsoft.com/office/drawing/2014/main" id="{78811095-27E9-49AB-972B-D4E20B3963A6}"/>
+                <a16:creationId xmlns:a16="http://schemas.microsoft.com/office/drawing/2014/main" xmlns="" id="{78811095-27E9-49AB-972B-D4E20B3963A6}"/>
               </a:ext>
             </a:extLst>
           </p:cNvPr>
@@ -857,7 +857,7 @@
           <p:cNvPr id="9" name="Notes Placeholder 8">
             <a:extLst>
               <a:ext uri="{FF2B5EF4-FFF2-40B4-BE49-F238E27FC236}">
-                <a16:creationId xmlns="" xmlns:a16="http://schemas.microsoft.com/office/drawing/2014/main" id="{E923224B-0CC3-475A-8628-8A90751AE61A}"/>
+                <a16:creationId xmlns:a16="http://schemas.microsoft.com/office/drawing/2014/main" xmlns="" id="{E923224B-0CC3-475A-8628-8A90751AE61A}"/>
               </a:ext>
             </a:extLst>
           </p:cNvPr>
@@ -882,7 +882,7 @@
           <p:cNvPr id="2" name="Footer Placeholder 1">
             <a:extLst>
               <a:ext uri="{FF2B5EF4-FFF2-40B4-BE49-F238E27FC236}">
-                <a16:creationId xmlns="" xmlns:a16="http://schemas.microsoft.com/office/drawing/2014/main" id="{3288A3F3-90B1-4930-8D00-5603BDABEF10}"/>
+                <a16:creationId xmlns:a16="http://schemas.microsoft.com/office/drawing/2014/main" xmlns="" id="{3288A3F3-90B1-4930-8D00-5603BDABEF10}"/>
               </a:ext>
             </a:extLst>
           </p:cNvPr>
@@ -918,7 +918,7 @@
     </p:spTree>
     <p:extLst>
       <p:ext uri="{BB962C8B-B14F-4D97-AF65-F5344CB8AC3E}">
-        <p14:creationId xmlns="" xmlns:p14="http://schemas.microsoft.com/office/powerpoint/2010/main" val="2594489433"/>
+        <p14:creationId xmlns:p14="http://schemas.microsoft.com/office/powerpoint/2010/main" xmlns="" val="2594489433"/>
       </p:ext>
     </p:extLst>
   </p:cSld>
@@ -1211,7 +1211,7 @@
           <p:cNvPr id="7" name="Slide Number Placeholder 5">
             <a:extLst>
               <a:ext uri="{FF2B5EF4-FFF2-40B4-BE49-F238E27FC236}">
-                <a16:creationId xmlns="" xmlns:a16="http://schemas.microsoft.com/office/drawing/2014/main" id="{E65F1CA9-65DC-416B-8882-B3A5E415CE67}"/>
+                <a16:creationId xmlns:a16="http://schemas.microsoft.com/office/drawing/2014/main" xmlns="" id="{E65F1CA9-65DC-416B-8882-B3A5E415CE67}"/>
               </a:ext>
             </a:extLst>
           </p:cNvPr>
@@ -1341,7 +1341,7 @@
           <p:cNvPr id="4" name="Footer Placeholder 3">
             <a:extLst>
               <a:ext uri="{FF2B5EF4-FFF2-40B4-BE49-F238E27FC236}">
-                <a16:creationId xmlns="" xmlns:a16="http://schemas.microsoft.com/office/drawing/2014/main" id="{C5BD11C3-9FCD-4EAE-876D-E766924FAFF2}"/>
+                <a16:creationId xmlns:a16="http://schemas.microsoft.com/office/drawing/2014/main" xmlns="" id="{C5BD11C3-9FCD-4EAE-876D-E766924FAFF2}"/>
               </a:ext>
             </a:extLst>
           </p:cNvPr>
@@ -1377,7 +1377,7 @@
     </p:spTree>
     <p:extLst>
       <p:ext uri="{BB962C8B-B14F-4D97-AF65-F5344CB8AC3E}">
-        <p14:creationId xmlns="" xmlns:p14="http://schemas.microsoft.com/office/powerpoint/2010/main" val="1860974293"/>
+        <p14:creationId xmlns:p14="http://schemas.microsoft.com/office/powerpoint/2010/main" xmlns="" val="1860974293"/>
       </p:ext>
     </p:extLst>
   </p:cSld>
@@ -1462,7 +1462,7 @@
     </p:spTree>
     <p:extLst>
       <p:ext uri="{BB962C8B-B14F-4D97-AF65-F5344CB8AC3E}">
-        <p14:creationId xmlns="" xmlns:p14="http://schemas.microsoft.com/office/powerpoint/2010/main" val="1201445929"/>
+        <p14:creationId xmlns:p14="http://schemas.microsoft.com/office/powerpoint/2010/main" xmlns="" val="1201445929"/>
       </p:ext>
     </p:extLst>
   </p:cSld>
@@ -1525,7 +1525,7 @@
           <p:cNvPr id="6" name="Slide Number Placeholder 5">
             <a:extLst>
               <a:ext uri="{FF2B5EF4-FFF2-40B4-BE49-F238E27FC236}">
-                <a16:creationId xmlns="" xmlns:a16="http://schemas.microsoft.com/office/drawing/2014/main" id="{6627548A-4D3C-449B-81A5-FA4BE4628490}"/>
+                <a16:creationId xmlns:a16="http://schemas.microsoft.com/office/drawing/2014/main" xmlns="" id="{6627548A-4D3C-449B-81A5-FA4BE4628490}"/>
               </a:ext>
             </a:extLst>
           </p:cNvPr>
@@ -1655,7 +1655,7 @@
           <p:cNvPr id="4" name="Footer Placeholder 3">
             <a:extLst>
               <a:ext uri="{FF2B5EF4-FFF2-40B4-BE49-F238E27FC236}">
-                <a16:creationId xmlns="" xmlns:a16="http://schemas.microsoft.com/office/drawing/2014/main" id="{D2472CE7-61C1-4B7B-B0C8-5A45F0178717}"/>
+                <a16:creationId xmlns:a16="http://schemas.microsoft.com/office/drawing/2014/main" xmlns="" id="{D2472CE7-61C1-4B7B-B0C8-5A45F0178717}"/>
               </a:ext>
             </a:extLst>
           </p:cNvPr>
@@ -1691,7 +1691,7 @@
     </p:spTree>
     <p:extLst>
       <p:ext uri="{BB962C8B-B14F-4D97-AF65-F5344CB8AC3E}">
-        <p14:creationId xmlns="" xmlns:p14="http://schemas.microsoft.com/office/powerpoint/2010/main" val="729041308"/>
+        <p14:creationId xmlns:p14="http://schemas.microsoft.com/office/powerpoint/2010/main" xmlns="" val="729041308"/>
       </p:ext>
     </p:extLst>
   </p:cSld>
@@ -1723,7 +1723,7 @@
           <p:cNvPr id="14" name="Slide Image Placeholder 13">
             <a:extLst>
               <a:ext uri="{FF2B5EF4-FFF2-40B4-BE49-F238E27FC236}">
-                <a16:creationId xmlns="" xmlns:a16="http://schemas.microsoft.com/office/drawing/2014/main" id="{A1F0B3C6-2E53-4CA3-86D1-53D46EC35267}"/>
+                <a16:creationId xmlns:a16="http://schemas.microsoft.com/office/drawing/2014/main" xmlns="" id="{A1F0B3C6-2E53-4CA3-86D1-53D46EC35267}"/>
               </a:ext>
             </a:extLst>
           </p:cNvPr>
@@ -1741,7 +1741,7 @@
           <p:cNvPr id="15" name="Notes Placeholder 14">
             <a:extLst>
               <a:ext uri="{FF2B5EF4-FFF2-40B4-BE49-F238E27FC236}">
-                <a16:creationId xmlns="" xmlns:a16="http://schemas.microsoft.com/office/drawing/2014/main" id="{149CC699-A079-49A5-A4D6-73B7F849A7DC}"/>
+                <a16:creationId xmlns:a16="http://schemas.microsoft.com/office/drawing/2014/main" xmlns="" id="{149CC699-A079-49A5-A4D6-73B7F849A7DC}"/>
               </a:ext>
             </a:extLst>
           </p:cNvPr>
@@ -1766,7 +1766,7 @@
           <p:cNvPr id="19" name="Slide Number Placeholder 5">
             <a:extLst>
               <a:ext uri="{FF2B5EF4-FFF2-40B4-BE49-F238E27FC236}">
-                <a16:creationId xmlns="" xmlns:a16="http://schemas.microsoft.com/office/drawing/2014/main" id="{121F4233-7E9A-40D2-9066-2DB14E2FA5AD}"/>
+                <a16:creationId xmlns:a16="http://schemas.microsoft.com/office/drawing/2014/main" xmlns="" id="{121F4233-7E9A-40D2-9066-2DB14E2FA5AD}"/>
               </a:ext>
             </a:extLst>
           </p:cNvPr>
@@ -1896,7 +1896,7 @@
           <p:cNvPr id="2" name="Footer Placeholder 1">
             <a:extLst>
               <a:ext uri="{FF2B5EF4-FFF2-40B4-BE49-F238E27FC236}">
-                <a16:creationId xmlns="" xmlns:a16="http://schemas.microsoft.com/office/drawing/2014/main" id="{D18F1DFF-B3E7-4ABF-97EE-0BBF3A961EC5}"/>
+                <a16:creationId xmlns:a16="http://schemas.microsoft.com/office/drawing/2014/main" xmlns="" id="{D18F1DFF-B3E7-4ABF-97EE-0BBF3A961EC5}"/>
               </a:ext>
             </a:extLst>
           </p:cNvPr>
@@ -1932,7 +1932,7 @@
     </p:spTree>
     <p:extLst>
       <p:ext uri="{BB962C8B-B14F-4D97-AF65-F5344CB8AC3E}">
-        <p14:creationId xmlns="" xmlns:p14="http://schemas.microsoft.com/office/powerpoint/2010/main" val="4028530743"/>
+        <p14:creationId xmlns:p14="http://schemas.microsoft.com/office/powerpoint/2010/main" xmlns="" val="4028530743"/>
       </p:ext>
     </p:extLst>
   </p:cSld>
@@ -2032,7 +2032,7 @@
           <p:cNvPr id="7" name="Footer Placeholder 7">
             <a:extLst>
               <a:ext uri="{FF2B5EF4-FFF2-40B4-BE49-F238E27FC236}">
-                <a16:creationId xmlns:a16="http://schemas.microsoft.com/office/drawing/2014/main" xmlns="" id="{56AA1182-9AB1-4D3A-8BB9-912E8B62BF2A}"/>
+                <a16:creationId xmlns="" xmlns:a16="http://schemas.microsoft.com/office/drawing/2014/main" id="{56AA1182-9AB1-4D3A-8BB9-912E8B62BF2A}"/>
               </a:ext>
             </a:extLst>
           </p:cNvPr>
@@ -2080,7 +2080,7 @@
     </p:spTree>
     <p:extLst>
       <p:ext uri="{BB962C8B-B14F-4D97-AF65-F5344CB8AC3E}">
-        <p14:creationId xmlns:p14="http://schemas.microsoft.com/office/powerpoint/2010/main" xmlns="" val="1373093975"/>
+        <p14:creationId xmlns="" xmlns:p14="http://schemas.microsoft.com/office/powerpoint/2010/main" val="1373093975"/>
       </p:ext>
     </p:extLst>
   </p:cSld>
@@ -2192,7 +2192,7 @@
           <p:cNvPr id="7" name="Footer Placeholder 7">
             <a:extLst>
               <a:ext uri="{FF2B5EF4-FFF2-40B4-BE49-F238E27FC236}">
-                <a16:creationId xmlns:a16="http://schemas.microsoft.com/office/drawing/2014/main" xmlns="" id="{769F3C2A-6839-40CC-ABF3-ADC3B2083BEC}"/>
+                <a16:creationId xmlns="" xmlns:a16="http://schemas.microsoft.com/office/drawing/2014/main" id="{769F3C2A-6839-40CC-ABF3-ADC3B2083BEC}"/>
               </a:ext>
             </a:extLst>
           </p:cNvPr>
@@ -2240,7 +2240,7 @@
     </p:spTree>
     <p:extLst>
       <p:ext uri="{BB962C8B-B14F-4D97-AF65-F5344CB8AC3E}">
-        <p14:creationId xmlns:p14="http://schemas.microsoft.com/office/powerpoint/2010/main" xmlns="" val="1589677150"/>
+        <p14:creationId xmlns="" xmlns:p14="http://schemas.microsoft.com/office/powerpoint/2010/main" val="1589677150"/>
       </p:ext>
     </p:extLst>
   </p:cSld>
@@ -2327,7 +2327,7 @@
           <p:cNvPr id="7" name="Footer Placeholder 7">
             <a:extLst>
               <a:ext uri="{FF2B5EF4-FFF2-40B4-BE49-F238E27FC236}">
-                <a16:creationId xmlns:a16="http://schemas.microsoft.com/office/drawing/2014/main" xmlns="" id="{67562BF2-0015-4011-80FF-0857D12BC27F}"/>
+                <a16:creationId xmlns="" xmlns:a16="http://schemas.microsoft.com/office/drawing/2014/main" id="{67562BF2-0015-4011-80FF-0857D12BC27F}"/>
               </a:ext>
             </a:extLst>
           </p:cNvPr>
@@ -2375,7 +2375,7 @@
     </p:spTree>
     <p:extLst>
       <p:ext uri="{BB962C8B-B14F-4D97-AF65-F5344CB8AC3E}">
-        <p14:creationId xmlns:p14="http://schemas.microsoft.com/office/powerpoint/2010/main" xmlns="" val="452608540"/>
+        <p14:creationId xmlns="" xmlns:p14="http://schemas.microsoft.com/office/powerpoint/2010/main" val="452608540"/>
       </p:ext>
     </p:extLst>
   </p:cSld>
@@ -2522,7 +2522,7 @@
           <p:cNvPr id="9" name="Footer Placeholder 7">
             <a:extLst>
               <a:ext uri="{FF2B5EF4-FFF2-40B4-BE49-F238E27FC236}">
-                <a16:creationId xmlns:a16="http://schemas.microsoft.com/office/drawing/2014/main" xmlns="" id="{0C9B08B0-F280-4682-AEAC-8DECAB371F64}"/>
+                <a16:creationId xmlns="" xmlns:a16="http://schemas.microsoft.com/office/drawing/2014/main" id="{0C9B08B0-F280-4682-AEAC-8DECAB371F64}"/>
               </a:ext>
             </a:extLst>
           </p:cNvPr>
@@ -2570,7 +2570,7 @@
     </p:spTree>
     <p:extLst>
       <p:ext uri="{BB962C8B-B14F-4D97-AF65-F5344CB8AC3E}">
-        <p14:creationId xmlns:p14="http://schemas.microsoft.com/office/powerpoint/2010/main" xmlns="" val="664285175"/>
+        <p14:creationId xmlns="" xmlns:p14="http://schemas.microsoft.com/office/powerpoint/2010/main" val="664285175"/>
       </p:ext>
     </p:extLst>
   </p:cSld>
@@ -2657,7 +2657,7 @@
           <p:cNvPr id="7" name="Footer Placeholder 7">
             <a:extLst>
               <a:ext uri="{FF2B5EF4-FFF2-40B4-BE49-F238E27FC236}">
-                <a16:creationId xmlns:a16="http://schemas.microsoft.com/office/drawing/2014/main" xmlns="" id="{A628E2D1-3510-4A58-9627-5EDC8B1E2217}"/>
+                <a16:creationId xmlns="" xmlns:a16="http://schemas.microsoft.com/office/drawing/2014/main" id="{A628E2D1-3510-4A58-9627-5EDC8B1E2217}"/>
               </a:ext>
             </a:extLst>
           </p:cNvPr>
@@ -2705,7 +2705,7 @@
     </p:spTree>
     <p:extLst>
       <p:ext uri="{BB962C8B-B14F-4D97-AF65-F5344CB8AC3E}">
-        <p14:creationId xmlns:p14="http://schemas.microsoft.com/office/powerpoint/2010/main" xmlns="" val="3851196914"/>
+        <p14:creationId xmlns="" xmlns:p14="http://schemas.microsoft.com/office/powerpoint/2010/main" val="3851196914"/>
       </p:ext>
     </p:extLst>
   </p:cSld>
@@ -2967,7 +2967,7 @@
           <p:cNvPr id="16" name="Rectangle Bottom">
             <a:extLst>
               <a:ext uri="{FF2B5EF4-FFF2-40B4-BE49-F238E27FC236}">
-                <a16:creationId xmlns="" xmlns:a16="http://schemas.microsoft.com/office/drawing/2014/main" id="{6854D183-0374-4B3E-B2CE-32F308A81591}"/>
+                <a16:creationId xmlns:a16="http://schemas.microsoft.com/office/drawing/2014/main" xmlns="" id="{6854D183-0374-4B3E-B2CE-32F308A81591}"/>
               </a:ext>
             </a:extLst>
           </p:cNvPr>
@@ -3048,7 +3048,7 @@
           <p:cNvPr id="14" name="Picture Logo SoftUni" descr="SoftUni logo">
             <a:extLst>
               <a:ext uri="{FF2B5EF4-FFF2-40B4-BE49-F238E27FC236}">
-                <a16:creationId xmlns="" xmlns:a16="http://schemas.microsoft.com/office/drawing/2014/main" id="{C4D6B2A2-DFF0-4712-BFEC-6676BEC99FEC}"/>
+                <a16:creationId xmlns:a16="http://schemas.microsoft.com/office/drawing/2014/main" xmlns="" id="{C4D6B2A2-DFF0-4712-BFEC-6676BEC99FEC}"/>
               </a:ext>
             </a:extLst>
           </p:cNvPr>
@@ -3071,7 +3071,7 @@
             </a:clrChange>
             <a:extLst>
               <a:ext uri="{28A0092B-C50C-407E-A947-70E740481C1C}">
-                <a14:useLocalDpi xmlns="" xmlns:a14="http://schemas.microsoft.com/office/drawing/2010/main" val="0"/>
+                <a14:useLocalDpi xmlns:a14="http://schemas.microsoft.com/office/drawing/2010/main" xmlns="" val="0"/>
               </a:ext>
             </a:extLst>
           </a:blip>
@@ -3094,7 +3094,7 @@
           <p:cNvPr id="31" name="Text Placeholder Company Site">
             <a:extLst>
               <a:ext uri="{FF2B5EF4-FFF2-40B4-BE49-F238E27FC236}">
-                <a16:creationId xmlns="" xmlns:a16="http://schemas.microsoft.com/office/drawing/2014/main" id="{3E6B87B7-9D33-4EBB-BD4F-C0436BA3FD72}"/>
+                <a16:creationId xmlns:a16="http://schemas.microsoft.com/office/drawing/2014/main" xmlns="" id="{3E6B87B7-9D33-4EBB-BD4F-C0436BA3FD72}"/>
               </a:ext>
             </a:extLst>
           </p:cNvPr>
@@ -3156,7 +3156,7 @@
           <p:cNvPr id="30" name="Text Placeholder Company Name">
             <a:extLst>
               <a:ext uri="{FF2B5EF4-FFF2-40B4-BE49-F238E27FC236}">
-                <a16:creationId xmlns="" xmlns:a16="http://schemas.microsoft.com/office/drawing/2014/main" id="{2EA92DCA-4DB5-4D03-ACD3-A6A296592D0C}"/>
+                <a16:creationId xmlns:a16="http://schemas.microsoft.com/office/drawing/2014/main" xmlns="" id="{2EA92DCA-4DB5-4D03-ACD3-A6A296592D0C}"/>
               </a:ext>
             </a:extLst>
           </p:cNvPr>
@@ -3218,7 +3218,7 @@
           <p:cNvPr id="35" name="Picture SoftUni Mascot" descr="SoftUni mascot">
             <a:extLst>
               <a:ext uri="{FF2B5EF4-FFF2-40B4-BE49-F238E27FC236}">
-                <a16:creationId xmlns="" xmlns:a16="http://schemas.microsoft.com/office/drawing/2014/main" id="{951E7DA9-C5F0-43D9-B013-3BDF9EEF029D}"/>
+                <a16:creationId xmlns:a16="http://schemas.microsoft.com/office/drawing/2014/main" xmlns="" id="{951E7DA9-C5F0-43D9-B013-3BDF9EEF029D}"/>
               </a:ext>
             </a:extLst>
           </p:cNvPr>
@@ -3231,7 +3231,7 @@
           <a:blip r:embed="rId3" cstate="print">
             <a:extLst>
               <a:ext uri="{28A0092B-C50C-407E-A947-70E740481C1C}">
-                <a14:useLocalDpi xmlns="" xmlns:a14="http://schemas.microsoft.com/office/drawing/2010/main" val="0"/>
+                <a14:useLocalDpi xmlns:a14="http://schemas.microsoft.com/office/drawing/2010/main" xmlns="" val="0"/>
               </a:ext>
             </a:extLst>
           </a:blip>
@@ -3254,7 +3254,7 @@
             <a:hlinkClick r:id="rId4"/>
             <a:extLst>
               <a:ext uri="{FF2B5EF4-FFF2-40B4-BE49-F238E27FC236}">
-                <a16:creationId xmlns="" xmlns:a16="http://schemas.microsoft.com/office/drawing/2014/main" id="{F2315EB3-3FE4-4D3B-921E-5F209CEC13CB}"/>
+                <a16:creationId xmlns:a16="http://schemas.microsoft.com/office/drawing/2014/main" xmlns="" id="{F2315EB3-3FE4-4D3B-921E-5F209CEC13CB}"/>
               </a:ext>
             </a:extLst>
           </p:cNvPr>
@@ -3277,7 +3277,7 @@
             </a:clrChange>
             <a:extLst>
               <a:ext uri="{28A0092B-C50C-407E-A947-70E740481C1C}">
-                <a14:useLocalDpi xmlns="" xmlns:a14="http://schemas.microsoft.com/office/drawing/2010/main" val="0"/>
+                <a14:useLocalDpi xmlns:a14="http://schemas.microsoft.com/office/drawing/2010/main" xmlns="" val="0"/>
               </a:ext>
             </a:extLst>
           </a:blip>
@@ -3300,7 +3300,7 @@
           <p:cNvPr id="40" name="Text Placeholder Author Position">
             <a:extLst>
               <a:ext uri="{FF2B5EF4-FFF2-40B4-BE49-F238E27FC236}">
-                <a16:creationId xmlns="" xmlns:a16="http://schemas.microsoft.com/office/drawing/2014/main" id="{CD940256-851E-46C8-8BFB-A5ECA6C7DA07}"/>
+                <a16:creationId xmlns:a16="http://schemas.microsoft.com/office/drawing/2014/main" xmlns="" id="{CD940256-851E-46C8-8BFB-A5ECA6C7DA07}"/>
               </a:ext>
             </a:extLst>
           </p:cNvPr>
@@ -3360,7 +3360,7 @@
           <p:cNvPr id="36" name="Text Placeholder Author Name">
             <a:extLst>
               <a:ext uri="{FF2B5EF4-FFF2-40B4-BE49-F238E27FC236}">
-                <a16:creationId xmlns="" xmlns:a16="http://schemas.microsoft.com/office/drawing/2014/main" id="{3B21F47B-DE1F-442D-A2B7-6866F8786704}"/>
+                <a16:creationId xmlns:a16="http://schemas.microsoft.com/office/drawing/2014/main" xmlns="" id="{3B21F47B-DE1F-442D-A2B7-6866F8786704}"/>
               </a:ext>
             </a:extLst>
           </p:cNvPr>
@@ -3420,7 +3420,7 @@
           <p:cNvPr id="33" name="Picture Placeholder Title Image">
             <a:extLst>
               <a:ext uri="{FF2B5EF4-FFF2-40B4-BE49-F238E27FC236}">
-                <a16:creationId xmlns="" xmlns:a16="http://schemas.microsoft.com/office/drawing/2014/main" id="{A04D819A-89E2-4714-8C56-1838BF467EF7}"/>
+                <a16:creationId xmlns:a16="http://schemas.microsoft.com/office/drawing/2014/main" xmlns="" id="{A04D819A-89E2-4714-8C56-1838BF467EF7}"/>
               </a:ext>
             </a:extLst>
           </p:cNvPr>
@@ -3462,7 +3462,7 @@
           <p:cNvPr id="43" name="Presentation Subtitle">
             <a:extLst>
               <a:ext uri="{FF2B5EF4-FFF2-40B4-BE49-F238E27FC236}">
-                <a16:creationId xmlns="" xmlns:a16="http://schemas.microsoft.com/office/drawing/2014/main" id="{37BDB812-1395-4B02-ABCF-6A331EEE23E5}"/>
+                <a16:creationId xmlns:a16="http://schemas.microsoft.com/office/drawing/2014/main" xmlns="" id="{37BDB812-1395-4B02-ABCF-6A331EEE23E5}"/>
               </a:ext>
             </a:extLst>
           </p:cNvPr>
@@ -3506,7 +3506,7 @@
           <p:cNvPr id="2" name="Presentation Title">
             <a:extLst>
               <a:ext uri="{FF2B5EF4-FFF2-40B4-BE49-F238E27FC236}">
-                <a16:creationId xmlns="" xmlns:a16="http://schemas.microsoft.com/office/drawing/2014/main" id="{A4DF3AB8-E6E3-4FCE-8A4A-ECD147720A5D}"/>
+                <a16:creationId xmlns:a16="http://schemas.microsoft.com/office/drawing/2014/main" xmlns="" id="{A4DF3AB8-E6E3-4FCE-8A4A-ECD147720A5D}"/>
               </a:ext>
             </a:extLst>
           </p:cNvPr>
@@ -3541,7 +3541,7 @@
     </p:spTree>
     <p:extLst>
       <p:ext uri="{BB962C8B-B14F-4D97-AF65-F5344CB8AC3E}">
-        <p14:creationId xmlns="" xmlns:p14="http://schemas.microsoft.com/office/powerpoint/2010/main" val="970179299"/>
+        <p14:creationId xmlns:p14="http://schemas.microsoft.com/office/powerpoint/2010/main" xmlns="" val="970179299"/>
       </p:ext>
     </p:extLst>
   </p:cSld>
@@ -3549,7 +3549,7 @@
     <a:masterClrMapping/>
   </p:clrMapOvr>
   <mc:AlternateContent xmlns:mc="http://schemas.openxmlformats.org/markup-compatibility/2006">
-    <mc:Choice xmlns="" xmlns:p14="http://schemas.microsoft.com/office/powerpoint/2010/main" Requires="p14">
+    <mc:Choice xmlns:p14="http://schemas.microsoft.com/office/powerpoint/2010/main" xmlns="" Requires="p14">
       <p:transition spd="slow" p14:dur="2000" advClick="0" advTm="5000"/>
     </mc:Choice>
     <mc:Fallback>
@@ -3558,7 +3558,7 @@
   </mc:AlternateContent>
   <p:extLst>
     <p:ext uri="{DCECCB84-F9BA-43D5-87BE-67443E8EF086}">
-      <p15:sldGuideLst xmlns="" xmlns:p15="http://schemas.microsoft.com/office/powerpoint/2012/main">
+      <p15:sldGuideLst xmlns:p15="http://schemas.microsoft.com/office/powerpoint/2012/main" xmlns="">
         <p15:guide id="1" orient="horz" pos="2160">
           <p15:clr>
             <a:srgbClr val="FBAE40"/>
@@ -3597,7 +3597,7 @@
           <p:cNvPr id="15" name="Slide Number">
             <a:extLst>
               <a:ext uri="{FF2B5EF4-FFF2-40B4-BE49-F238E27FC236}">
-                <a16:creationId xmlns="" xmlns:a16="http://schemas.microsoft.com/office/drawing/2014/main" id="{F888EE71-82B3-40F1-A63F-7417422FB4A4}"/>
+                <a16:creationId xmlns:a16="http://schemas.microsoft.com/office/drawing/2014/main" xmlns="" id="{F888EE71-82B3-40F1-A63F-7417422FB4A4}"/>
               </a:ext>
             </a:extLst>
           </p:cNvPr>
@@ -3639,7 +3639,7 @@
           <p:cNvPr id="14" name="Text Placeholder Body">
             <a:extLst>
               <a:ext uri="{FF2B5EF4-FFF2-40B4-BE49-F238E27FC236}">
-                <a16:creationId xmlns="" xmlns:a16="http://schemas.microsoft.com/office/drawing/2014/main" id="{A2ABE920-240F-4CF6-AD45-23ED489FAD6E}"/>
+                <a16:creationId xmlns:a16="http://schemas.microsoft.com/office/drawing/2014/main" xmlns="" id="{A2ABE920-240F-4CF6-AD45-23ED489FAD6E}"/>
               </a:ext>
             </a:extLst>
           </p:cNvPr>
@@ -3945,7 +3945,7 @@
           <p:cNvPr id="10" name="Rectangle Down">
             <a:extLst>
               <a:ext uri="{FF2B5EF4-FFF2-40B4-BE49-F238E27FC236}">
-                <a16:creationId xmlns="" xmlns:a16="http://schemas.microsoft.com/office/drawing/2014/main" id="{E9B994EC-35A8-4A11-98CB-25DC28852F94}"/>
+                <a16:creationId xmlns:a16="http://schemas.microsoft.com/office/drawing/2014/main" xmlns="" id="{E9B994EC-35A8-4A11-98CB-25DC28852F94}"/>
               </a:ext>
             </a:extLst>
           </p:cNvPr>
@@ -4026,7 +4026,7 @@
           <p:cNvPr id="11" name="Rectangle Top">
             <a:extLst>
               <a:ext uri="{FF2B5EF4-FFF2-40B4-BE49-F238E27FC236}">
-                <a16:creationId xmlns="" xmlns:a16="http://schemas.microsoft.com/office/drawing/2014/main" id="{274B8F05-DFCE-47BD-BAFD-DF93E1A63BDD}"/>
+                <a16:creationId xmlns:a16="http://schemas.microsoft.com/office/drawing/2014/main" xmlns="" id="{274B8F05-DFCE-47BD-BAFD-DF93E1A63BDD}"/>
               </a:ext>
             </a:extLst>
           </p:cNvPr>
@@ -4107,7 +4107,7 @@
           <p:cNvPr id="12" name="Logo Software University" descr="Software University logo">
             <a:extLst>
               <a:ext uri="{FF2B5EF4-FFF2-40B4-BE49-F238E27FC236}">
-                <a16:creationId xmlns="" xmlns:a16="http://schemas.microsoft.com/office/drawing/2014/main" id="{233CBB95-791E-4630-B3D9-FADFCE7BCF52}"/>
+                <a16:creationId xmlns:a16="http://schemas.microsoft.com/office/drawing/2014/main" xmlns="" id="{233CBB95-791E-4630-B3D9-FADFCE7BCF52}"/>
               </a:ext>
             </a:extLst>
           </p:cNvPr>
@@ -4120,7 +4120,7 @@
           <a:blip r:embed="rId2" cstate="print">
             <a:extLst>
               <a:ext uri="{28A0092B-C50C-407E-A947-70E740481C1C}">
-                <a14:useLocalDpi xmlns="" xmlns:a14="http://schemas.microsoft.com/office/drawing/2010/main" val="0"/>
+                <a14:useLocalDpi xmlns:a14="http://schemas.microsoft.com/office/drawing/2010/main" xmlns="" val="0"/>
               </a:ext>
             </a:extLst>
           </a:blip>
@@ -4143,7 +4143,7 @@
           <p:cNvPr id="13" name="Slide Title">
             <a:extLst>
               <a:ext uri="{FF2B5EF4-FFF2-40B4-BE49-F238E27FC236}">
-                <a16:creationId xmlns="" xmlns:a16="http://schemas.microsoft.com/office/drawing/2014/main" id="{3F218E34-55D7-4290-BFE4-80F31F941551}"/>
+                <a16:creationId xmlns:a16="http://schemas.microsoft.com/office/drawing/2014/main" xmlns="" id="{3F218E34-55D7-4290-BFE4-80F31F941551}"/>
               </a:ext>
             </a:extLst>
           </p:cNvPr>
@@ -4182,7 +4182,7 @@
     </p:spTree>
     <p:extLst>
       <p:ext uri="{BB962C8B-B14F-4D97-AF65-F5344CB8AC3E}">
-        <p14:creationId xmlns="" xmlns:p14="http://schemas.microsoft.com/office/powerpoint/2010/main" val="3774019400"/>
+        <p14:creationId xmlns:p14="http://schemas.microsoft.com/office/powerpoint/2010/main" xmlns="" val="3774019400"/>
       </p:ext>
     </p:extLst>
   </p:cSld>
@@ -4190,7 +4190,7 @@
     <a:masterClrMapping/>
   </p:clrMapOvr>
   <mc:AlternateContent xmlns:mc="http://schemas.openxmlformats.org/markup-compatibility/2006">
-    <mc:Choice xmlns="" xmlns:p14="http://schemas.microsoft.com/office/powerpoint/2010/main" Requires="p14">
+    <mc:Choice xmlns:p14="http://schemas.microsoft.com/office/powerpoint/2010/main" xmlns="" Requires="p14">
       <p:transition spd="slow" p14:dur="2000" advClick="0" advTm="5000"/>
     </mc:Choice>
     <mc:Fallback>
@@ -4230,7 +4230,7 @@
           <p:cNvPr id="35" name="Rectangle Bottom">
             <a:extLst>
               <a:ext uri="{FF2B5EF4-FFF2-40B4-BE49-F238E27FC236}">
-                <a16:creationId xmlns="" xmlns:a16="http://schemas.microsoft.com/office/drawing/2014/main" id="{550A59F9-9A9D-4956-95B4-F78CC0DB1D59}"/>
+                <a16:creationId xmlns:a16="http://schemas.microsoft.com/office/drawing/2014/main" xmlns="" id="{550A59F9-9A9D-4956-95B4-F78CC0DB1D59}"/>
               </a:ext>
             </a:extLst>
           </p:cNvPr>
@@ -4311,7 +4311,7 @@
           <p:cNvPr id="53" name="Rectangle Bottom Copyright">
             <a:extLst>
               <a:ext uri="{FF2B5EF4-FFF2-40B4-BE49-F238E27FC236}">
-                <a16:creationId xmlns="" xmlns:a16="http://schemas.microsoft.com/office/drawing/2014/main" id="{B07FB7FB-DA6C-4F5D-B068-357F0FCE27D8}"/>
+                <a16:creationId xmlns:a16="http://schemas.microsoft.com/office/drawing/2014/main" xmlns="" id="{B07FB7FB-DA6C-4F5D-B068-357F0FCE27D8}"/>
               </a:ext>
             </a:extLst>
           </p:cNvPr>
@@ -4368,7 +4368,7 @@
                 <a:hlinkClick r:id="rId2">
                   <a:extLst>
                     <a:ext uri="{A12FA001-AC4F-418D-AE19-62706E023703}">
-                      <ahyp:hlinkClr xmlns="" xmlns:ahyp="http://schemas.microsoft.com/office/drawing/2018/hyperlinkcolor" val="tx"/>
+                      <ahyp:hlinkClr xmlns:ahyp="http://schemas.microsoft.com/office/drawing/2018/hyperlinkcolor" xmlns="" val="tx"/>
                     </a:ext>
                   </a:extLst>
                 </a:hlinkClick>
@@ -4404,7 +4404,7 @@
           <p:cNvPr id="26" name="Picture SoftUni Mascot" descr="SoftUni mascot with open hand">
             <a:extLst>
               <a:ext uri="{FF2B5EF4-FFF2-40B4-BE49-F238E27FC236}">
-                <a16:creationId xmlns="" xmlns:a16="http://schemas.microsoft.com/office/drawing/2014/main" id="{247CFF3C-C4FA-493D-8505-DF469F4D36A4}"/>
+                <a16:creationId xmlns:a16="http://schemas.microsoft.com/office/drawing/2014/main" xmlns="" id="{247CFF3C-C4FA-493D-8505-DF469F4D36A4}"/>
               </a:ext>
             </a:extLst>
           </p:cNvPr>
@@ -4417,7 +4417,7 @@
           <a:blip r:embed="rId3" cstate="print">
             <a:extLst>
               <a:ext uri="{28A0092B-C50C-407E-A947-70E740481C1C}">
-                <a14:useLocalDpi xmlns="" xmlns:a14="http://schemas.microsoft.com/office/drawing/2010/main" val="0"/>
+                <a14:useLocalDpi xmlns:a14="http://schemas.microsoft.com/office/drawing/2010/main" xmlns="" val="0"/>
               </a:ext>
             </a:extLst>
           </a:blip>
@@ -4440,7 +4440,7 @@
           <p:cNvPr id="2" name="Group SoftUni Brands">
             <a:extLst>
               <a:ext uri="{FF2B5EF4-FFF2-40B4-BE49-F238E27FC236}">
-                <a16:creationId xmlns="" xmlns:a16="http://schemas.microsoft.com/office/drawing/2014/main" id="{418FAE34-C1F8-46C7-A4AE-F270D1E70F25}"/>
+                <a16:creationId xmlns:a16="http://schemas.microsoft.com/office/drawing/2014/main" xmlns="" id="{418FAE34-C1F8-46C7-A4AE-F270D1E70F25}"/>
               </a:ext>
             </a:extLst>
           </p:cNvPr>
@@ -4460,7 +4460,7 @@
             <p:cNvPr id="24" name="Picture SoftUni Kids Logo" descr="SoftUni Kids logo">
               <a:extLst>
                 <a:ext uri="{FF2B5EF4-FFF2-40B4-BE49-F238E27FC236}">
-                  <a16:creationId xmlns="" xmlns:a16="http://schemas.microsoft.com/office/drawing/2014/main" id="{B0812936-74B6-4265-8C08-AEDC8C798702}"/>
+                  <a16:creationId xmlns:a16="http://schemas.microsoft.com/office/drawing/2014/main" xmlns="" id="{B0812936-74B6-4265-8C08-AEDC8C798702}"/>
                 </a:ext>
               </a:extLst>
             </p:cNvPr>
@@ -4473,7 +4473,7 @@
             <a:blip r:embed="rId4" cstate="print">
               <a:extLst>
                 <a:ext uri="{28A0092B-C50C-407E-A947-70E740481C1C}">
-                  <a14:useLocalDpi xmlns="" xmlns:a14="http://schemas.microsoft.com/office/drawing/2010/main" val="0"/>
+                  <a14:useLocalDpi xmlns:a14="http://schemas.microsoft.com/office/drawing/2010/main" xmlns="" val="0"/>
                 </a:ext>
               </a:extLst>
             </a:blip>
@@ -4496,7 +4496,7 @@
             <p:cNvPr id="23" name="Picture SoftUni Foundation Logo" descr="SoftUni Foundation logo">
               <a:extLst>
                 <a:ext uri="{FF2B5EF4-FFF2-40B4-BE49-F238E27FC236}">
-                  <a16:creationId xmlns="" xmlns:a16="http://schemas.microsoft.com/office/drawing/2014/main" id="{6643F71A-2013-433A-8322-FBAAED3162D8}"/>
+                  <a16:creationId xmlns:a16="http://schemas.microsoft.com/office/drawing/2014/main" xmlns="" id="{6643F71A-2013-433A-8322-FBAAED3162D8}"/>
                 </a:ext>
               </a:extLst>
             </p:cNvPr>
@@ -4509,7 +4509,7 @@
             <a:blip r:embed="rId5" cstate="print">
               <a:extLst>
                 <a:ext uri="{28A0092B-C50C-407E-A947-70E740481C1C}">
-                  <a14:useLocalDpi xmlns="" xmlns:a14="http://schemas.microsoft.com/office/drawing/2010/main" val="0"/>
+                  <a14:useLocalDpi xmlns:a14="http://schemas.microsoft.com/office/drawing/2010/main" xmlns="" val="0"/>
                 </a:ext>
               </a:extLst>
             </a:blip>
@@ -4532,7 +4532,7 @@
             <p:cNvPr id="22" name="Picture SoftUni Digital Logo" descr="SoftUni Digital logo">
               <a:extLst>
                 <a:ext uri="{FF2B5EF4-FFF2-40B4-BE49-F238E27FC236}">
-                  <a16:creationId xmlns="" xmlns:a16="http://schemas.microsoft.com/office/drawing/2014/main" id="{0A83D66F-855B-463B-920B-BF239B01A206}"/>
+                  <a16:creationId xmlns:a16="http://schemas.microsoft.com/office/drawing/2014/main" xmlns="" id="{0A83D66F-855B-463B-920B-BF239B01A206}"/>
                 </a:ext>
               </a:extLst>
             </p:cNvPr>
@@ -4545,7 +4545,7 @@
             <a:blip r:embed="rId6" cstate="print">
               <a:extLst>
                 <a:ext uri="{28A0092B-C50C-407E-A947-70E740481C1C}">
-                  <a14:useLocalDpi xmlns="" xmlns:a14="http://schemas.microsoft.com/office/drawing/2010/main" val="0"/>
+                  <a14:useLocalDpi xmlns:a14="http://schemas.microsoft.com/office/drawing/2010/main" xmlns="" val="0"/>
                 </a:ext>
               </a:extLst>
             </a:blip>
@@ -4568,7 +4568,7 @@
             <p:cNvPr id="21" name="Picture SoftUni Creative Logo" descr="SoftUni Creative logo">
               <a:extLst>
                 <a:ext uri="{FF2B5EF4-FFF2-40B4-BE49-F238E27FC236}">
-                  <a16:creationId xmlns="" xmlns:a16="http://schemas.microsoft.com/office/drawing/2014/main" id="{EA755AAE-BA08-481C-9224-0061170EE4B8}"/>
+                  <a16:creationId xmlns:a16="http://schemas.microsoft.com/office/drawing/2014/main" xmlns="" id="{EA755AAE-BA08-481C-9224-0061170EE4B8}"/>
                 </a:ext>
               </a:extLst>
             </p:cNvPr>
@@ -4581,7 +4581,7 @@
             <a:blip r:embed="rId7" cstate="print">
               <a:extLst>
                 <a:ext uri="{28A0092B-C50C-407E-A947-70E740481C1C}">
-                  <a14:useLocalDpi xmlns="" xmlns:a14="http://schemas.microsoft.com/office/drawing/2010/main" val="0"/>
+                  <a14:useLocalDpi xmlns:a14="http://schemas.microsoft.com/office/drawing/2010/main" xmlns="" val="0"/>
                 </a:ext>
               </a:extLst>
             </a:blip>
@@ -4604,7 +4604,7 @@
             <p:cNvPr id="20" name="Picture SoftUni Svetlina Logo" descr="SoftUni Svetlina logo">
               <a:extLst>
                 <a:ext uri="{FF2B5EF4-FFF2-40B4-BE49-F238E27FC236}">
-                  <a16:creationId xmlns="" xmlns:a16="http://schemas.microsoft.com/office/drawing/2014/main" id="{827D15FD-4C66-4B85-98E6-7826AA8F61C6}"/>
+                  <a16:creationId xmlns:a16="http://schemas.microsoft.com/office/drawing/2014/main" xmlns="" id="{827D15FD-4C66-4B85-98E6-7826AA8F61C6}"/>
                 </a:ext>
               </a:extLst>
             </p:cNvPr>
@@ -4617,7 +4617,7 @@
             <a:blip r:embed="rId8" cstate="print">
               <a:extLst>
                 <a:ext uri="{28A0092B-C50C-407E-A947-70E740481C1C}">
-                  <a14:useLocalDpi xmlns="" xmlns:a14="http://schemas.microsoft.com/office/drawing/2010/main" val="0"/>
+                  <a14:useLocalDpi xmlns:a14="http://schemas.microsoft.com/office/drawing/2010/main" xmlns="" val="0"/>
                 </a:ext>
               </a:extLst>
             </a:blip>
@@ -4640,7 +4640,7 @@
             <p:cNvPr id="25" name="Picture Software University Logo" descr="Software University logo">
               <a:extLst>
                 <a:ext uri="{FF2B5EF4-FFF2-40B4-BE49-F238E27FC236}">
-                  <a16:creationId xmlns="" xmlns:a16="http://schemas.microsoft.com/office/drawing/2014/main" id="{C74C190C-5856-41B9-8819-AE8DE0E10980}"/>
+                  <a16:creationId xmlns:a16="http://schemas.microsoft.com/office/drawing/2014/main" xmlns="" id="{C74C190C-5856-41B9-8819-AE8DE0E10980}"/>
                 </a:ext>
               </a:extLst>
             </p:cNvPr>
@@ -4653,7 +4653,7 @@
             <a:blip r:embed="rId9" cstate="print">
               <a:extLst>
                 <a:ext uri="{28A0092B-C50C-407E-A947-70E740481C1C}">
-                  <a14:useLocalDpi xmlns="" xmlns:a14="http://schemas.microsoft.com/office/drawing/2010/main" val="0"/>
+                  <a14:useLocalDpi xmlns:a14="http://schemas.microsoft.com/office/drawing/2010/main" xmlns="" val="0"/>
                 </a:ext>
               </a:extLst>
             </a:blip>
@@ -4676,7 +4676,7 @@
             <p:cNvPr id="33" name="Straight Connector 6">
               <a:extLst>
                 <a:ext uri="{FF2B5EF4-FFF2-40B4-BE49-F238E27FC236}">
-                  <a16:creationId xmlns="" xmlns:a16="http://schemas.microsoft.com/office/drawing/2014/main" id="{5C63D1E8-4A92-4691-8A24-A2FC7E8008E5}"/>
+                  <a16:creationId xmlns:a16="http://schemas.microsoft.com/office/drawing/2014/main" xmlns="" id="{5C63D1E8-4A92-4691-8A24-A2FC7E8008E5}"/>
                 </a:ext>
               </a:extLst>
             </p:cNvPr>
@@ -4715,7 +4715,7 @@
             <p:cNvPr id="32" name="Straight Connector 5">
               <a:extLst>
                 <a:ext uri="{FF2B5EF4-FFF2-40B4-BE49-F238E27FC236}">
-                  <a16:creationId xmlns="" xmlns:a16="http://schemas.microsoft.com/office/drawing/2014/main" id="{6E91D320-3732-40B8-864D-142D0A277ED1}"/>
+                  <a16:creationId xmlns:a16="http://schemas.microsoft.com/office/drawing/2014/main" xmlns="" id="{6E91D320-3732-40B8-864D-142D0A277ED1}"/>
                 </a:ext>
               </a:extLst>
             </p:cNvPr>
@@ -4754,7 +4754,7 @@
             <p:cNvPr id="31" name="Straight Connector 4">
               <a:extLst>
                 <a:ext uri="{FF2B5EF4-FFF2-40B4-BE49-F238E27FC236}">
-                  <a16:creationId xmlns="" xmlns:a16="http://schemas.microsoft.com/office/drawing/2014/main" id="{299ABE09-E33C-46B7-A80D-7BF4A6956211}"/>
+                  <a16:creationId xmlns:a16="http://schemas.microsoft.com/office/drawing/2014/main" xmlns="" id="{299ABE09-E33C-46B7-A80D-7BF4A6956211}"/>
                 </a:ext>
               </a:extLst>
             </p:cNvPr>
@@ -4791,7 +4791,7 @@
             <p:cNvPr id="30" name="Straight Connector 3">
               <a:extLst>
                 <a:ext uri="{FF2B5EF4-FFF2-40B4-BE49-F238E27FC236}">
-                  <a16:creationId xmlns="" xmlns:a16="http://schemas.microsoft.com/office/drawing/2014/main" id="{93DDBF37-0764-47AA-94E3-9A44F3ED8FB5}"/>
+                  <a16:creationId xmlns:a16="http://schemas.microsoft.com/office/drawing/2014/main" xmlns="" id="{93DDBF37-0764-47AA-94E3-9A44F3ED8FB5}"/>
                 </a:ext>
               </a:extLst>
             </p:cNvPr>
@@ -4828,7 +4828,7 @@
             <p:cNvPr id="29" name="Straight Connector 2">
               <a:extLst>
                 <a:ext uri="{FF2B5EF4-FFF2-40B4-BE49-F238E27FC236}">
-                  <a16:creationId xmlns="" xmlns:a16="http://schemas.microsoft.com/office/drawing/2014/main" id="{72BFE2F3-0845-4E5B-9375-E9D4027DD675}"/>
+                  <a16:creationId xmlns:a16="http://schemas.microsoft.com/office/drawing/2014/main" xmlns="" id="{72BFE2F3-0845-4E5B-9375-E9D4027DD675}"/>
                 </a:ext>
               </a:extLst>
             </p:cNvPr>
@@ -4865,7 +4865,7 @@
             <p:cNvPr id="28" name="Straight Connector 1">
               <a:extLst>
                 <a:ext uri="{FF2B5EF4-FFF2-40B4-BE49-F238E27FC236}">
-                  <a16:creationId xmlns="" xmlns:a16="http://schemas.microsoft.com/office/drawing/2014/main" id="{D4E5982E-3110-47E1-A5BB-91B7BECC3093}"/>
+                  <a16:creationId xmlns:a16="http://schemas.microsoft.com/office/drawing/2014/main" xmlns="" id="{D4E5982E-3110-47E1-A5BB-91B7BECC3093}"/>
                 </a:ext>
               </a:extLst>
             </p:cNvPr>
@@ -4902,7 +4902,7 @@
             <p:cNvPr id="27" name="Straight Connector Horizontal">
               <a:extLst>
                 <a:ext uri="{FF2B5EF4-FFF2-40B4-BE49-F238E27FC236}">
-                  <a16:creationId xmlns="" xmlns:a16="http://schemas.microsoft.com/office/drawing/2014/main" id="{5F62FB7C-BD6E-4383-98C1-2CF30F34CAFD}"/>
+                  <a16:creationId xmlns:a16="http://schemas.microsoft.com/office/drawing/2014/main" xmlns="" id="{5F62FB7C-BD6E-4383-98C1-2CF30F34CAFD}"/>
                 </a:ext>
               </a:extLst>
             </p:cNvPr>
@@ -4941,7 +4941,7 @@
             <p:cNvPr id="34" name="Straight Connector 0">
               <a:extLst>
                 <a:ext uri="{FF2B5EF4-FFF2-40B4-BE49-F238E27FC236}">
-                  <a16:creationId xmlns="" xmlns:a16="http://schemas.microsoft.com/office/drawing/2014/main" id="{C84A0FE1-723D-4682-8682-77BAD950EE15}"/>
+                  <a16:creationId xmlns:a16="http://schemas.microsoft.com/office/drawing/2014/main" xmlns="" id="{C84A0FE1-723D-4682-8682-77BAD950EE15}"/>
                 </a:ext>
               </a:extLst>
             </p:cNvPr>
@@ -4978,7 +4978,7 @@
             <p:cNvPr id="18" name="Picture SoftUni Logo" descr="SoftUni logo">
               <a:extLst>
                 <a:ext uri="{FF2B5EF4-FFF2-40B4-BE49-F238E27FC236}">
-                  <a16:creationId xmlns="" xmlns:a16="http://schemas.microsoft.com/office/drawing/2014/main" id="{A0675455-B7FA-4569-A5FD-A3B0F20B2A26}"/>
+                  <a16:creationId xmlns:a16="http://schemas.microsoft.com/office/drawing/2014/main" xmlns="" id="{A0675455-B7FA-4569-A5FD-A3B0F20B2A26}"/>
                 </a:ext>
               </a:extLst>
             </p:cNvPr>
@@ -4991,7 +4991,7 @@
             <a:blip r:embed="rId10" cstate="print">
               <a:extLst>
                 <a:ext uri="{28A0092B-C50C-407E-A947-70E740481C1C}">
-                  <a14:useLocalDpi xmlns="" xmlns:a14="http://schemas.microsoft.com/office/drawing/2010/main" val="0"/>
+                  <a14:useLocalDpi xmlns:a14="http://schemas.microsoft.com/office/drawing/2010/main" xmlns="" val="0"/>
                 </a:ext>
               </a:extLst>
             </a:blip>
@@ -5015,7 +5015,7 @@
           <p:cNvPr id="19" name="Slide Title">
             <a:extLst>
               <a:ext uri="{FF2B5EF4-FFF2-40B4-BE49-F238E27FC236}">
-                <a16:creationId xmlns="" xmlns:a16="http://schemas.microsoft.com/office/drawing/2014/main" id="{7CFDBB16-985C-4CC7-B6DB-B81B36037922}"/>
+                <a16:creationId xmlns:a16="http://schemas.microsoft.com/office/drawing/2014/main" xmlns="" id="{7CFDBB16-985C-4CC7-B6DB-B81B36037922}"/>
               </a:ext>
             </a:extLst>
           </p:cNvPr>
@@ -5118,7 +5118,7 @@
           <p:cNvPr id="36" name="Logo Software University" descr="Software University logo">
             <a:extLst>
               <a:ext uri="{FF2B5EF4-FFF2-40B4-BE49-F238E27FC236}">
-                <a16:creationId xmlns="" xmlns:a16="http://schemas.microsoft.com/office/drawing/2014/main" id="{67FC4D2E-913D-432A-B658-F0D82839FA5E}"/>
+                <a16:creationId xmlns:a16="http://schemas.microsoft.com/office/drawing/2014/main" xmlns="" id="{67FC4D2E-913D-432A-B658-F0D82839FA5E}"/>
               </a:ext>
             </a:extLst>
           </p:cNvPr>
@@ -5141,7 +5141,7 @@
             </a:clrChange>
             <a:extLst>
               <a:ext uri="{28A0092B-C50C-407E-A947-70E740481C1C}">
-                <a14:useLocalDpi xmlns="" xmlns:a14="http://schemas.microsoft.com/office/drawing/2010/main" val="0"/>
+                <a14:useLocalDpi xmlns:a14="http://schemas.microsoft.com/office/drawing/2010/main" xmlns="" val="0"/>
               </a:ext>
             </a:extLst>
           </a:blip>
@@ -5162,7 +5162,7 @@
     </p:spTree>
     <p:extLst>
       <p:ext uri="{BB962C8B-B14F-4D97-AF65-F5344CB8AC3E}">
-        <p14:creationId xmlns="" xmlns:p14="http://schemas.microsoft.com/office/powerpoint/2010/main" val="4192061223"/>
+        <p14:creationId xmlns:p14="http://schemas.microsoft.com/office/powerpoint/2010/main" xmlns="" val="4192061223"/>
       </p:ext>
     </p:extLst>
   </p:cSld>
@@ -5170,7 +5170,7 @@
     <a:masterClrMapping/>
   </p:clrMapOvr>
   <mc:AlternateContent xmlns:mc="http://schemas.openxmlformats.org/markup-compatibility/2006">
-    <mc:Choice xmlns="" xmlns:p14="http://schemas.microsoft.com/office/powerpoint/2010/main" Requires="p14">
+    <mc:Choice xmlns:p14="http://schemas.microsoft.com/office/powerpoint/2010/main" xmlns="" Requires="p14">
       <p:transition spd="slow" p14:dur="2000" advClick="0" advTm="5000"/>
     </mc:Choice>
     <mc:Fallback>
@@ -5179,7 +5179,7 @@
   </mc:AlternateContent>
   <p:extLst>
     <p:ext uri="{DCECCB84-F9BA-43D5-87BE-67443E8EF086}">
-      <p15:sldGuideLst xmlns="" xmlns:p15="http://schemas.microsoft.com/office/powerpoint/2012/main">
+      <p15:sldGuideLst xmlns:p15="http://schemas.microsoft.com/office/powerpoint/2012/main" xmlns="">
         <p15:guide id="1" orient="horz" pos="2160">
           <p15:clr>
             <a:srgbClr val="FBAE40"/>
@@ -5218,7 +5218,7 @@
           <p:cNvPr id="13" name="Slide Number">
             <a:extLst>
               <a:ext uri="{FF2B5EF4-FFF2-40B4-BE49-F238E27FC236}">
-                <a16:creationId xmlns="" xmlns:a16="http://schemas.microsoft.com/office/drawing/2014/main" id="{5B8761D8-B42F-4A70-A0CE-682CEB2AE31B}"/>
+                <a16:creationId xmlns:a16="http://schemas.microsoft.com/office/drawing/2014/main" xmlns="" id="{5B8761D8-B42F-4A70-A0CE-682CEB2AE31B}"/>
               </a:ext>
             </a:extLst>
           </p:cNvPr>
@@ -5261,7 +5261,7 @@
             <a:hlinkClick r:id="rId2" tooltip="Software University Discussion Forum"/>
             <a:extLst>
               <a:ext uri="{FF2B5EF4-FFF2-40B4-BE49-F238E27FC236}">
-                <a16:creationId xmlns="" xmlns:a16="http://schemas.microsoft.com/office/drawing/2014/main" id="{98C579AD-FAF5-4B28-9B52-5457F1E90061}"/>
+                <a16:creationId xmlns:a16="http://schemas.microsoft.com/office/drawing/2014/main" xmlns="" id="{98C579AD-FAF5-4B28-9B52-5457F1E90061}"/>
               </a:ext>
             </a:extLst>
           </p:cNvPr>
@@ -5274,7 +5274,7 @@
           <a:blip r:embed="rId3" cstate="print">
             <a:extLst>
               <a:ext uri="{28A0092B-C50C-407E-A947-70E740481C1C}">
-                <a14:useLocalDpi xmlns="" xmlns:a14="http://schemas.microsoft.com/office/drawing/2010/main"/>
+                <a14:useLocalDpi xmlns:a14="http://schemas.microsoft.com/office/drawing/2010/main" xmlns=""/>
               </a:ext>
             </a:extLst>
           </a:blip>
@@ -5298,7 +5298,7 @@
             <a:hlinkClick r:id="rId4" tooltip="Software University @ Facebook"/>
             <a:extLst>
               <a:ext uri="{FF2B5EF4-FFF2-40B4-BE49-F238E27FC236}">
-                <a16:creationId xmlns="" xmlns:a16="http://schemas.microsoft.com/office/drawing/2014/main" id="{6B2C510E-5EF2-49F6-B926-2BD74CD3C7F8}"/>
+                <a16:creationId xmlns:a16="http://schemas.microsoft.com/office/drawing/2014/main" xmlns="" id="{6B2C510E-5EF2-49F6-B926-2BD74CD3C7F8}"/>
               </a:ext>
             </a:extLst>
           </p:cNvPr>
@@ -5311,7 +5311,7 @@
           <a:blip r:embed="rId5" cstate="print">
             <a:extLst>
               <a:ext uri="{28A0092B-C50C-407E-A947-70E740481C1C}">
-                <a14:useLocalDpi xmlns="" xmlns:a14="http://schemas.microsoft.com/office/drawing/2010/main"/>
+                <a14:useLocalDpi xmlns:a14="http://schemas.microsoft.com/office/drawing/2010/main" xmlns=""/>
               </a:ext>
             </a:extLst>
           </a:blip>
@@ -5329,7 +5329,7 @@
           <a:noFill/>
           <a:extLst>
             <a:ext uri="{909E8E84-426E-40DD-AFC4-6F175D3DCCD1}">
-              <a14:hiddenFill xmlns="" xmlns:a14="http://schemas.microsoft.com/office/drawing/2010/main">
+              <a14:hiddenFill xmlns:a14="http://schemas.microsoft.com/office/drawing/2010/main" xmlns="">
                 <a:solidFill>
                   <a:srgbClr val="FFFFFF"/>
                 </a:solidFill>
@@ -5344,7 +5344,7 @@
             <a:hlinkClick r:id="rId6"/>
             <a:extLst>
               <a:ext uri="{FF2B5EF4-FFF2-40B4-BE49-F238E27FC236}">
-                <a16:creationId xmlns="" xmlns:a16="http://schemas.microsoft.com/office/drawing/2014/main" id="{F4604840-E810-44B7-9FF1-3B28CD68B758}"/>
+                <a16:creationId xmlns:a16="http://schemas.microsoft.com/office/drawing/2014/main" xmlns="" id="{F4604840-E810-44B7-9FF1-3B28CD68B758}"/>
               </a:ext>
             </a:extLst>
           </p:cNvPr>
@@ -5357,7 +5357,7 @@
           <a:blip r:embed="rId7" cstate="print">
             <a:extLst>
               <a:ext uri="{28A0092B-C50C-407E-A947-70E740481C1C}">
-                <a14:useLocalDpi xmlns="" xmlns:a14="http://schemas.microsoft.com/office/drawing/2010/main" val="0"/>
+                <a14:useLocalDpi xmlns:a14="http://schemas.microsoft.com/office/drawing/2010/main" xmlns="" val="0"/>
               </a:ext>
             </a:extLst>
           </a:blip>
@@ -5381,7 +5381,7 @@
             <a:hlinkClick r:id="rId8"/>
             <a:extLst>
               <a:ext uri="{FF2B5EF4-FFF2-40B4-BE49-F238E27FC236}">
-                <a16:creationId xmlns="" xmlns:a16="http://schemas.microsoft.com/office/drawing/2014/main" id="{07C965FA-A87E-4824-AFA8-C67AF548A76A}"/>
+                <a16:creationId xmlns:a16="http://schemas.microsoft.com/office/drawing/2014/main" xmlns="" id="{07C965FA-A87E-4824-AFA8-C67AF548A76A}"/>
               </a:ext>
             </a:extLst>
           </p:cNvPr>
@@ -5394,7 +5394,7 @@
           <a:blip r:embed="rId9" cstate="print">
             <a:extLst>
               <a:ext uri="{28A0092B-C50C-407E-A947-70E740481C1C}">
-                <a14:useLocalDpi xmlns="" xmlns:a14="http://schemas.microsoft.com/office/drawing/2010/main" val="0"/>
+                <a14:useLocalDpi xmlns:a14="http://schemas.microsoft.com/office/drawing/2010/main" xmlns="" val="0"/>
               </a:ext>
             </a:extLst>
           </a:blip>
@@ -5416,7 +5416,7 @@
           <p:cNvPr id="12" name="Slide Body Text">
             <a:extLst>
               <a:ext uri="{FF2B5EF4-FFF2-40B4-BE49-F238E27FC236}">
-                <a16:creationId xmlns="" xmlns:a16="http://schemas.microsoft.com/office/drawing/2014/main" id="{0C1F9416-8B6E-46DE-973C-777785E27A26}"/>
+                <a16:creationId xmlns:a16="http://schemas.microsoft.com/office/drawing/2014/main" xmlns="" id="{0C1F9416-8B6E-46DE-973C-777785E27A26}"/>
               </a:ext>
             </a:extLst>
           </p:cNvPr>
@@ -5541,7 +5541,7 @@
           <p:cNvPr id="10" name="Rectangle Top">
             <a:extLst>
               <a:ext uri="{FF2B5EF4-FFF2-40B4-BE49-F238E27FC236}">
-                <a16:creationId xmlns="" xmlns:a16="http://schemas.microsoft.com/office/drawing/2014/main" id="{86646B95-5E3B-4DE8-9118-031C2C296D8C}"/>
+                <a16:creationId xmlns:a16="http://schemas.microsoft.com/office/drawing/2014/main" xmlns="" id="{86646B95-5E3B-4DE8-9118-031C2C296D8C}"/>
               </a:ext>
             </a:extLst>
           </p:cNvPr>
@@ -5622,7 +5622,7 @@
           <p:cNvPr id="11" name="Logo Software University" descr="Software University logo">
             <a:extLst>
               <a:ext uri="{FF2B5EF4-FFF2-40B4-BE49-F238E27FC236}">
-                <a16:creationId xmlns="" xmlns:a16="http://schemas.microsoft.com/office/drawing/2014/main" id="{58AB1944-B146-4E89-B2D9-426EB610F319}"/>
+                <a16:creationId xmlns:a16="http://schemas.microsoft.com/office/drawing/2014/main" xmlns="" id="{58AB1944-B146-4E89-B2D9-426EB610F319}"/>
               </a:ext>
             </a:extLst>
           </p:cNvPr>
@@ -5635,7 +5635,7 @@
           <a:blip r:embed="rId11" cstate="print">
             <a:extLst>
               <a:ext uri="{28A0092B-C50C-407E-A947-70E740481C1C}">
-                <a14:useLocalDpi xmlns="" xmlns:a14="http://schemas.microsoft.com/office/drawing/2010/main" val="0"/>
+                <a14:useLocalDpi xmlns:a14="http://schemas.microsoft.com/office/drawing/2010/main" xmlns="" val="0"/>
               </a:ext>
             </a:extLst>
           </a:blip>
@@ -5658,7 +5658,7 @@
           <p:cNvPr id="18" name="Slide Title">
             <a:extLst>
               <a:ext uri="{FF2B5EF4-FFF2-40B4-BE49-F238E27FC236}">
-                <a16:creationId xmlns="" xmlns:a16="http://schemas.microsoft.com/office/drawing/2014/main" id="{AE87ED9C-76E1-4D85-9B06-3AF44AABB668}"/>
+                <a16:creationId xmlns:a16="http://schemas.microsoft.com/office/drawing/2014/main" xmlns="" id="{AE87ED9C-76E1-4D85-9B06-3AF44AABB668}"/>
               </a:ext>
             </a:extLst>
           </p:cNvPr>
@@ -5697,7 +5697,7 @@
     </p:spTree>
     <p:extLst>
       <p:ext uri="{BB962C8B-B14F-4D97-AF65-F5344CB8AC3E}">
-        <p14:creationId xmlns="" xmlns:p14="http://schemas.microsoft.com/office/powerpoint/2010/main" val="2196466322"/>
+        <p14:creationId xmlns:p14="http://schemas.microsoft.com/office/powerpoint/2010/main" xmlns="" val="2196466322"/>
       </p:ext>
     </p:extLst>
   </p:cSld>
@@ -5705,7 +5705,7 @@
     <a:masterClrMapping/>
   </p:clrMapOvr>
   <mc:AlternateContent xmlns:mc="http://schemas.openxmlformats.org/markup-compatibility/2006">
-    <mc:Choice xmlns="" xmlns:p14="http://schemas.microsoft.com/office/powerpoint/2010/main" Requires="p14">
+    <mc:Choice xmlns:p14="http://schemas.microsoft.com/office/powerpoint/2010/main" xmlns="" Requires="p14">
       <p:transition spd="slow" p14:dur="2000" advClick="0" advTm="5000"/>
     </mc:Choice>
     <mc:Fallback>
@@ -5737,7 +5737,7 @@
           <p:cNvPr id="9" name="Oval Center Icon">
             <a:extLst>
               <a:ext uri="{FF2B5EF4-FFF2-40B4-BE49-F238E27FC236}">
-                <a16:creationId xmlns="" xmlns:a16="http://schemas.microsoft.com/office/drawing/2014/main" id="{13B9A8FE-2718-4F2C-98D4-CBF86AD69D58}"/>
+                <a16:creationId xmlns:a16="http://schemas.microsoft.com/office/drawing/2014/main" xmlns="" id="{13B9A8FE-2718-4F2C-98D4-CBF86AD69D58}"/>
               </a:ext>
             </a:extLst>
           </p:cNvPr>
@@ -5818,7 +5818,7 @@
           <p:cNvPr id="8" name="Slide Subtitle">
             <a:extLst>
               <a:ext uri="{FF2B5EF4-FFF2-40B4-BE49-F238E27FC236}">
-                <a16:creationId xmlns="" xmlns:a16="http://schemas.microsoft.com/office/drawing/2014/main" id="{588387B4-E99E-4145-9D1D-F17CA5190DFD}"/>
+                <a16:creationId xmlns:a16="http://schemas.microsoft.com/office/drawing/2014/main" xmlns="" id="{588387B4-E99E-4145-9D1D-F17CA5190DFD}"/>
               </a:ext>
             </a:extLst>
           </p:cNvPr>
@@ -5868,7 +5868,7 @@
           <p:cNvPr id="13" name="Slide Title">
             <a:extLst>
               <a:ext uri="{FF2B5EF4-FFF2-40B4-BE49-F238E27FC236}">
-                <a16:creationId xmlns="" xmlns:a16="http://schemas.microsoft.com/office/drawing/2014/main" id="{8A28C56F-AE84-49D0-9AD1-1F0CEEABF710}"/>
+                <a16:creationId xmlns:a16="http://schemas.microsoft.com/office/drawing/2014/main" xmlns="" id="{8A28C56F-AE84-49D0-9AD1-1F0CEEABF710}"/>
               </a:ext>
             </a:extLst>
           </p:cNvPr>
@@ -5913,7 +5913,7 @@
     </p:spTree>
     <p:extLst>
       <p:ext uri="{BB962C8B-B14F-4D97-AF65-F5344CB8AC3E}">
-        <p14:creationId xmlns="" xmlns:p14="http://schemas.microsoft.com/office/powerpoint/2010/main" val="475389923"/>
+        <p14:creationId xmlns:p14="http://schemas.microsoft.com/office/powerpoint/2010/main" xmlns="" val="475389923"/>
       </p:ext>
     </p:extLst>
   </p:cSld>
@@ -5921,7 +5921,7 @@
     <a:masterClrMapping/>
   </p:clrMapOvr>
   <mc:AlternateContent xmlns:mc="http://schemas.openxmlformats.org/markup-compatibility/2006">
-    <mc:Choice xmlns="" xmlns:p14="http://schemas.microsoft.com/office/powerpoint/2010/main" Requires="p14">
+    <mc:Choice xmlns:p14="http://schemas.microsoft.com/office/powerpoint/2010/main" xmlns="" Requires="p14">
       <p:transition spd="slow" p14:dur="2000" advClick="0" advTm="5000"/>
     </mc:Choice>
     <mc:Fallback>
@@ -5954,7 +5954,7 @@
           <p:cNvPr id="2" name="Title 1">
             <a:extLst>
               <a:ext uri="{FF2B5EF4-FFF2-40B4-BE49-F238E27FC236}">
-                <a16:creationId xmlns="" xmlns:a16="http://schemas.microsoft.com/office/drawing/2014/main" id="{5213C145-EA12-94EF-AA17-5F628EA0AD2D}"/>
+                <a16:creationId xmlns:a16="http://schemas.microsoft.com/office/drawing/2014/main" xmlns="" id="{5213C145-EA12-94EF-AA17-5F628EA0AD2D}"/>
               </a:ext>
             </a:extLst>
           </p:cNvPr>
@@ -5992,7 +5992,7 @@
           <p:cNvPr id="3" name="Subtitle 2">
             <a:extLst>
               <a:ext uri="{FF2B5EF4-FFF2-40B4-BE49-F238E27FC236}">
-                <a16:creationId xmlns="" xmlns:a16="http://schemas.microsoft.com/office/drawing/2014/main" id="{5F55E72E-5B45-B6EE-75AE-03B188AD9A08}"/>
+                <a16:creationId xmlns:a16="http://schemas.microsoft.com/office/drawing/2014/main" xmlns="" id="{5F55E72E-5B45-B6EE-75AE-03B188AD9A08}"/>
               </a:ext>
             </a:extLst>
           </p:cNvPr>
@@ -6063,7 +6063,7 @@
           <p:cNvPr id="4" name="Date Placeholder 3">
             <a:extLst>
               <a:ext uri="{FF2B5EF4-FFF2-40B4-BE49-F238E27FC236}">
-                <a16:creationId xmlns="" xmlns:a16="http://schemas.microsoft.com/office/drawing/2014/main" id="{30C6A8EA-0240-01AB-A7C2-BD1CD885E1C1}"/>
+                <a16:creationId xmlns:a16="http://schemas.microsoft.com/office/drawing/2014/main" xmlns="" id="{30C6A8EA-0240-01AB-A7C2-BD1CD885E1C1}"/>
               </a:ext>
             </a:extLst>
           </p:cNvPr>
@@ -6082,7 +6082,7 @@
             <a:fld id="{1CF2F75B-1C4E-1E47-AE31-5B79E79ADF4F}" type="datetimeFigureOut">
               <a:rPr lang="x-none" smtClean="0"/>
               <a:pPr/>
-              <a:t>24.8.2023 г.</a:t>
+              <a:t>25.8.2023 г.</a:t>
             </a:fld>
             <a:endParaRPr lang="x-none"/>
           </a:p>
@@ -6093,7 +6093,7 @@
           <p:cNvPr id="5" name="Footer Placeholder 4">
             <a:extLst>
               <a:ext uri="{FF2B5EF4-FFF2-40B4-BE49-F238E27FC236}">
-                <a16:creationId xmlns="" xmlns:a16="http://schemas.microsoft.com/office/drawing/2014/main" id="{F95CBF96-4249-1541-E44E-FBCECA233B3C}"/>
+                <a16:creationId xmlns:a16="http://schemas.microsoft.com/office/drawing/2014/main" xmlns="" id="{F95CBF96-4249-1541-E44E-FBCECA233B3C}"/>
               </a:ext>
             </a:extLst>
           </p:cNvPr>
@@ -6118,7 +6118,7 @@
           <p:cNvPr id="6" name="Slide Number Placeholder 5">
             <a:extLst>
               <a:ext uri="{FF2B5EF4-FFF2-40B4-BE49-F238E27FC236}">
-                <a16:creationId xmlns="" xmlns:a16="http://schemas.microsoft.com/office/drawing/2014/main" id="{7ACB54F2-814F-F79B-8CD7-FA3133365CBC}"/>
+                <a16:creationId xmlns:a16="http://schemas.microsoft.com/office/drawing/2014/main" xmlns="" id="{7ACB54F2-814F-F79B-8CD7-FA3133365CBC}"/>
               </a:ext>
             </a:extLst>
           </p:cNvPr>
@@ -6146,7 +6146,7 @@
     </p:spTree>
     <p:extLst>
       <p:ext uri="{BB962C8B-B14F-4D97-AF65-F5344CB8AC3E}">
-        <p14:creationId xmlns="" xmlns:p14="http://schemas.microsoft.com/office/powerpoint/2010/main" val="2773863354"/>
+        <p14:creationId xmlns:p14="http://schemas.microsoft.com/office/powerpoint/2010/main" xmlns="" val="2773863354"/>
       </p:ext>
     </p:extLst>
   </p:cSld>
@@ -6178,7 +6178,7 @@
           <p:cNvPr id="8" name="Rectangle Top">
             <a:extLst>
               <a:ext uri="{FF2B5EF4-FFF2-40B4-BE49-F238E27FC236}">
-                <a16:creationId xmlns="" xmlns:a16="http://schemas.microsoft.com/office/drawing/2014/main" id="{454BD9C2-93A6-4860-A758-846ED0E1C8FA}"/>
+                <a16:creationId xmlns:a16="http://schemas.microsoft.com/office/drawing/2014/main" xmlns="" id="{454BD9C2-93A6-4860-A758-846ED0E1C8FA}"/>
               </a:ext>
             </a:extLst>
           </p:cNvPr>
@@ -6259,7 +6259,7 @@
           <p:cNvPr id="7" name="Slide Number">
             <a:extLst>
               <a:ext uri="{FF2B5EF4-FFF2-40B4-BE49-F238E27FC236}">
-                <a16:creationId xmlns="" xmlns:a16="http://schemas.microsoft.com/office/drawing/2014/main" id="{C1780DB1-0AF0-4108-AFE1-9DA99F0DBCB8}"/>
+                <a16:creationId xmlns:a16="http://schemas.microsoft.com/office/drawing/2014/main" xmlns="" id="{C1780DB1-0AF0-4108-AFE1-9DA99F0DBCB8}"/>
               </a:ext>
             </a:extLst>
           </p:cNvPr>
@@ -6301,7 +6301,7 @@
           <p:cNvPr id="3" name="Slide Body Text">
             <a:extLst>
               <a:ext uri="{FF2B5EF4-FFF2-40B4-BE49-F238E27FC236}">
-                <a16:creationId xmlns="" xmlns:a16="http://schemas.microsoft.com/office/drawing/2014/main" id="{5A9D2960-6D42-439F-82E8-812822013A10}"/>
+                <a16:creationId xmlns:a16="http://schemas.microsoft.com/office/drawing/2014/main" xmlns="" id="{5A9D2960-6D42-439F-82E8-812822013A10}"/>
               </a:ext>
             </a:extLst>
           </p:cNvPr>
@@ -6379,7 +6379,7 @@
           <p:cNvPr id="13" name="Rectangle Top">
             <a:extLst>
               <a:ext uri="{FF2B5EF4-FFF2-40B4-BE49-F238E27FC236}">
-                <a16:creationId xmlns="" xmlns:a16="http://schemas.microsoft.com/office/drawing/2014/main" id="{391AFA4E-7870-4561-A1B8-AC956B0C8931}"/>
+                <a16:creationId xmlns:a16="http://schemas.microsoft.com/office/drawing/2014/main" xmlns="" id="{391AFA4E-7870-4561-A1B8-AC956B0C8931}"/>
               </a:ext>
             </a:extLst>
           </p:cNvPr>
@@ -6460,7 +6460,7 @@
           <p:cNvPr id="12" name="Logo Software University" descr="Software University logo">
             <a:extLst>
               <a:ext uri="{FF2B5EF4-FFF2-40B4-BE49-F238E27FC236}">
-                <a16:creationId xmlns="" xmlns:a16="http://schemas.microsoft.com/office/drawing/2014/main" id="{B1D3B425-B9BF-43ED-9DEC-C05002FBA22F}"/>
+                <a16:creationId xmlns:a16="http://schemas.microsoft.com/office/drawing/2014/main" xmlns="" id="{B1D3B425-B9BF-43ED-9DEC-C05002FBA22F}"/>
               </a:ext>
             </a:extLst>
           </p:cNvPr>
@@ -6473,7 +6473,7 @@
           <a:blip r:embed="rId2" cstate="print">
             <a:extLst>
               <a:ext uri="{28A0092B-C50C-407E-A947-70E740481C1C}">
-                <a14:useLocalDpi xmlns="" xmlns:a14="http://schemas.microsoft.com/office/drawing/2010/main" val="0"/>
+                <a14:useLocalDpi xmlns:a14="http://schemas.microsoft.com/office/drawing/2010/main" xmlns="" val="0"/>
               </a:ext>
             </a:extLst>
           </a:blip>
@@ -6496,7 +6496,7 @@
           <p:cNvPr id="6" name="Slide Title">
             <a:extLst>
               <a:ext uri="{FF2B5EF4-FFF2-40B4-BE49-F238E27FC236}">
-                <a16:creationId xmlns="" xmlns:a16="http://schemas.microsoft.com/office/drawing/2014/main" id="{19B5B676-7892-440F-8191-7109B2C59885}"/>
+                <a16:creationId xmlns:a16="http://schemas.microsoft.com/office/drawing/2014/main" xmlns="" id="{19B5B676-7892-440F-8191-7109B2C59885}"/>
               </a:ext>
             </a:extLst>
           </p:cNvPr>
@@ -6535,7 +6535,7 @@
     </p:spTree>
     <p:extLst>
       <p:ext uri="{BB962C8B-B14F-4D97-AF65-F5344CB8AC3E}">
-        <p14:creationId xmlns="" xmlns:p14="http://schemas.microsoft.com/office/powerpoint/2010/main" val="2685365194"/>
+        <p14:creationId xmlns:p14="http://schemas.microsoft.com/office/powerpoint/2010/main" xmlns="" val="2685365194"/>
       </p:ext>
     </p:extLst>
   </p:cSld>
@@ -6543,7 +6543,7 @@
     <a:masterClrMapping/>
   </p:clrMapOvr>
   <mc:AlternateContent xmlns:mc="http://schemas.openxmlformats.org/markup-compatibility/2006">
-    <mc:Choice xmlns="" xmlns:p14="http://schemas.microsoft.com/office/powerpoint/2010/main" Requires="p14">
+    <mc:Choice xmlns:p14="http://schemas.microsoft.com/office/powerpoint/2010/main" xmlns="" Requires="p14">
       <p:transition spd="slow" p14:dur="2000" advClick="0" advTm="5000"/>
     </mc:Choice>
     <mc:Fallback>
@@ -7593,7 +7593,7 @@
             <a:fld id="{1D8BD707-D9CF-40AE-B4C6-C98DA3205C09}" type="datetimeFigureOut">
               <a:rPr lang="en-US"/>
               <a:pPr/>
-              <a:t>8/24/2023</a:t>
+              <a:t>8/25/2023</a:t>
             </a:fld>
             <a:endParaRPr lang="en-US" dirty="0"/>
           </a:p>
@@ -7653,7 +7653,7 @@
     </p:spTree>
     <p:extLst>
       <p:ext uri="{BB962C8B-B14F-4D97-AF65-F5344CB8AC3E}">
-        <p14:creationId xmlns="" xmlns:p14="http://schemas.microsoft.com/office/powerpoint/2010/main" val="2531485629"/>
+        <p14:creationId xmlns:p14="http://schemas.microsoft.com/office/powerpoint/2010/main" xmlns="" val="2531485629"/>
       </p:ext>
     </p:extLst>
   </p:cSld>
@@ -7849,7 +7849,7 @@
     </p:spTree>
     <p:extLst>
       <p:ext uri="{BB962C8B-B14F-4D97-AF65-F5344CB8AC3E}">
-        <p14:creationId xmlns="" xmlns:p14="http://schemas.microsoft.com/office/powerpoint/2010/main" val="3529216409"/>
+        <p14:creationId xmlns:p14="http://schemas.microsoft.com/office/powerpoint/2010/main" xmlns="" val="3529216409"/>
       </p:ext>
     </p:extLst>
   </p:cSld>
@@ -7857,7 +7857,7 @@
     <a:masterClrMapping/>
   </p:clrMapOvr>
   <mc:AlternateContent xmlns:mc="http://schemas.openxmlformats.org/markup-compatibility/2006">
-    <mc:Choice xmlns="" xmlns:p14="http://schemas.microsoft.com/office/powerpoint/2010/main" Requires="p14">
+    <mc:Choice xmlns:p14="http://schemas.microsoft.com/office/powerpoint/2010/main" xmlns="" Requires="p14">
       <p:transition spd="slow" p14:dur="2000" advClick="0" advTm="5000"/>
     </mc:Choice>
     <mc:Fallback>
@@ -7889,7 +7889,7 @@
           <p:cNvPr id="7" name="Slide Number">
             <a:extLst>
               <a:ext uri="{FF2B5EF4-FFF2-40B4-BE49-F238E27FC236}">
-                <a16:creationId xmlns="" xmlns:a16="http://schemas.microsoft.com/office/drawing/2014/main" id="{C1780DB1-0AF0-4108-AFE1-9DA99F0DBCB8}"/>
+                <a16:creationId xmlns:a16="http://schemas.microsoft.com/office/drawing/2014/main" xmlns="" id="{C1780DB1-0AF0-4108-AFE1-9DA99F0DBCB8}"/>
               </a:ext>
             </a:extLst>
           </p:cNvPr>
@@ -7931,7 +7931,7 @@
           <p:cNvPr id="3" name="Slide Body Text">
             <a:extLst>
               <a:ext uri="{FF2B5EF4-FFF2-40B4-BE49-F238E27FC236}">
-                <a16:creationId xmlns="" xmlns:a16="http://schemas.microsoft.com/office/drawing/2014/main" id="{5A9D2960-6D42-439F-82E8-812822013A10}"/>
+                <a16:creationId xmlns:a16="http://schemas.microsoft.com/office/drawing/2014/main" xmlns="" id="{5A9D2960-6D42-439F-82E8-812822013A10}"/>
               </a:ext>
             </a:extLst>
           </p:cNvPr>
@@ -8009,7 +8009,7 @@
           <p:cNvPr id="13" name="Rectangle Top">
             <a:extLst>
               <a:ext uri="{FF2B5EF4-FFF2-40B4-BE49-F238E27FC236}">
-                <a16:creationId xmlns="" xmlns:a16="http://schemas.microsoft.com/office/drawing/2014/main" id="{391AFA4E-7870-4561-A1B8-AC956B0C8931}"/>
+                <a16:creationId xmlns:a16="http://schemas.microsoft.com/office/drawing/2014/main" xmlns="" id="{391AFA4E-7870-4561-A1B8-AC956B0C8931}"/>
               </a:ext>
             </a:extLst>
           </p:cNvPr>
@@ -8090,7 +8090,7 @@
           <p:cNvPr id="12" name="Logo Software University" descr="Software University logo">
             <a:extLst>
               <a:ext uri="{FF2B5EF4-FFF2-40B4-BE49-F238E27FC236}">
-                <a16:creationId xmlns="" xmlns:a16="http://schemas.microsoft.com/office/drawing/2014/main" id="{B1D3B425-B9BF-43ED-9DEC-C05002FBA22F}"/>
+                <a16:creationId xmlns:a16="http://schemas.microsoft.com/office/drawing/2014/main" xmlns="" id="{B1D3B425-B9BF-43ED-9DEC-C05002FBA22F}"/>
               </a:ext>
             </a:extLst>
           </p:cNvPr>
@@ -8103,7 +8103,7 @@
           <a:blip r:embed="rId2" cstate="print">
             <a:extLst>
               <a:ext uri="{28A0092B-C50C-407E-A947-70E740481C1C}">
-                <a14:useLocalDpi xmlns="" xmlns:a14="http://schemas.microsoft.com/office/drawing/2010/main" val="0"/>
+                <a14:useLocalDpi xmlns:a14="http://schemas.microsoft.com/office/drawing/2010/main" xmlns="" val="0"/>
               </a:ext>
             </a:extLst>
           </a:blip>
@@ -8126,7 +8126,7 @@
           <p:cNvPr id="6" name="Slide Title">
             <a:extLst>
               <a:ext uri="{FF2B5EF4-FFF2-40B4-BE49-F238E27FC236}">
-                <a16:creationId xmlns="" xmlns:a16="http://schemas.microsoft.com/office/drawing/2014/main" id="{19B5B676-7892-440F-8191-7109B2C59885}"/>
+                <a16:creationId xmlns:a16="http://schemas.microsoft.com/office/drawing/2014/main" xmlns="" id="{19B5B676-7892-440F-8191-7109B2C59885}"/>
               </a:ext>
             </a:extLst>
           </p:cNvPr>
@@ -8165,7 +8165,7 @@
     </p:spTree>
     <p:extLst>
       <p:ext uri="{BB962C8B-B14F-4D97-AF65-F5344CB8AC3E}">
-        <p14:creationId xmlns="" xmlns:p14="http://schemas.microsoft.com/office/powerpoint/2010/main" val="1102970716"/>
+        <p14:creationId xmlns:p14="http://schemas.microsoft.com/office/powerpoint/2010/main" xmlns="" val="1102970716"/>
       </p:ext>
     </p:extLst>
   </p:cSld>
@@ -8173,7 +8173,7 @@
     <a:masterClrMapping/>
   </p:clrMapOvr>
   <mc:AlternateContent xmlns:mc="http://schemas.openxmlformats.org/markup-compatibility/2006">
-    <mc:Choice xmlns="" xmlns:p14="http://schemas.microsoft.com/office/powerpoint/2010/main" Requires="p14">
+    <mc:Choice xmlns:p14="http://schemas.microsoft.com/office/powerpoint/2010/main" xmlns="" Requires="p14">
       <p:transition spd="slow" p14:dur="2000" advClick="0" advTm="5000"/>
     </mc:Choice>
     <mc:Fallback>
@@ -8205,7 +8205,7 @@
           <p:cNvPr id="9" name="Slide Number">
             <a:extLst>
               <a:ext uri="{FF2B5EF4-FFF2-40B4-BE49-F238E27FC236}">
-                <a16:creationId xmlns="" xmlns:a16="http://schemas.microsoft.com/office/drawing/2014/main" id="{0020EB61-2079-41A3-B356-B1D8D48D786E}"/>
+                <a16:creationId xmlns:a16="http://schemas.microsoft.com/office/drawing/2014/main" xmlns="" id="{0020EB61-2079-41A3-B356-B1D8D48D786E}"/>
               </a:ext>
             </a:extLst>
           </p:cNvPr>
@@ -8322,7 +8322,7 @@
           <p:cNvPr id="7" name="Slide Body Text">
             <a:extLst>
               <a:ext uri="{FF2B5EF4-FFF2-40B4-BE49-F238E27FC236}">
-                <a16:creationId xmlns="" xmlns:a16="http://schemas.microsoft.com/office/drawing/2014/main" id="{CB4CB13C-66A1-466B-A6C1-B0BABF5CFEC1}"/>
+                <a16:creationId xmlns:a16="http://schemas.microsoft.com/office/drawing/2014/main" xmlns="" id="{CB4CB13C-66A1-466B-A6C1-B0BABF5CFEC1}"/>
               </a:ext>
             </a:extLst>
           </p:cNvPr>
@@ -8420,7 +8420,7 @@
           <p:cNvPr id="3" name="Logo Software University" descr="Software University logo">
             <a:extLst>
               <a:ext uri="{FF2B5EF4-FFF2-40B4-BE49-F238E27FC236}">
-                <a16:creationId xmlns="" xmlns:a16="http://schemas.microsoft.com/office/drawing/2014/main" id="{5573C101-930B-47AC-967A-A64513DFFDEE}"/>
+                <a16:creationId xmlns:a16="http://schemas.microsoft.com/office/drawing/2014/main" xmlns="" id="{5573C101-930B-47AC-967A-A64513DFFDEE}"/>
               </a:ext>
             </a:extLst>
           </p:cNvPr>
@@ -8443,7 +8443,7 @@
             </a:clrChange>
             <a:extLst>
               <a:ext uri="{28A0092B-C50C-407E-A947-70E740481C1C}">
-                <a14:useLocalDpi xmlns="" xmlns:a14="http://schemas.microsoft.com/office/drawing/2010/main" val="0"/>
+                <a14:useLocalDpi xmlns:a14="http://schemas.microsoft.com/office/drawing/2010/main" xmlns="" val="0"/>
               </a:ext>
             </a:extLst>
           </a:blip>
@@ -8466,7 +8466,7 @@
           <p:cNvPr id="8" name="Slide Title">
             <a:extLst>
               <a:ext uri="{FF2B5EF4-FFF2-40B4-BE49-F238E27FC236}">
-                <a16:creationId xmlns="" xmlns:a16="http://schemas.microsoft.com/office/drawing/2014/main" id="{E2DA9691-CDF5-499C-94BB-AAA61DAC1BFB}"/>
+                <a16:creationId xmlns:a16="http://schemas.microsoft.com/office/drawing/2014/main" xmlns="" id="{E2DA9691-CDF5-499C-94BB-AAA61DAC1BFB}"/>
               </a:ext>
             </a:extLst>
           </p:cNvPr>
@@ -8503,7 +8503,7 @@
           <p:cNvPr id="10" name="Group 9">
             <a:extLst>
               <a:ext uri="{FF2B5EF4-FFF2-40B4-BE49-F238E27FC236}">
-                <a16:creationId xmlns="" xmlns:a16="http://schemas.microsoft.com/office/drawing/2014/main" id="{43CDBCC2-1C96-44BC-B992-7B0C49C34904}"/>
+                <a16:creationId xmlns:a16="http://schemas.microsoft.com/office/drawing/2014/main" xmlns="" id="{43CDBCC2-1C96-44BC-B992-7B0C49C34904}"/>
               </a:ext>
             </a:extLst>
           </p:cNvPr>
@@ -8523,7 +8523,7 @@
             <p:cNvPr id="11" name="Group 10">
               <a:extLst>
                 <a:ext uri="{FF2B5EF4-FFF2-40B4-BE49-F238E27FC236}">
-                  <a16:creationId xmlns="" xmlns:a16="http://schemas.microsoft.com/office/drawing/2014/main" id="{7D71B3A8-4D39-42CF-9255-81EA3A622DD6}"/>
+                  <a16:creationId xmlns:a16="http://schemas.microsoft.com/office/drawing/2014/main" xmlns="" id="{7D71B3A8-4D39-42CF-9255-81EA3A622DD6}"/>
                 </a:ext>
               </a:extLst>
             </p:cNvPr>
@@ -8543,7 +8543,7 @@
               <p:cNvPr id="25" name="Oval 24">
                 <a:extLst>
                   <a:ext uri="{FF2B5EF4-FFF2-40B4-BE49-F238E27FC236}">
-                    <a16:creationId xmlns="" xmlns:a16="http://schemas.microsoft.com/office/drawing/2014/main" id="{B98059F9-1874-426D-8AF7-A12C21F37DD9}"/>
+                    <a16:creationId xmlns:a16="http://schemas.microsoft.com/office/drawing/2014/main" xmlns="" id="{B98059F9-1874-426D-8AF7-A12C21F37DD9}"/>
                   </a:ext>
                 </a:extLst>
               </p:cNvPr>
@@ -8595,7 +8595,7 @@
               <p:cNvPr id="26" name="Rectangle 5">
                 <a:extLst>
                   <a:ext uri="{FF2B5EF4-FFF2-40B4-BE49-F238E27FC236}">
-                    <a16:creationId xmlns="" xmlns:a16="http://schemas.microsoft.com/office/drawing/2014/main" id="{A3A1E077-DBDF-48F0-A924-604984B940A2}"/>
+                    <a16:creationId xmlns:a16="http://schemas.microsoft.com/office/drawing/2014/main" xmlns="" id="{A3A1E077-DBDF-48F0-A924-604984B940A2}"/>
                   </a:ext>
                 </a:extLst>
               </p:cNvPr>
@@ -8740,7 +8740,7 @@
               <p:cNvPr id="27" name="Rectangle 5">
                 <a:extLst>
                   <a:ext uri="{FF2B5EF4-FFF2-40B4-BE49-F238E27FC236}">
-                    <a16:creationId xmlns="" xmlns:a16="http://schemas.microsoft.com/office/drawing/2014/main" id="{798B1F51-1FA4-4199-81C7-62356C936CC9}"/>
+                    <a16:creationId xmlns:a16="http://schemas.microsoft.com/office/drawing/2014/main" xmlns="" id="{798B1F51-1FA4-4199-81C7-62356C936CC9}"/>
                   </a:ext>
                 </a:extLst>
               </p:cNvPr>
@@ -8885,7 +8885,7 @@
               <p:cNvPr id="28" name="Arc 27">
                 <a:extLst>
                   <a:ext uri="{FF2B5EF4-FFF2-40B4-BE49-F238E27FC236}">
-                    <a16:creationId xmlns="" xmlns:a16="http://schemas.microsoft.com/office/drawing/2014/main" id="{40A224C8-1233-40F7-96AB-BFF79AF6CDCB}"/>
+                    <a16:creationId xmlns:a16="http://schemas.microsoft.com/office/drawing/2014/main" xmlns="" id="{40A224C8-1233-40F7-96AB-BFF79AF6CDCB}"/>
                   </a:ext>
                 </a:extLst>
               </p:cNvPr>
@@ -8944,7 +8944,7 @@
               <p:cNvPr id="29" name="Arc 28">
                 <a:extLst>
                   <a:ext uri="{FF2B5EF4-FFF2-40B4-BE49-F238E27FC236}">
-                    <a16:creationId xmlns="" xmlns:a16="http://schemas.microsoft.com/office/drawing/2014/main" id="{B57C7CCC-E218-4321-8C7B-3F0C5753C7A1}"/>
+                    <a16:creationId xmlns:a16="http://schemas.microsoft.com/office/drawing/2014/main" xmlns="" id="{B57C7CCC-E218-4321-8C7B-3F0C5753C7A1}"/>
                   </a:ext>
                 </a:extLst>
               </p:cNvPr>
@@ -9004,7 +9004,7 @@
             <p:cNvPr id="13" name="Rectangle: Rounded Corners 12">
               <a:extLst>
                 <a:ext uri="{FF2B5EF4-FFF2-40B4-BE49-F238E27FC236}">
-                  <a16:creationId xmlns="" xmlns:a16="http://schemas.microsoft.com/office/drawing/2014/main" id="{6AF309CA-A56C-4ABC-B293-420F4EB1A9B4}"/>
+                  <a16:creationId xmlns:a16="http://schemas.microsoft.com/office/drawing/2014/main" xmlns="" id="{6AF309CA-A56C-4ABC-B293-420F4EB1A9B4}"/>
                 </a:ext>
               </a:extLst>
             </p:cNvPr>
@@ -9058,7 +9058,7 @@
             <p:cNvPr id="14" name="Rectangle: Rounded Corners 13">
               <a:extLst>
                 <a:ext uri="{FF2B5EF4-FFF2-40B4-BE49-F238E27FC236}">
-                  <a16:creationId xmlns="" xmlns:a16="http://schemas.microsoft.com/office/drawing/2014/main" id="{07955808-2AC7-44EB-8B6D-82B974E53A3C}"/>
+                  <a16:creationId xmlns:a16="http://schemas.microsoft.com/office/drawing/2014/main" xmlns="" id="{07955808-2AC7-44EB-8B6D-82B974E53A3C}"/>
                 </a:ext>
               </a:extLst>
             </p:cNvPr>
@@ -9119,7 +9119,7 @@
             <p:cNvPr id="15" name="Straight Connector 14">
               <a:extLst>
                 <a:ext uri="{FF2B5EF4-FFF2-40B4-BE49-F238E27FC236}">
-                  <a16:creationId xmlns="" xmlns:a16="http://schemas.microsoft.com/office/drawing/2014/main" id="{AC6420D7-AEAB-45EF-8D46-11EB06E4AFEA}"/>
+                  <a16:creationId xmlns:a16="http://schemas.microsoft.com/office/drawing/2014/main" xmlns="" id="{AC6420D7-AEAB-45EF-8D46-11EB06E4AFEA}"/>
                 </a:ext>
               </a:extLst>
             </p:cNvPr>
@@ -9165,7 +9165,7 @@
             <p:cNvPr id="16" name="Straight Connector 15">
               <a:extLst>
                 <a:ext uri="{FF2B5EF4-FFF2-40B4-BE49-F238E27FC236}">
-                  <a16:creationId xmlns="" xmlns:a16="http://schemas.microsoft.com/office/drawing/2014/main" id="{76C7FABC-6773-44F6-990B-3EB082BE9B35}"/>
+                  <a16:creationId xmlns:a16="http://schemas.microsoft.com/office/drawing/2014/main" xmlns="" id="{76C7FABC-6773-44F6-990B-3EB082BE9B35}"/>
                 </a:ext>
               </a:extLst>
             </p:cNvPr>
@@ -9211,7 +9211,7 @@
             <p:cNvPr id="17" name="Group 16">
               <a:extLst>
                 <a:ext uri="{FF2B5EF4-FFF2-40B4-BE49-F238E27FC236}">
-                  <a16:creationId xmlns="" xmlns:a16="http://schemas.microsoft.com/office/drawing/2014/main" id="{1FAD48E1-DC45-4B3D-9CE5-613250708496}"/>
+                  <a16:creationId xmlns:a16="http://schemas.microsoft.com/office/drawing/2014/main" xmlns="" id="{1FAD48E1-DC45-4B3D-9CE5-613250708496}"/>
                 </a:ext>
               </a:extLst>
             </p:cNvPr>
@@ -9234,7 +9234,7 @@
               <p:cNvPr id="23" name="Straight Connector 22">
                 <a:extLst>
                   <a:ext uri="{FF2B5EF4-FFF2-40B4-BE49-F238E27FC236}">
-                    <a16:creationId xmlns="" xmlns:a16="http://schemas.microsoft.com/office/drawing/2014/main" id="{B01FD1D1-046F-457B-AB63-2702CE3E906E}"/>
+                    <a16:creationId xmlns:a16="http://schemas.microsoft.com/office/drawing/2014/main" xmlns="" id="{B01FD1D1-046F-457B-AB63-2702CE3E906E}"/>
                   </a:ext>
                 </a:extLst>
               </p:cNvPr>
@@ -9278,7 +9278,7 @@
               <p:cNvPr id="24" name="Straight Connector 23">
                 <a:extLst>
                   <a:ext uri="{FF2B5EF4-FFF2-40B4-BE49-F238E27FC236}">
-                    <a16:creationId xmlns="" xmlns:a16="http://schemas.microsoft.com/office/drawing/2014/main" id="{895660C3-C72C-43EE-9C4A-170F85E5BE08}"/>
+                    <a16:creationId xmlns:a16="http://schemas.microsoft.com/office/drawing/2014/main" xmlns="" id="{895660C3-C72C-43EE-9C4A-170F85E5BE08}"/>
                   </a:ext>
                 </a:extLst>
               </p:cNvPr>
@@ -9323,7 +9323,7 @@
             <p:cNvPr id="19" name="Straight Connector 18">
               <a:extLst>
                 <a:ext uri="{FF2B5EF4-FFF2-40B4-BE49-F238E27FC236}">
-                  <a16:creationId xmlns="" xmlns:a16="http://schemas.microsoft.com/office/drawing/2014/main" id="{A74EE503-8FC0-42A6-8860-CA4EE42272E4}"/>
+                  <a16:creationId xmlns:a16="http://schemas.microsoft.com/office/drawing/2014/main" xmlns="" id="{A74EE503-8FC0-42A6-8860-CA4EE42272E4}"/>
                 </a:ext>
               </a:extLst>
             </p:cNvPr>
@@ -9369,7 +9369,7 @@
             <p:cNvPr id="12" name="Rectangle: Rounded Corners 11">
               <a:extLst>
                 <a:ext uri="{FF2B5EF4-FFF2-40B4-BE49-F238E27FC236}">
-                  <a16:creationId xmlns="" xmlns:a16="http://schemas.microsoft.com/office/drawing/2014/main" id="{F4189FDA-9FE8-490B-8A70-2E941811021F}"/>
+                  <a16:creationId xmlns:a16="http://schemas.microsoft.com/office/drawing/2014/main" xmlns="" id="{F4189FDA-9FE8-490B-8A70-2E941811021F}"/>
                 </a:ext>
               </a:extLst>
             </p:cNvPr>
@@ -9423,7 +9423,7 @@
             <p:cNvPr id="18" name="Group 17">
               <a:extLst>
                 <a:ext uri="{FF2B5EF4-FFF2-40B4-BE49-F238E27FC236}">
-                  <a16:creationId xmlns="" xmlns:a16="http://schemas.microsoft.com/office/drawing/2014/main" id="{FDA3EFCD-0DF8-419D-8533-D781521E597E}"/>
+                  <a16:creationId xmlns:a16="http://schemas.microsoft.com/office/drawing/2014/main" xmlns="" id="{FDA3EFCD-0DF8-419D-8533-D781521E597E}"/>
                 </a:ext>
               </a:extLst>
             </p:cNvPr>
@@ -9446,7 +9446,7 @@
               <p:cNvPr id="21" name="Straight Connector 20">
                 <a:extLst>
                   <a:ext uri="{FF2B5EF4-FFF2-40B4-BE49-F238E27FC236}">
-                    <a16:creationId xmlns="" xmlns:a16="http://schemas.microsoft.com/office/drawing/2014/main" id="{C3CC6A5A-182E-4A09-9C04-EB191881D789}"/>
+                    <a16:creationId xmlns:a16="http://schemas.microsoft.com/office/drawing/2014/main" xmlns="" id="{C3CC6A5A-182E-4A09-9C04-EB191881D789}"/>
                   </a:ext>
                 </a:extLst>
               </p:cNvPr>
@@ -9490,7 +9490,7 @@
               <p:cNvPr id="22" name="Straight Connector 21">
                 <a:extLst>
                   <a:ext uri="{FF2B5EF4-FFF2-40B4-BE49-F238E27FC236}">
-                    <a16:creationId xmlns="" xmlns:a16="http://schemas.microsoft.com/office/drawing/2014/main" id="{440C8953-0555-48CC-8255-78F17E053EE7}"/>
+                    <a16:creationId xmlns:a16="http://schemas.microsoft.com/office/drawing/2014/main" xmlns="" id="{440C8953-0555-48CC-8255-78F17E053EE7}"/>
                   </a:ext>
                 </a:extLst>
               </p:cNvPr>
@@ -9536,7 +9536,7 @@
           <p:cNvPr id="34" name="Straight Connector 33">
             <a:extLst>
               <a:ext uri="{FF2B5EF4-FFF2-40B4-BE49-F238E27FC236}">
-                <a16:creationId xmlns="" xmlns:a16="http://schemas.microsoft.com/office/drawing/2014/main" id="{29B538CA-8CCB-43FB-B5E5-5FC04EBC1F54}"/>
+                <a16:creationId xmlns:a16="http://schemas.microsoft.com/office/drawing/2014/main" xmlns="" id="{29B538CA-8CCB-43FB-B5E5-5FC04EBC1F54}"/>
               </a:ext>
             </a:extLst>
           </p:cNvPr>
@@ -9581,7 +9581,7 @@
     </p:spTree>
     <p:extLst>
       <p:ext uri="{BB962C8B-B14F-4D97-AF65-F5344CB8AC3E}">
-        <p14:creationId xmlns="" xmlns:p14="http://schemas.microsoft.com/office/powerpoint/2010/main" val="743545348"/>
+        <p14:creationId xmlns:p14="http://schemas.microsoft.com/office/powerpoint/2010/main" xmlns="" val="743545348"/>
       </p:ext>
     </p:extLst>
   </p:cSld>
@@ -9589,7 +9589,7 @@
     <a:masterClrMapping/>
   </p:clrMapOvr>
   <mc:AlternateContent xmlns:mc="http://schemas.openxmlformats.org/markup-compatibility/2006">
-    <mc:Choice xmlns="" xmlns:p14="http://schemas.microsoft.com/office/powerpoint/2010/main" Requires="p14">
+    <mc:Choice xmlns:p14="http://schemas.microsoft.com/office/powerpoint/2010/main" xmlns="" Requires="p14">
       <p:transition spd="slow" p14:dur="2000" advClick="0" advTm="5000"/>
     </mc:Choice>
     <mc:Fallback>
@@ -9621,7 +9621,7 @@
           <p:cNvPr id="9" name="Slide Number">
             <a:extLst>
               <a:ext uri="{FF2B5EF4-FFF2-40B4-BE49-F238E27FC236}">
-                <a16:creationId xmlns="" xmlns:a16="http://schemas.microsoft.com/office/drawing/2014/main" id="{1865BF6B-7F07-4E9C-879F-80E36EEB3405}"/>
+                <a16:creationId xmlns:a16="http://schemas.microsoft.com/office/drawing/2014/main" xmlns="" id="{1865BF6B-7F07-4E9C-879F-80E36EEB3405}"/>
               </a:ext>
             </a:extLst>
           </p:cNvPr>
@@ -9663,7 +9663,7 @@
           <p:cNvPr id="12" name="Rectangle Left">
             <a:extLst>
               <a:ext uri="{FF2B5EF4-FFF2-40B4-BE49-F238E27FC236}">
-                <a16:creationId xmlns="" xmlns:a16="http://schemas.microsoft.com/office/drawing/2014/main" id="{345FB1C8-7F66-4D5C-ACCE-AE919936BCFD}"/>
+                <a16:creationId xmlns:a16="http://schemas.microsoft.com/office/drawing/2014/main" xmlns="" id="{345FB1C8-7F66-4D5C-ACCE-AE919936BCFD}"/>
               </a:ext>
             </a:extLst>
           </p:cNvPr>
@@ -9744,7 +9744,7 @@
           <p:cNvPr id="15" name="Slide Body Text">
             <a:extLst>
               <a:ext uri="{FF2B5EF4-FFF2-40B4-BE49-F238E27FC236}">
-                <a16:creationId xmlns="" xmlns:a16="http://schemas.microsoft.com/office/drawing/2014/main" id="{6157C8DE-E0AF-422B-BBB1-F0AF1264B5E9}"/>
+                <a16:creationId xmlns:a16="http://schemas.microsoft.com/office/drawing/2014/main" xmlns="" id="{6157C8DE-E0AF-422B-BBB1-F0AF1264B5E9}"/>
               </a:ext>
             </a:extLst>
           </p:cNvPr>
@@ -9842,7 +9842,7 @@
           <p:cNvPr id="16" name="Logo Software University" descr="Software University logo">
             <a:extLst>
               <a:ext uri="{FF2B5EF4-FFF2-40B4-BE49-F238E27FC236}">
-                <a16:creationId xmlns="" xmlns:a16="http://schemas.microsoft.com/office/drawing/2014/main" id="{EFEBB553-EACE-4B4F-8B4F-7629FDD910A4}"/>
+                <a16:creationId xmlns:a16="http://schemas.microsoft.com/office/drawing/2014/main" xmlns="" id="{EFEBB553-EACE-4B4F-8B4F-7629FDD910A4}"/>
               </a:ext>
             </a:extLst>
           </p:cNvPr>
@@ -9865,7 +9865,7 @@
             </a:clrChange>
             <a:extLst>
               <a:ext uri="{28A0092B-C50C-407E-A947-70E740481C1C}">
-                <a14:useLocalDpi xmlns="" xmlns:a14="http://schemas.microsoft.com/office/drawing/2010/main" val="0"/>
+                <a14:useLocalDpi xmlns:a14="http://schemas.microsoft.com/office/drawing/2010/main" xmlns="" val="0"/>
               </a:ext>
             </a:extLst>
           </a:blip>
@@ -9888,7 +9888,7 @@
           <p:cNvPr id="13" name="Slide Title">
             <a:extLst>
               <a:ext uri="{FF2B5EF4-FFF2-40B4-BE49-F238E27FC236}">
-                <a16:creationId xmlns="" xmlns:a16="http://schemas.microsoft.com/office/drawing/2014/main" id="{0D5CC956-5C4A-44BE-8F8B-327FAFA51E97}"/>
+                <a16:creationId xmlns:a16="http://schemas.microsoft.com/office/drawing/2014/main" xmlns="" id="{0D5CC956-5C4A-44BE-8F8B-327FAFA51E97}"/>
               </a:ext>
             </a:extLst>
           </p:cNvPr>
@@ -9925,7 +9925,7 @@
           <p:cNvPr id="33" name="Group 32">
             <a:extLst>
               <a:ext uri="{FF2B5EF4-FFF2-40B4-BE49-F238E27FC236}">
-                <a16:creationId xmlns="" xmlns:a16="http://schemas.microsoft.com/office/drawing/2014/main" id="{7CF60135-47AA-48F0-96BA-0E795668ABDB}"/>
+                <a16:creationId xmlns:a16="http://schemas.microsoft.com/office/drawing/2014/main" xmlns="" id="{7CF60135-47AA-48F0-96BA-0E795668ABDB}"/>
               </a:ext>
             </a:extLst>
           </p:cNvPr>
@@ -9945,7 +9945,7 @@
             <p:cNvPr id="34" name="Group 33">
               <a:extLst>
                 <a:ext uri="{FF2B5EF4-FFF2-40B4-BE49-F238E27FC236}">
-                  <a16:creationId xmlns="" xmlns:a16="http://schemas.microsoft.com/office/drawing/2014/main" id="{2823380E-3936-41AF-BDF7-DA54D75BBF6B}"/>
+                  <a16:creationId xmlns:a16="http://schemas.microsoft.com/office/drawing/2014/main" xmlns="" id="{2823380E-3936-41AF-BDF7-DA54D75BBF6B}"/>
                 </a:ext>
               </a:extLst>
             </p:cNvPr>
@@ -9965,7 +9965,7 @@
               <p:cNvPr id="47" name="Oval 46">
                 <a:extLst>
                   <a:ext uri="{FF2B5EF4-FFF2-40B4-BE49-F238E27FC236}">
-                    <a16:creationId xmlns="" xmlns:a16="http://schemas.microsoft.com/office/drawing/2014/main" id="{52B047D9-D8DD-45C7-9BC8-6D4F682F5182}"/>
+                    <a16:creationId xmlns:a16="http://schemas.microsoft.com/office/drawing/2014/main" xmlns="" id="{52B047D9-D8DD-45C7-9BC8-6D4F682F5182}"/>
                   </a:ext>
                 </a:extLst>
               </p:cNvPr>
@@ -10017,7 +10017,7 @@
               <p:cNvPr id="48" name="Rectangle 5">
                 <a:extLst>
                   <a:ext uri="{FF2B5EF4-FFF2-40B4-BE49-F238E27FC236}">
-                    <a16:creationId xmlns="" xmlns:a16="http://schemas.microsoft.com/office/drawing/2014/main" id="{4D84FE51-BD8E-47EA-9463-CE02FEA31766}"/>
+                    <a16:creationId xmlns:a16="http://schemas.microsoft.com/office/drawing/2014/main" xmlns="" id="{4D84FE51-BD8E-47EA-9463-CE02FEA31766}"/>
                   </a:ext>
                 </a:extLst>
               </p:cNvPr>
@@ -10162,7 +10162,7 @@
               <p:cNvPr id="49" name="Rectangle 5">
                 <a:extLst>
                   <a:ext uri="{FF2B5EF4-FFF2-40B4-BE49-F238E27FC236}">
-                    <a16:creationId xmlns="" xmlns:a16="http://schemas.microsoft.com/office/drawing/2014/main" id="{F5C8F037-C197-4219-AC87-3A81763512BC}"/>
+                    <a16:creationId xmlns:a16="http://schemas.microsoft.com/office/drawing/2014/main" xmlns="" id="{F5C8F037-C197-4219-AC87-3A81763512BC}"/>
                   </a:ext>
                 </a:extLst>
               </p:cNvPr>
@@ -10307,7 +10307,7 @@
               <p:cNvPr id="50" name="Arc 49">
                 <a:extLst>
                   <a:ext uri="{FF2B5EF4-FFF2-40B4-BE49-F238E27FC236}">
-                    <a16:creationId xmlns="" xmlns:a16="http://schemas.microsoft.com/office/drawing/2014/main" id="{786EE401-CF8E-439B-94A0-EE6F3A7D5798}"/>
+                    <a16:creationId xmlns:a16="http://schemas.microsoft.com/office/drawing/2014/main" xmlns="" id="{786EE401-CF8E-439B-94A0-EE6F3A7D5798}"/>
                   </a:ext>
                 </a:extLst>
               </p:cNvPr>
@@ -10366,7 +10366,7 @@
               <p:cNvPr id="51" name="Arc 50">
                 <a:extLst>
                   <a:ext uri="{FF2B5EF4-FFF2-40B4-BE49-F238E27FC236}">
-                    <a16:creationId xmlns="" xmlns:a16="http://schemas.microsoft.com/office/drawing/2014/main" id="{8D9ACD38-B3EB-4A63-9730-CBF0501BF235}"/>
+                    <a16:creationId xmlns:a16="http://schemas.microsoft.com/office/drawing/2014/main" xmlns="" id="{8D9ACD38-B3EB-4A63-9730-CBF0501BF235}"/>
                   </a:ext>
                 </a:extLst>
               </p:cNvPr>
@@ -10426,7 +10426,7 @@
             <p:cNvPr id="35" name="Rectangle: Rounded Corners 34">
               <a:extLst>
                 <a:ext uri="{FF2B5EF4-FFF2-40B4-BE49-F238E27FC236}">
-                  <a16:creationId xmlns="" xmlns:a16="http://schemas.microsoft.com/office/drawing/2014/main" id="{64EE493E-A353-4C75-A3B9-D48ABA2C57CC}"/>
+                  <a16:creationId xmlns:a16="http://schemas.microsoft.com/office/drawing/2014/main" xmlns="" id="{64EE493E-A353-4C75-A3B9-D48ABA2C57CC}"/>
                 </a:ext>
               </a:extLst>
             </p:cNvPr>
@@ -10480,7 +10480,7 @@
             <p:cNvPr id="36" name="Rectangle: Rounded Corners 35">
               <a:extLst>
                 <a:ext uri="{FF2B5EF4-FFF2-40B4-BE49-F238E27FC236}">
-                  <a16:creationId xmlns="" xmlns:a16="http://schemas.microsoft.com/office/drawing/2014/main" id="{718408B9-204E-42E3-9E79-33E047E869BC}"/>
+                  <a16:creationId xmlns:a16="http://schemas.microsoft.com/office/drawing/2014/main" xmlns="" id="{718408B9-204E-42E3-9E79-33E047E869BC}"/>
                 </a:ext>
               </a:extLst>
             </p:cNvPr>
@@ -10541,7 +10541,7 @@
             <p:cNvPr id="37" name="Straight Connector 36">
               <a:extLst>
                 <a:ext uri="{FF2B5EF4-FFF2-40B4-BE49-F238E27FC236}">
-                  <a16:creationId xmlns="" xmlns:a16="http://schemas.microsoft.com/office/drawing/2014/main" id="{0AB66D97-DF6F-4CD2-AF13-42B5C852F673}"/>
+                  <a16:creationId xmlns:a16="http://schemas.microsoft.com/office/drawing/2014/main" xmlns="" id="{0AB66D97-DF6F-4CD2-AF13-42B5C852F673}"/>
                 </a:ext>
               </a:extLst>
             </p:cNvPr>
@@ -10587,7 +10587,7 @@
             <p:cNvPr id="38" name="Straight Connector 37">
               <a:extLst>
                 <a:ext uri="{FF2B5EF4-FFF2-40B4-BE49-F238E27FC236}">
-                  <a16:creationId xmlns="" xmlns:a16="http://schemas.microsoft.com/office/drawing/2014/main" id="{F2AFBA69-C196-4703-8AAB-5F72A8EDCEB5}"/>
+                  <a16:creationId xmlns:a16="http://schemas.microsoft.com/office/drawing/2014/main" xmlns="" id="{F2AFBA69-C196-4703-8AAB-5F72A8EDCEB5}"/>
                 </a:ext>
               </a:extLst>
             </p:cNvPr>
@@ -10633,7 +10633,7 @@
             <p:cNvPr id="39" name="Group 38">
               <a:extLst>
                 <a:ext uri="{FF2B5EF4-FFF2-40B4-BE49-F238E27FC236}">
-                  <a16:creationId xmlns="" xmlns:a16="http://schemas.microsoft.com/office/drawing/2014/main" id="{9AFC66C1-0C1C-4332-9C4E-782574C896B8}"/>
+                  <a16:creationId xmlns:a16="http://schemas.microsoft.com/office/drawing/2014/main" xmlns="" id="{9AFC66C1-0C1C-4332-9C4E-782574C896B8}"/>
                 </a:ext>
               </a:extLst>
             </p:cNvPr>
@@ -10656,7 +10656,7 @@
               <p:cNvPr id="45" name="Straight Connector 44">
                 <a:extLst>
                   <a:ext uri="{FF2B5EF4-FFF2-40B4-BE49-F238E27FC236}">
-                    <a16:creationId xmlns="" xmlns:a16="http://schemas.microsoft.com/office/drawing/2014/main" id="{872CA8AD-EAF6-40BE-9DDE-ECDB4A980CA5}"/>
+                    <a16:creationId xmlns:a16="http://schemas.microsoft.com/office/drawing/2014/main" xmlns="" id="{872CA8AD-EAF6-40BE-9DDE-ECDB4A980CA5}"/>
                   </a:ext>
                 </a:extLst>
               </p:cNvPr>
@@ -10700,7 +10700,7 @@
               <p:cNvPr id="46" name="Straight Connector 45">
                 <a:extLst>
                   <a:ext uri="{FF2B5EF4-FFF2-40B4-BE49-F238E27FC236}">
-                    <a16:creationId xmlns="" xmlns:a16="http://schemas.microsoft.com/office/drawing/2014/main" id="{57DD3EC7-1A13-4AFE-BD6F-DA12C281FAFB}"/>
+                    <a16:creationId xmlns:a16="http://schemas.microsoft.com/office/drawing/2014/main" xmlns="" id="{57DD3EC7-1A13-4AFE-BD6F-DA12C281FAFB}"/>
                   </a:ext>
                 </a:extLst>
               </p:cNvPr>
@@ -10745,7 +10745,7 @@
             <p:cNvPr id="40" name="Straight Connector 39">
               <a:extLst>
                 <a:ext uri="{FF2B5EF4-FFF2-40B4-BE49-F238E27FC236}">
-                  <a16:creationId xmlns="" xmlns:a16="http://schemas.microsoft.com/office/drawing/2014/main" id="{E46151FA-19E9-4E84-A082-EDAC6F76EA9D}"/>
+                  <a16:creationId xmlns:a16="http://schemas.microsoft.com/office/drawing/2014/main" xmlns="" id="{E46151FA-19E9-4E84-A082-EDAC6F76EA9D}"/>
                 </a:ext>
               </a:extLst>
             </p:cNvPr>
@@ -10791,7 +10791,7 @@
             <p:cNvPr id="41" name="Rectangle: Rounded Corners 40">
               <a:extLst>
                 <a:ext uri="{FF2B5EF4-FFF2-40B4-BE49-F238E27FC236}">
-                  <a16:creationId xmlns="" xmlns:a16="http://schemas.microsoft.com/office/drawing/2014/main" id="{3423EEF0-5B70-4091-B2DA-0740D2609643}"/>
+                  <a16:creationId xmlns:a16="http://schemas.microsoft.com/office/drawing/2014/main" xmlns="" id="{3423EEF0-5B70-4091-B2DA-0740D2609643}"/>
                 </a:ext>
               </a:extLst>
             </p:cNvPr>
@@ -10845,7 +10845,7 @@
             <p:cNvPr id="42" name="Group 41">
               <a:extLst>
                 <a:ext uri="{FF2B5EF4-FFF2-40B4-BE49-F238E27FC236}">
-                  <a16:creationId xmlns="" xmlns:a16="http://schemas.microsoft.com/office/drawing/2014/main" id="{49A8AAA7-98E7-4224-B027-830FFCC285A3}"/>
+                  <a16:creationId xmlns:a16="http://schemas.microsoft.com/office/drawing/2014/main" xmlns="" id="{49A8AAA7-98E7-4224-B027-830FFCC285A3}"/>
                 </a:ext>
               </a:extLst>
             </p:cNvPr>
@@ -10868,7 +10868,7 @@
               <p:cNvPr id="43" name="Straight Connector 42">
                 <a:extLst>
                   <a:ext uri="{FF2B5EF4-FFF2-40B4-BE49-F238E27FC236}">
-                    <a16:creationId xmlns="" xmlns:a16="http://schemas.microsoft.com/office/drawing/2014/main" id="{2129EC38-471E-4685-973E-BA7A7F567C42}"/>
+                    <a16:creationId xmlns:a16="http://schemas.microsoft.com/office/drawing/2014/main" xmlns="" id="{2129EC38-471E-4685-973E-BA7A7F567C42}"/>
                   </a:ext>
                 </a:extLst>
               </p:cNvPr>
@@ -10912,7 +10912,7 @@
               <p:cNvPr id="44" name="Straight Connector 43">
                 <a:extLst>
                   <a:ext uri="{FF2B5EF4-FFF2-40B4-BE49-F238E27FC236}">
-                    <a16:creationId xmlns="" xmlns:a16="http://schemas.microsoft.com/office/drawing/2014/main" id="{678142BE-84C9-4834-B6CC-6623E401661C}"/>
+                    <a16:creationId xmlns:a16="http://schemas.microsoft.com/office/drawing/2014/main" xmlns="" id="{678142BE-84C9-4834-B6CC-6623E401661C}"/>
                   </a:ext>
                 </a:extLst>
               </p:cNvPr>
@@ -10956,7 +10956,7 @@
     </p:spTree>
     <p:extLst>
       <p:ext uri="{BB962C8B-B14F-4D97-AF65-F5344CB8AC3E}">
-        <p14:creationId xmlns="" xmlns:p14="http://schemas.microsoft.com/office/powerpoint/2010/main" val="1679651758"/>
+        <p14:creationId xmlns:p14="http://schemas.microsoft.com/office/powerpoint/2010/main" xmlns="" val="1679651758"/>
       </p:ext>
     </p:extLst>
   </p:cSld>
@@ -10964,7 +10964,7 @@
     <a:masterClrMapping/>
   </p:clrMapOvr>
   <mc:AlternateContent xmlns:mc="http://schemas.openxmlformats.org/markup-compatibility/2006">
-    <mc:Choice xmlns="" xmlns:p14="http://schemas.microsoft.com/office/powerpoint/2010/main" Requires="p14">
+    <mc:Choice xmlns:p14="http://schemas.microsoft.com/office/powerpoint/2010/main" xmlns="" Requires="p14">
       <p:transition spd="slow" p14:dur="2000" advClick="0" advTm="5000"/>
     </mc:Choice>
     <mc:Fallback>
@@ -10996,7 +10996,7 @@
           <p:cNvPr id="5" name="Slide Number">
             <a:extLst>
               <a:ext uri="{FF2B5EF4-FFF2-40B4-BE49-F238E27FC236}">
-                <a16:creationId xmlns="" xmlns:a16="http://schemas.microsoft.com/office/drawing/2014/main" id="{F0B8C963-1813-4B69-AD27-6D02EBBBB569}"/>
+                <a16:creationId xmlns:a16="http://schemas.microsoft.com/office/drawing/2014/main" xmlns="" id="{F0B8C963-1813-4B69-AD27-6D02EBBBB569}"/>
               </a:ext>
             </a:extLst>
           </p:cNvPr>
@@ -11038,7 +11038,7 @@
           <p:cNvPr id="3" name="Rectangle Left">
             <a:extLst>
               <a:ext uri="{FF2B5EF4-FFF2-40B4-BE49-F238E27FC236}">
-                <a16:creationId xmlns="" xmlns:a16="http://schemas.microsoft.com/office/drawing/2014/main" id="{345FB1C8-7F66-4D5C-ACCE-AE919936BCFD}"/>
+                <a16:creationId xmlns:a16="http://schemas.microsoft.com/office/drawing/2014/main" xmlns="" id="{345FB1C8-7F66-4D5C-ACCE-AE919936BCFD}"/>
               </a:ext>
             </a:extLst>
           </p:cNvPr>
@@ -11119,7 +11119,7 @@
           <p:cNvPr id="7" name="Slide Body Text">
             <a:extLst>
               <a:ext uri="{FF2B5EF4-FFF2-40B4-BE49-F238E27FC236}">
-                <a16:creationId xmlns="" xmlns:a16="http://schemas.microsoft.com/office/drawing/2014/main" id="{7296EDA7-D37D-4B31-A888-371F0804124F}"/>
+                <a16:creationId xmlns:a16="http://schemas.microsoft.com/office/drawing/2014/main" xmlns="" id="{7296EDA7-D37D-4B31-A888-371F0804124F}"/>
               </a:ext>
             </a:extLst>
           </p:cNvPr>
@@ -11217,7 +11217,7 @@
           <p:cNvPr id="6" name="Slide Title">
             <a:extLst>
               <a:ext uri="{FF2B5EF4-FFF2-40B4-BE49-F238E27FC236}">
-                <a16:creationId xmlns="" xmlns:a16="http://schemas.microsoft.com/office/drawing/2014/main" id="{55A88B09-3557-48A3-BF27-42699C269215}"/>
+                <a16:creationId xmlns:a16="http://schemas.microsoft.com/office/drawing/2014/main" xmlns="" id="{55A88B09-3557-48A3-BF27-42699C269215}"/>
               </a:ext>
             </a:extLst>
           </p:cNvPr>
@@ -11254,7 +11254,7 @@
           <p:cNvPr id="28" name="Group 27">
             <a:extLst>
               <a:ext uri="{FF2B5EF4-FFF2-40B4-BE49-F238E27FC236}">
-                <a16:creationId xmlns="" xmlns:a16="http://schemas.microsoft.com/office/drawing/2014/main" id="{C4248838-4E67-439E-AE0A-0043D2CB04D6}"/>
+                <a16:creationId xmlns:a16="http://schemas.microsoft.com/office/drawing/2014/main" xmlns="" id="{C4248838-4E67-439E-AE0A-0043D2CB04D6}"/>
               </a:ext>
             </a:extLst>
           </p:cNvPr>
@@ -11274,7 +11274,7 @@
             <p:cNvPr id="29" name="Group 28">
               <a:extLst>
                 <a:ext uri="{FF2B5EF4-FFF2-40B4-BE49-F238E27FC236}">
-                  <a16:creationId xmlns="" xmlns:a16="http://schemas.microsoft.com/office/drawing/2014/main" id="{810CFD6A-2427-49D5-846A-5F93601D4184}"/>
+                  <a16:creationId xmlns:a16="http://schemas.microsoft.com/office/drawing/2014/main" xmlns="" id="{810CFD6A-2427-49D5-846A-5F93601D4184}"/>
                 </a:ext>
               </a:extLst>
             </p:cNvPr>
@@ -11294,7 +11294,7 @@
               <p:cNvPr id="42" name="Oval 41">
                 <a:extLst>
                   <a:ext uri="{FF2B5EF4-FFF2-40B4-BE49-F238E27FC236}">
-                    <a16:creationId xmlns="" xmlns:a16="http://schemas.microsoft.com/office/drawing/2014/main" id="{017B1AE5-5C36-4839-BA1F-B404EA44E701}"/>
+                    <a16:creationId xmlns:a16="http://schemas.microsoft.com/office/drawing/2014/main" xmlns="" id="{017B1AE5-5C36-4839-BA1F-B404EA44E701}"/>
                   </a:ext>
                 </a:extLst>
               </p:cNvPr>
@@ -11346,7 +11346,7 @@
               <p:cNvPr id="43" name="Rectangle 5">
                 <a:extLst>
                   <a:ext uri="{FF2B5EF4-FFF2-40B4-BE49-F238E27FC236}">
-                    <a16:creationId xmlns="" xmlns:a16="http://schemas.microsoft.com/office/drawing/2014/main" id="{FB963D79-BB49-4A1D-BA66-EA0670C79BAE}"/>
+                    <a16:creationId xmlns:a16="http://schemas.microsoft.com/office/drawing/2014/main" xmlns="" id="{FB963D79-BB49-4A1D-BA66-EA0670C79BAE}"/>
                   </a:ext>
                 </a:extLst>
               </p:cNvPr>
@@ -11491,7 +11491,7 @@
               <p:cNvPr id="44" name="Rectangle 5">
                 <a:extLst>
                   <a:ext uri="{FF2B5EF4-FFF2-40B4-BE49-F238E27FC236}">
-                    <a16:creationId xmlns="" xmlns:a16="http://schemas.microsoft.com/office/drawing/2014/main" id="{6D7746D8-B913-493B-AAE9-25BC6893D40E}"/>
+                    <a16:creationId xmlns:a16="http://schemas.microsoft.com/office/drawing/2014/main" xmlns="" id="{6D7746D8-B913-493B-AAE9-25BC6893D40E}"/>
                   </a:ext>
                 </a:extLst>
               </p:cNvPr>
@@ -11636,7 +11636,7 @@
               <p:cNvPr id="45" name="Arc 44">
                 <a:extLst>
                   <a:ext uri="{FF2B5EF4-FFF2-40B4-BE49-F238E27FC236}">
-                    <a16:creationId xmlns="" xmlns:a16="http://schemas.microsoft.com/office/drawing/2014/main" id="{29031C02-E965-417B-8799-96061B14F30D}"/>
+                    <a16:creationId xmlns:a16="http://schemas.microsoft.com/office/drawing/2014/main" xmlns="" id="{29031C02-E965-417B-8799-96061B14F30D}"/>
                   </a:ext>
                 </a:extLst>
               </p:cNvPr>
@@ -11695,7 +11695,7 @@
               <p:cNvPr id="46" name="Arc 45">
                 <a:extLst>
                   <a:ext uri="{FF2B5EF4-FFF2-40B4-BE49-F238E27FC236}">
-                    <a16:creationId xmlns="" xmlns:a16="http://schemas.microsoft.com/office/drawing/2014/main" id="{26BFD8A6-BC99-4B16-BA10-08A9E5C681C0}"/>
+                    <a16:creationId xmlns:a16="http://schemas.microsoft.com/office/drawing/2014/main" xmlns="" id="{26BFD8A6-BC99-4B16-BA10-08A9E5C681C0}"/>
                   </a:ext>
                 </a:extLst>
               </p:cNvPr>
@@ -11755,7 +11755,7 @@
             <p:cNvPr id="30" name="Rectangle: Rounded Corners 29">
               <a:extLst>
                 <a:ext uri="{FF2B5EF4-FFF2-40B4-BE49-F238E27FC236}">
-                  <a16:creationId xmlns="" xmlns:a16="http://schemas.microsoft.com/office/drawing/2014/main" id="{B310277F-A78E-4FB9-9EA9-88BE4F1D585B}"/>
+                  <a16:creationId xmlns:a16="http://schemas.microsoft.com/office/drawing/2014/main" xmlns="" id="{B310277F-A78E-4FB9-9EA9-88BE4F1D585B}"/>
                 </a:ext>
               </a:extLst>
             </p:cNvPr>
@@ -11809,7 +11809,7 @@
             <p:cNvPr id="31" name="Rectangle: Rounded Corners 30">
               <a:extLst>
                 <a:ext uri="{FF2B5EF4-FFF2-40B4-BE49-F238E27FC236}">
-                  <a16:creationId xmlns="" xmlns:a16="http://schemas.microsoft.com/office/drawing/2014/main" id="{A92CF92B-C212-4542-83AE-A0058B5BB5EA}"/>
+                  <a16:creationId xmlns:a16="http://schemas.microsoft.com/office/drawing/2014/main" xmlns="" id="{A92CF92B-C212-4542-83AE-A0058B5BB5EA}"/>
                 </a:ext>
               </a:extLst>
             </p:cNvPr>
@@ -11870,7 +11870,7 @@
             <p:cNvPr id="32" name="Straight Connector 31">
               <a:extLst>
                 <a:ext uri="{FF2B5EF4-FFF2-40B4-BE49-F238E27FC236}">
-                  <a16:creationId xmlns="" xmlns:a16="http://schemas.microsoft.com/office/drawing/2014/main" id="{563B4374-5C0D-461F-B3BD-78D99614D365}"/>
+                  <a16:creationId xmlns:a16="http://schemas.microsoft.com/office/drawing/2014/main" xmlns="" id="{563B4374-5C0D-461F-B3BD-78D99614D365}"/>
                 </a:ext>
               </a:extLst>
             </p:cNvPr>
@@ -11916,7 +11916,7 @@
             <p:cNvPr id="33" name="Straight Connector 32">
               <a:extLst>
                 <a:ext uri="{FF2B5EF4-FFF2-40B4-BE49-F238E27FC236}">
-                  <a16:creationId xmlns="" xmlns:a16="http://schemas.microsoft.com/office/drawing/2014/main" id="{FBC6FDE7-AEA1-4230-8433-4C088A0FF5F9}"/>
+                  <a16:creationId xmlns:a16="http://schemas.microsoft.com/office/drawing/2014/main" xmlns="" id="{FBC6FDE7-AEA1-4230-8433-4C088A0FF5F9}"/>
                 </a:ext>
               </a:extLst>
             </p:cNvPr>
@@ -11962,7 +11962,7 @@
             <p:cNvPr id="34" name="Group 33">
               <a:extLst>
                 <a:ext uri="{FF2B5EF4-FFF2-40B4-BE49-F238E27FC236}">
-                  <a16:creationId xmlns="" xmlns:a16="http://schemas.microsoft.com/office/drawing/2014/main" id="{C4D1021D-07C7-4331-8FF6-36980A30978B}"/>
+                  <a16:creationId xmlns:a16="http://schemas.microsoft.com/office/drawing/2014/main" xmlns="" id="{C4D1021D-07C7-4331-8FF6-36980A30978B}"/>
                 </a:ext>
               </a:extLst>
             </p:cNvPr>
@@ -11985,7 +11985,7 @@
               <p:cNvPr id="40" name="Straight Connector 39">
                 <a:extLst>
                   <a:ext uri="{FF2B5EF4-FFF2-40B4-BE49-F238E27FC236}">
-                    <a16:creationId xmlns="" xmlns:a16="http://schemas.microsoft.com/office/drawing/2014/main" id="{13B7FE99-95CF-45D5-966B-87A979B93431}"/>
+                    <a16:creationId xmlns:a16="http://schemas.microsoft.com/office/drawing/2014/main" xmlns="" id="{13B7FE99-95CF-45D5-966B-87A979B93431}"/>
                   </a:ext>
                 </a:extLst>
               </p:cNvPr>
@@ -12029,7 +12029,7 @@
               <p:cNvPr id="41" name="Straight Connector 40">
                 <a:extLst>
                   <a:ext uri="{FF2B5EF4-FFF2-40B4-BE49-F238E27FC236}">
-                    <a16:creationId xmlns="" xmlns:a16="http://schemas.microsoft.com/office/drawing/2014/main" id="{71BBA69B-19FF-4ADB-A739-AD8136A5F0A6}"/>
+                    <a16:creationId xmlns:a16="http://schemas.microsoft.com/office/drawing/2014/main" xmlns="" id="{71BBA69B-19FF-4ADB-A739-AD8136A5F0A6}"/>
                   </a:ext>
                 </a:extLst>
               </p:cNvPr>
@@ -12074,7 +12074,7 @@
             <p:cNvPr id="35" name="Straight Connector 34">
               <a:extLst>
                 <a:ext uri="{FF2B5EF4-FFF2-40B4-BE49-F238E27FC236}">
-                  <a16:creationId xmlns="" xmlns:a16="http://schemas.microsoft.com/office/drawing/2014/main" id="{BFD1D86B-562B-40B2-8E46-34233EFEE7FC}"/>
+                  <a16:creationId xmlns:a16="http://schemas.microsoft.com/office/drawing/2014/main" xmlns="" id="{BFD1D86B-562B-40B2-8E46-34233EFEE7FC}"/>
                 </a:ext>
               </a:extLst>
             </p:cNvPr>
@@ -12120,7 +12120,7 @@
             <p:cNvPr id="36" name="Rectangle: Rounded Corners 35">
               <a:extLst>
                 <a:ext uri="{FF2B5EF4-FFF2-40B4-BE49-F238E27FC236}">
-                  <a16:creationId xmlns="" xmlns:a16="http://schemas.microsoft.com/office/drawing/2014/main" id="{388C17BD-16A1-43C5-BFFA-2FF9174719E1}"/>
+                  <a16:creationId xmlns:a16="http://schemas.microsoft.com/office/drawing/2014/main" xmlns="" id="{388C17BD-16A1-43C5-BFFA-2FF9174719E1}"/>
                 </a:ext>
               </a:extLst>
             </p:cNvPr>
@@ -12174,7 +12174,7 @@
             <p:cNvPr id="37" name="Group 36">
               <a:extLst>
                 <a:ext uri="{FF2B5EF4-FFF2-40B4-BE49-F238E27FC236}">
-                  <a16:creationId xmlns="" xmlns:a16="http://schemas.microsoft.com/office/drawing/2014/main" id="{1B3B910E-ACFC-4F28-8E28-F02E1588B87E}"/>
+                  <a16:creationId xmlns:a16="http://schemas.microsoft.com/office/drawing/2014/main" xmlns="" id="{1B3B910E-ACFC-4F28-8E28-F02E1588B87E}"/>
                 </a:ext>
               </a:extLst>
             </p:cNvPr>
@@ -12197,7 +12197,7 @@
               <p:cNvPr id="38" name="Straight Connector 37">
                 <a:extLst>
                   <a:ext uri="{FF2B5EF4-FFF2-40B4-BE49-F238E27FC236}">
-                    <a16:creationId xmlns="" xmlns:a16="http://schemas.microsoft.com/office/drawing/2014/main" id="{F57772B6-06C0-4F54-AA94-D3F92DA4716A}"/>
+                    <a16:creationId xmlns:a16="http://schemas.microsoft.com/office/drawing/2014/main" xmlns="" id="{F57772B6-06C0-4F54-AA94-D3F92DA4716A}"/>
                   </a:ext>
                 </a:extLst>
               </p:cNvPr>
@@ -12241,7 +12241,7 @@
               <p:cNvPr id="39" name="Straight Connector 38">
                 <a:extLst>
                   <a:ext uri="{FF2B5EF4-FFF2-40B4-BE49-F238E27FC236}">
-                    <a16:creationId xmlns="" xmlns:a16="http://schemas.microsoft.com/office/drawing/2014/main" id="{23370C1F-7876-4278-AB20-78F6CAA385E2}"/>
+                    <a16:creationId xmlns:a16="http://schemas.microsoft.com/office/drawing/2014/main" xmlns="" id="{23370C1F-7876-4278-AB20-78F6CAA385E2}"/>
                   </a:ext>
                 </a:extLst>
               </p:cNvPr>
@@ -12285,7 +12285,7 @@
     </p:spTree>
     <p:extLst>
       <p:ext uri="{BB962C8B-B14F-4D97-AF65-F5344CB8AC3E}">
-        <p14:creationId xmlns="" xmlns:p14="http://schemas.microsoft.com/office/powerpoint/2010/main" val="3284562556"/>
+        <p14:creationId xmlns:p14="http://schemas.microsoft.com/office/powerpoint/2010/main" xmlns="" val="3284562556"/>
       </p:ext>
     </p:extLst>
   </p:cSld>
@@ -12293,7 +12293,7 @@
     <a:masterClrMapping/>
   </p:clrMapOvr>
   <mc:AlternateContent xmlns:mc="http://schemas.openxmlformats.org/markup-compatibility/2006">
-    <mc:Choice xmlns="" xmlns:p14="http://schemas.microsoft.com/office/powerpoint/2010/main" Requires="p14">
+    <mc:Choice xmlns:p14="http://schemas.microsoft.com/office/powerpoint/2010/main" xmlns="" Requires="p14">
       <p:transition spd="slow" p14:dur="2000" advClick="0" advTm="5000"/>
     </mc:Choice>
     <mc:Fallback>
@@ -12325,7 +12325,7 @@
           <p:cNvPr id="8" name="Slide Number">
             <a:extLst>
               <a:ext uri="{FF2B5EF4-FFF2-40B4-BE49-F238E27FC236}">
-                <a16:creationId xmlns="" xmlns:a16="http://schemas.microsoft.com/office/drawing/2014/main" id="{509D954E-A844-4072-A556-DE584BEB9321}"/>
+                <a16:creationId xmlns:a16="http://schemas.microsoft.com/office/drawing/2014/main" xmlns="" id="{509D954E-A844-4072-A556-DE584BEB9321}"/>
               </a:ext>
             </a:extLst>
           </p:cNvPr>
@@ -12367,7 +12367,7 @@
           <p:cNvPr id="6" name="Code Box">
             <a:extLst>
               <a:ext uri="{FF2B5EF4-FFF2-40B4-BE49-F238E27FC236}">
-                <a16:creationId xmlns="" xmlns:a16="http://schemas.microsoft.com/office/drawing/2014/main" id="{3278A82F-5546-4977-9F75-2A933B415945}"/>
+                <a16:creationId xmlns:a16="http://schemas.microsoft.com/office/drawing/2014/main" xmlns="" id="{3278A82F-5546-4977-9F75-2A933B415945}"/>
               </a:ext>
             </a:extLst>
           </p:cNvPr>
@@ -12454,7 +12454,7 @@
           <p:cNvPr id="21" name="Slide Body Text">
             <a:extLst>
               <a:ext uri="{FF2B5EF4-FFF2-40B4-BE49-F238E27FC236}">
-                <a16:creationId xmlns="" xmlns:a16="http://schemas.microsoft.com/office/drawing/2014/main" id="{04F318BE-2BAD-4677-871C-D78A4BF0CBA6}"/>
+                <a16:creationId xmlns:a16="http://schemas.microsoft.com/office/drawing/2014/main" xmlns="" id="{04F318BE-2BAD-4677-871C-D78A4BF0CBA6}"/>
               </a:ext>
             </a:extLst>
           </p:cNvPr>
@@ -12501,7 +12501,7 @@
           <p:cNvPr id="9" name="Rectangle Top">
             <a:extLst>
               <a:ext uri="{FF2B5EF4-FFF2-40B4-BE49-F238E27FC236}">
-                <a16:creationId xmlns="" xmlns:a16="http://schemas.microsoft.com/office/drawing/2014/main" id="{A15CE03A-0933-4E5D-9EA1-718D4F802FFC}"/>
+                <a16:creationId xmlns:a16="http://schemas.microsoft.com/office/drawing/2014/main" xmlns="" id="{A15CE03A-0933-4E5D-9EA1-718D4F802FFC}"/>
               </a:ext>
             </a:extLst>
           </p:cNvPr>
@@ -12582,7 +12582,7 @@
           <p:cNvPr id="10" name="Logo Software University" descr="Software University logo">
             <a:extLst>
               <a:ext uri="{FF2B5EF4-FFF2-40B4-BE49-F238E27FC236}">
-                <a16:creationId xmlns="" xmlns:a16="http://schemas.microsoft.com/office/drawing/2014/main" id="{8C01D7AF-7CBD-46E1-99F3-8EB60E838D91}"/>
+                <a16:creationId xmlns:a16="http://schemas.microsoft.com/office/drawing/2014/main" xmlns="" id="{8C01D7AF-7CBD-46E1-99F3-8EB60E838D91}"/>
               </a:ext>
             </a:extLst>
           </p:cNvPr>
@@ -12595,7 +12595,7 @@
           <a:blip r:embed="rId2" cstate="print">
             <a:extLst>
               <a:ext uri="{28A0092B-C50C-407E-A947-70E740481C1C}">
-                <a14:useLocalDpi xmlns="" xmlns:a14="http://schemas.microsoft.com/office/drawing/2010/main" val="0"/>
+                <a14:useLocalDpi xmlns:a14="http://schemas.microsoft.com/office/drawing/2010/main" xmlns="" val="0"/>
               </a:ext>
             </a:extLst>
           </a:blip>
@@ -12618,7 +12618,7 @@
           <p:cNvPr id="11" name="Slide Title">
             <a:extLst>
               <a:ext uri="{FF2B5EF4-FFF2-40B4-BE49-F238E27FC236}">
-                <a16:creationId xmlns="" xmlns:a16="http://schemas.microsoft.com/office/drawing/2014/main" id="{47D60833-F0A9-4F29-8C06-A963A7C8BE93}"/>
+                <a16:creationId xmlns:a16="http://schemas.microsoft.com/office/drawing/2014/main" xmlns="" id="{47D60833-F0A9-4F29-8C06-A963A7C8BE93}"/>
               </a:ext>
             </a:extLst>
           </p:cNvPr>
@@ -12657,7 +12657,7 @@
     </p:spTree>
     <p:extLst>
       <p:ext uri="{BB962C8B-B14F-4D97-AF65-F5344CB8AC3E}">
-        <p14:creationId xmlns="" xmlns:p14="http://schemas.microsoft.com/office/powerpoint/2010/main" val="1000829826"/>
+        <p14:creationId xmlns:p14="http://schemas.microsoft.com/office/powerpoint/2010/main" xmlns="" val="1000829826"/>
       </p:ext>
     </p:extLst>
   </p:cSld>
@@ -12665,7 +12665,7 @@
     <a:masterClrMapping/>
   </p:clrMapOvr>
   <mc:AlternateContent xmlns:mc="http://schemas.openxmlformats.org/markup-compatibility/2006">
-    <mc:Choice xmlns="" xmlns:p14="http://schemas.microsoft.com/office/powerpoint/2010/main" Requires="p14">
+    <mc:Choice xmlns:p14="http://schemas.microsoft.com/office/powerpoint/2010/main" xmlns="" Requires="p14">
       <p:transition spd="slow" p14:dur="2000" advClick="0" advTm="5000"/>
     </mc:Choice>
     <mc:Fallback>
@@ -12697,7 +12697,7 @@
           <p:cNvPr id="10" name="Slide Number">
             <a:extLst>
               <a:ext uri="{FF2B5EF4-FFF2-40B4-BE49-F238E27FC236}">
-                <a16:creationId xmlns="" xmlns:a16="http://schemas.microsoft.com/office/drawing/2014/main" id="{39DDE17E-5472-41F3-AF5F-54DFF10DC63C}"/>
+                <a16:creationId xmlns:a16="http://schemas.microsoft.com/office/drawing/2014/main" xmlns="" id="{39DDE17E-5472-41F3-AF5F-54DFF10DC63C}"/>
               </a:ext>
             </a:extLst>
           </p:cNvPr>
@@ -12739,7 +12739,7 @@
           <p:cNvPr id="9" name="Picture SoftUni Mascot" descr="SoftUni mascot with laptop">
             <a:extLst>
               <a:ext uri="{FF2B5EF4-FFF2-40B4-BE49-F238E27FC236}">
-                <a16:creationId xmlns="" xmlns:a16="http://schemas.microsoft.com/office/drawing/2014/main" id="{DC4365F6-D2C1-47B4-8477-38FD2C7711AA}"/>
+                <a16:creationId xmlns:a16="http://schemas.microsoft.com/office/drawing/2014/main" xmlns="" id="{DC4365F6-D2C1-47B4-8477-38FD2C7711AA}"/>
               </a:ext>
             </a:extLst>
           </p:cNvPr>
@@ -12752,7 +12752,7 @@
           <a:blip r:embed="rId2" cstate="print">
             <a:extLst>
               <a:ext uri="{28A0092B-C50C-407E-A947-70E740481C1C}">
-                <a14:useLocalDpi xmlns="" xmlns:a14="http://schemas.microsoft.com/office/drawing/2010/main" val="0"/>
+                <a14:useLocalDpi xmlns:a14="http://schemas.microsoft.com/office/drawing/2010/main" xmlns="" val="0"/>
               </a:ext>
             </a:extLst>
           </a:blip>
@@ -12775,7 +12775,7 @@
           <p:cNvPr id="23" name="Slide Body Text">
             <a:extLst>
               <a:ext uri="{FF2B5EF4-FFF2-40B4-BE49-F238E27FC236}">
-                <a16:creationId xmlns="" xmlns:a16="http://schemas.microsoft.com/office/drawing/2014/main" id="{889D93F4-ABFA-46BF-8E5D-FE6562ACB20F}"/>
+                <a16:creationId xmlns:a16="http://schemas.microsoft.com/office/drawing/2014/main" xmlns="" id="{889D93F4-ABFA-46BF-8E5D-FE6562ACB20F}"/>
               </a:ext>
             </a:extLst>
           </p:cNvPr>
@@ -12866,7 +12866,7 @@
           <p:cNvPr id="8" name="Rectangle Top">
             <a:extLst>
               <a:ext uri="{FF2B5EF4-FFF2-40B4-BE49-F238E27FC236}">
-                <a16:creationId xmlns="" xmlns:a16="http://schemas.microsoft.com/office/drawing/2014/main" id="{930E0800-9260-4369-8330-8264DD33C5CE}"/>
+                <a16:creationId xmlns:a16="http://schemas.microsoft.com/office/drawing/2014/main" xmlns="" id="{930E0800-9260-4369-8330-8264DD33C5CE}"/>
               </a:ext>
             </a:extLst>
           </p:cNvPr>
@@ -12947,7 +12947,7 @@
           <p:cNvPr id="11" name="Logo Software University" descr="Software University logo">
             <a:extLst>
               <a:ext uri="{FF2B5EF4-FFF2-40B4-BE49-F238E27FC236}">
-                <a16:creationId xmlns="" xmlns:a16="http://schemas.microsoft.com/office/drawing/2014/main" id="{14F779A7-4A91-448B-BEFA-956C70A1C22F}"/>
+                <a16:creationId xmlns:a16="http://schemas.microsoft.com/office/drawing/2014/main" xmlns="" id="{14F779A7-4A91-448B-BEFA-956C70A1C22F}"/>
               </a:ext>
             </a:extLst>
           </p:cNvPr>
@@ -12960,7 +12960,7 @@
           <a:blip r:embed="rId3" cstate="print">
             <a:extLst>
               <a:ext uri="{28A0092B-C50C-407E-A947-70E740481C1C}">
-                <a14:useLocalDpi xmlns="" xmlns:a14="http://schemas.microsoft.com/office/drawing/2010/main" val="0"/>
+                <a14:useLocalDpi xmlns:a14="http://schemas.microsoft.com/office/drawing/2010/main" xmlns="" val="0"/>
               </a:ext>
             </a:extLst>
           </a:blip>
@@ -12983,7 +12983,7 @@
           <p:cNvPr id="13" name="Slide Title">
             <a:extLst>
               <a:ext uri="{FF2B5EF4-FFF2-40B4-BE49-F238E27FC236}">
-                <a16:creationId xmlns="" xmlns:a16="http://schemas.microsoft.com/office/drawing/2014/main" id="{357D7BE1-6358-42CC-94F3-7BCDD91DCB6D}"/>
+                <a16:creationId xmlns:a16="http://schemas.microsoft.com/office/drawing/2014/main" xmlns="" id="{357D7BE1-6358-42CC-94F3-7BCDD91DCB6D}"/>
               </a:ext>
             </a:extLst>
           </p:cNvPr>
@@ -13022,7 +13022,7 @@
     </p:spTree>
     <p:extLst>
       <p:ext uri="{BB962C8B-B14F-4D97-AF65-F5344CB8AC3E}">
-        <p14:creationId xmlns="" xmlns:p14="http://schemas.microsoft.com/office/powerpoint/2010/main" val="1028724482"/>
+        <p14:creationId xmlns:p14="http://schemas.microsoft.com/office/powerpoint/2010/main" xmlns="" val="1028724482"/>
       </p:ext>
     </p:extLst>
   </p:cSld>
@@ -13030,7 +13030,7 @@
     <a:masterClrMapping/>
   </p:clrMapOvr>
   <mc:AlternateContent xmlns:mc="http://schemas.openxmlformats.org/markup-compatibility/2006">
-    <mc:Choice xmlns="" xmlns:p14="http://schemas.microsoft.com/office/powerpoint/2010/main" Requires="p14">
+    <mc:Choice xmlns:p14="http://schemas.microsoft.com/office/powerpoint/2010/main" xmlns="" Requires="p14">
       <p:transition spd="slow" p14:dur="2000" advClick="0" advTm="5000"/>
     </mc:Choice>
     <mc:Fallback>
@@ -13142,7 +13142,7 @@
           <p:cNvPr id="11" name="Slide Number">
             <a:extLst>
               <a:ext uri="{FF2B5EF4-FFF2-40B4-BE49-F238E27FC236}">
-                <a16:creationId xmlns="" xmlns:a16="http://schemas.microsoft.com/office/drawing/2014/main" id="{6750ECE4-94E0-469B-B8E4-562792823B0F}"/>
+                <a16:creationId xmlns:a16="http://schemas.microsoft.com/office/drawing/2014/main" xmlns="" id="{6750ECE4-94E0-469B-B8E4-562792823B0F}"/>
               </a:ext>
             </a:extLst>
           </p:cNvPr>
@@ -13265,7 +13265,7 @@
           <p:cNvPr id="12" name="Logo Software University Down" descr="Software University logo">
             <a:extLst>
               <a:ext uri="{FF2B5EF4-FFF2-40B4-BE49-F238E27FC236}">
-                <a16:creationId xmlns="" xmlns:a16="http://schemas.microsoft.com/office/drawing/2014/main" id="{7028D2F0-1E67-414B-A93D-D3F8F131A132}"/>
+                <a16:creationId xmlns:a16="http://schemas.microsoft.com/office/drawing/2014/main" xmlns="" id="{7028D2F0-1E67-414B-A93D-D3F8F131A132}"/>
               </a:ext>
             </a:extLst>
           </p:cNvPr>
@@ -13278,7 +13278,7 @@
           <a:blip r:embed="rId2" cstate="print">
             <a:extLst>
               <a:ext uri="{28A0092B-C50C-407E-A947-70E740481C1C}">
-                <a14:useLocalDpi xmlns="" xmlns:a14="http://schemas.microsoft.com/office/drawing/2010/main" val="0"/>
+                <a14:useLocalDpi xmlns:a14="http://schemas.microsoft.com/office/drawing/2010/main" xmlns="" val="0"/>
               </a:ext>
             </a:extLst>
           </a:blip>
@@ -13301,7 +13301,7 @@
           <p:cNvPr id="10" name="Text Placeholder Right">
             <a:extLst>
               <a:ext uri="{FF2B5EF4-FFF2-40B4-BE49-F238E27FC236}">
-                <a16:creationId xmlns="" xmlns:a16="http://schemas.microsoft.com/office/drawing/2014/main" id="{AF69A59F-C564-4A04-B1CC-31C261499991}"/>
+                <a16:creationId xmlns:a16="http://schemas.microsoft.com/office/drawing/2014/main" xmlns="" id="{AF69A59F-C564-4A04-B1CC-31C261499991}"/>
               </a:ext>
             </a:extLst>
           </p:cNvPr>
@@ -13379,7 +13379,7 @@
           <p:cNvPr id="9" name="Text Placeholder Left">
             <a:extLst>
               <a:ext uri="{FF2B5EF4-FFF2-40B4-BE49-F238E27FC236}">
-                <a16:creationId xmlns="" xmlns:a16="http://schemas.microsoft.com/office/drawing/2014/main" id="{C8A626D2-456B-41EF-9818-EA8DD7E314DA}"/>
+                <a16:creationId xmlns:a16="http://schemas.microsoft.com/office/drawing/2014/main" xmlns="" id="{C8A626D2-456B-41EF-9818-EA8DD7E314DA}"/>
               </a:ext>
             </a:extLst>
           </p:cNvPr>
@@ -13457,7 +13457,7 @@
           <p:cNvPr id="13" name="Rectangle Top">
             <a:extLst>
               <a:ext uri="{FF2B5EF4-FFF2-40B4-BE49-F238E27FC236}">
-                <a16:creationId xmlns="" xmlns:a16="http://schemas.microsoft.com/office/drawing/2014/main" id="{E03301DA-D0AF-46FD-8740-2F761250203A}"/>
+                <a16:creationId xmlns:a16="http://schemas.microsoft.com/office/drawing/2014/main" xmlns="" id="{E03301DA-D0AF-46FD-8740-2F761250203A}"/>
               </a:ext>
             </a:extLst>
           </p:cNvPr>
@@ -13538,7 +13538,7 @@
           <p:cNvPr id="14" name="Logo Software University" descr="Software University logo">
             <a:extLst>
               <a:ext uri="{FF2B5EF4-FFF2-40B4-BE49-F238E27FC236}">
-                <a16:creationId xmlns="" xmlns:a16="http://schemas.microsoft.com/office/drawing/2014/main" id="{19A67BB9-D880-4EAD-B90E-89C4219BFC0B}"/>
+                <a16:creationId xmlns:a16="http://schemas.microsoft.com/office/drawing/2014/main" xmlns="" id="{19A67BB9-D880-4EAD-B90E-89C4219BFC0B}"/>
               </a:ext>
             </a:extLst>
           </p:cNvPr>
@@ -13551,7 +13551,7 @@
           <a:blip r:embed="rId3" cstate="print">
             <a:extLst>
               <a:ext uri="{28A0092B-C50C-407E-A947-70E740481C1C}">
-                <a14:useLocalDpi xmlns="" xmlns:a14="http://schemas.microsoft.com/office/drawing/2010/main" val="0"/>
+                <a14:useLocalDpi xmlns:a14="http://schemas.microsoft.com/office/drawing/2010/main" xmlns="" val="0"/>
               </a:ext>
             </a:extLst>
           </a:blip>
@@ -13574,7 +13574,7 @@
           <p:cNvPr id="15" name="Slide Title">
             <a:extLst>
               <a:ext uri="{FF2B5EF4-FFF2-40B4-BE49-F238E27FC236}">
-                <a16:creationId xmlns="" xmlns:a16="http://schemas.microsoft.com/office/drawing/2014/main" id="{EA9A94D1-F9F6-4D7B-85E3-896A987B6A4D}"/>
+                <a16:creationId xmlns:a16="http://schemas.microsoft.com/office/drawing/2014/main" xmlns="" id="{EA9A94D1-F9F6-4D7B-85E3-896A987B6A4D}"/>
               </a:ext>
             </a:extLst>
           </p:cNvPr>
@@ -13613,7 +13613,7 @@
     </p:spTree>
     <p:extLst>
       <p:ext uri="{BB962C8B-B14F-4D97-AF65-F5344CB8AC3E}">
-        <p14:creationId xmlns="" xmlns:p14="http://schemas.microsoft.com/office/powerpoint/2010/main" val="3044033461"/>
+        <p14:creationId xmlns:p14="http://schemas.microsoft.com/office/powerpoint/2010/main" xmlns="" val="3044033461"/>
       </p:ext>
     </p:extLst>
   </p:cSld>
@@ -13621,7 +13621,7 @@
     <a:masterClrMapping/>
   </p:clrMapOvr>
   <mc:AlternateContent xmlns:mc="http://schemas.openxmlformats.org/markup-compatibility/2006">
-    <mc:Choice xmlns="" xmlns:p14="http://schemas.microsoft.com/office/powerpoint/2010/main" Requires="p14">
+    <mc:Choice xmlns:p14="http://schemas.microsoft.com/office/powerpoint/2010/main" xmlns="" Requires="p14">
       <p:transition spd="slow" p14:dur="2000" advClick="0" advTm="5000"/>
     </mc:Choice>
     <mc:Fallback>
@@ -13630,7 +13630,7 @@
   </mc:AlternateContent>
   <p:extLst>
     <p:ext uri="{DCECCB84-F9BA-43D5-87BE-67443E8EF086}">
-      <p15:sldGuideLst xmlns="" xmlns:p15="http://schemas.microsoft.com/office/powerpoint/2012/main">
+      <p15:sldGuideLst xmlns:p15="http://schemas.microsoft.com/office/powerpoint/2012/main" xmlns="">
         <p15:guide id="1" orient="horz" pos="2160">
           <p15:clr>
             <a:srgbClr val="FBAE40"/>
@@ -13677,7 +13677,7 @@
           <p:cNvPr id="4" name="Picture Background" descr="SoftUni Background">
             <a:extLst>
               <a:ext uri="{FF2B5EF4-FFF2-40B4-BE49-F238E27FC236}">
-                <a16:creationId xmlns="" xmlns:a16="http://schemas.microsoft.com/office/drawing/2014/main" id="{5BE90A63-DDD9-4B3B-A234-DF69B9BC812F}"/>
+                <a16:creationId xmlns:a16="http://schemas.microsoft.com/office/drawing/2014/main" xmlns="" id="{5BE90A63-DDD9-4B3B-A234-DF69B9BC812F}"/>
               </a:ext>
             </a:extLst>
           </p:cNvPr>
@@ -13706,7 +13706,7 @@
           <p:cNvPr id="11" name="Slide Body Text">
             <a:extLst>
               <a:ext uri="{FF2B5EF4-FFF2-40B4-BE49-F238E27FC236}">
-                <a16:creationId xmlns="" xmlns:a16="http://schemas.microsoft.com/office/drawing/2014/main" id="{90CBFB32-9F46-4F2F-8A54-9EE8BED27855}"/>
+                <a16:creationId xmlns:a16="http://schemas.microsoft.com/office/drawing/2014/main" xmlns="" id="{90CBFB32-9F46-4F2F-8A54-9EE8BED27855}"/>
               </a:ext>
             </a:extLst>
           </p:cNvPr>
@@ -13774,7 +13774,7 @@
           <p:cNvPr id="10" name="Slide Title">
             <a:extLst>
               <a:ext uri="{FF2B5EF4-FFF2-40B4-BE49-F238E27FC236}">
-                <a16:creationId xmlns="" xmlns:a16="http://schemas.microsoft.com/office/drawing/2014/main" id="{B770C392-3003-4C35-9625-BB041F8257BA}"/>
+                <a16:creationId xmlns:a16="http://schemas.microsoft.com/office/drawing/2014/main" xmlns="" id="{B770C392-3003-4C35-9625-BB041F8257BA}"/>
               </a:ext>
             </a:extLst>
           </p:cNvPr>
@@ -13811,7 +13811,7 @@
     </p:spTree>
     <p:extLst>
       <p:ext uri="{BB962C8B-B14F-4D97-AF65-F5344CB8AC3E}">
-        <p14:creationId xmlns="" xmlns:p14="http://schemas.microsoft.com/office/powerpoint/2010/main" val="156789181"/>
+        <p14:creationId xmlns:p14="http://schemas.microsoft.com/office/powerpoint/2010/main" xmlns="" val="156789181"/>
       </p:ext>
     </p:extLst>
   </p:cSld>
@@ -13835,7 +13835,7 @@
     <p:sldLayoutId id="2147483696" r:id="rId16"/>
   </p:sldLayoutIdLst>
   <mc:AlternateContent xmlns:mc="http://schemas.openxmlformats.org/markup-compatibility/2006">
-    <mc:Choice xmlns="" xmlns:p14="http://schemas.microsoft.com/office/powerpoint/2010/main" Requires="p14">
+    <mc:Choice xmlns:p14="http://schemas.microsoft.com/office/powerpoint/2010/main" xmlns="" Requires="p14">
       <p:transition spd="slow" p14:dur="2000" advClick="0" advTm="5000"/>
     </mc:Choice>
     <mc:Fallback>
@@ -14125,7 +14125,7 @@
   </p:txStyles>
   <p:extLst>
     <p:ext uri="{27BBF7A9-308A-43DC-89C8-2F10F3537804}">
-      <p15:sldGuideLst xmlns="" xmlns:p15="http://schemas.microsoft.com/office/powerpoint/2012/main">
+      <p15:sldGuideLst xmlns:p15="http://schemas.microsoft.com/office/powerpoint/2012/main" xmlns="">
         <p15:guide id="1" orient="horz" pos="2160">
           <p15:clr>
             <a:srgbClr val="F26B43"/>
@@ -14221,7 +14221,7 @@
           <p:cNvPr id="10" name="Author Position">
             <a:extLst>
               <a:ext uri="{FF2B5EF4-FFF2-40B4-BE49-F238E27FC236}">
-                <a16:creationId xmlns="" xmlns:a16="http://schemas.microsoft.com/office/drawing/2014/main" id="{F585BC4C-0F13-4FD4-8F23-99FD46618370}"/>
+                <a16:creationId xmlns:a16="http://schemas.microsoft.com/office/drawing/2014/main" xmlns="" id="{F585BC4C-0F13-4FD4-8F23-99FD46618370}"/>
               </a:ext>
             </a:extLst>
           </p:cNvPr>
@@ -14254,7 +14254,7 @@
           <p:cNvPr id="9" name="Author Name">
             <a:extLst>
               <a:ext uri="{FF2B5EF4-FFF2-40B4-BE49-F238E27FC236}">
-                <a16:creationId xmlns="" xmlns:a16="http://schemas.microsoft.com/office/drawing/2014/main" id="{FA396BB6-2053-4690-9672-BC528007D370}"/>
+                <a16:creationId xmlns:a16="http://schemas.microsoft.com/office/drawing/2014/main" xmlns="" id="{FA396BB6-2053-4690-9672-BC528007D370}"/>
               </a:ext>
             </a:extLst>
           </p:cNvPr>
@@ -14287,7 +14287,7 @@
           <p:cNvPr id="3" name="Presentation Subtitle">
             <a:extLst>
               <a:ext uri="{FF2B5EF4-FFF2-40B4-BE49-F238E27FC236}">
-                <a16:creationId xmlns="" xmlns:a16="http://schemas.microsoft.com/office/drawing/2014/main" id="{A004DC04-DA2A-41C0-8578-4B8D2F08EA7D}"/>
+                <a16:creationId xmlns:a16="http://schemas.microsoft.com/office/drawing/2014/main" xmlns="" id="{A004DC04-DA2A-41C0-8578-4B8D2F08EA7D}"/>
               </a:ext>
             </a:extLst>
           </p:cNvPr>
@@ -14331,7 +14331,7 @@
           <p:cNvPr id="16" name="Title 15">
             <a:extLst>
               <a:ext uri="{FF2B5EF4-FFF2-40B4-BE49-F238E27FC236}">
-                <a16:creationId xmlns="" xmlns:a16="http://schemas.microsoft.com/office/drawing/2014/main" id="{09D526E5-16F9-CDC3-F025-1D308EB5C234}"/>
+                <a16:creationId xmlns:a16="http://schemas.microsoft.com/office/drawing/2014/main" xmlns="" id="{09D526E5-16F9-CDC3-F025-1D308EB5C234}"/>
               </a:ext>
             </a:extLst>
           </p:cNvPr>
@@ -14374,7 +14374,7 @@
           <a:blip r:embed="rId4" cstate="print">
             <a:extLst>
               <a:ext uri="{28A0092B-C50C-407E-A947-70E740481C1C}">
-                <a14:useLocalDpi xmlns:a14="http://schemas.microsoft.com/office/drawing/2010/main" xmlns="" val="0"/>
+                <a14:useLocalDpi xmlns="" xmlns:a14="http://schemas.microsoft.com/office/drawing/2010/main" val="0"/>
               </a:ext>
             </a:extLst>
           </a:blip>
@@ -14394,7 +14394,7 @@
           <a:noFill/>
           <a:extLst>
             <a:ext uri="{909E8E84-426E-40DD-AFC4-6F175D3DCCD1}">
-              <a14:hiddenFill xmlns:a14="http://schemas.microsoft.com/office/drawing/2010/main" xmlns="">
+              <a14:hiddenFill xmlns="" xmlns:a14="http://schemas.microsoft.com/office/drawing/2010/main">
                 <a:solidFill>
                   <a:srgbClr val="FFFFFF"/>
                 </a:solidFill>
@@ -14406,7 +14406,7 @@
     </p:spTree>
     <p:extLst>
       <p:ext uri="{BB962C8B-B14F-4D97-AF65-F5344CB8AC3E}">
-        <p14:creationId xmlns="" xmlns:p14="http://schemas.microsoft.com/office/powerpoint/2010/main" val="3666405375"/>
+        <p14:creationId xmlns:p14="http://schemas.microsoft.com/office/powerpoint/2010/main" xmlns="" val="3666405375"/>
       </p:ext>
     </p:extLst>
   </p:cSld>
@@ -14414,7 +14414,7 @@
     <a:masterClrMapping/>
   </p:clrMapOvr>
   <mc:AlternateContent xmlns:mc="http://schemas.openxmlformats.org/markup-compatibility/2006">
-    <mc:Choice xmlns="" xmlns:p14="http://schemas.microsoft.com/office/powerpoint/2010/main" Requires="p14">
+    <mc:Choice xmlns:p14="http://schemas.microsoft.com/office/powerpoint/2010/main" xmlns="" Requires="p14">
       <p:transition spd="slow" p14:dur="2000" advClick="0" advTm="5000"/>
     </mc:Choice>
     <mc:Fallback>
@@ -14458,8 +14458,8 @@
         </p:nvSpPr>
         <p:spPr bwMode="auto">
           <a:xfrm>
-            <a:off x="1228045" y="1936518"/>
-            <a:ext cx="9674224" cy="3238579"/>
+            <a:off x="1228044" y="1936518"/>
+            <a:ext cx="10125756" cy="3259354"/>
           </a:xfrm>
           <a:prstGeom prst="rect">
             <a:avLst/>
@@ -14499,11 +14499,32 @@
               <a:buSzPct val="70000"/>
             </a:pPr>
             <a:r>
+              <a:rPr lang="en-US" sz="2800" b="1" noProof="1" smtClean="0">
+                <a:latin typeface="Consolas" pitchFamily="49" charset="0"/>
+                <a:cs typeface="Consolas" pitchFamily="49" charset="0"/>
+              </a:rPr>
+              <a:t>SELECT</a:t>
+            </a:r>
+            <a:r>
+              <a:rPr lang="bg-BG" sz="2800" b="1" noProof="1" smtClean="0">
+                <a:latin typeface="Consolas" pitchFamily="49" charset="0"/>
+                <a:cs typeface="Consolas" pitchFamily="49" charset="0"/>
+              </a:rPr>
+              <a:t> </a:t>
+            </a:r>
+            <a:r>
+              <a:rPr lang="en-US" sz="2800" b="1" noProof="1" smtClean="0">
+                <a:latin typeface="Consolas" pitchFamily="49" charset="0"/>
+                <a:cs typeface="Consolas" pitchFamily="49" charset="0"/>
+              </a:rPr>
+              <a:t>e.FirstName, e.LastName </a:t>
+            </a:r>
+            <a:r>
               <a:rPr lang="en-US" sz="2800" b="1" noProof="1">
                 <a:latin typeface="Consolas" pitchFamily="49" charset="0"/>
                 <a:cs typeface="Consolas" pitchFamily="49" charset="0"/>
               </a:rPr>
-              <a:t>SELECT FROM Employees AS e</a:t>
+              <a:t>FROM Employees AS e</a:t>
             </a:r>
           </a:p>
           <a:p>
@@ -14876,7 +14897,7 @@
           <p:cNvPr id="9" name="Slide Number">
             <a:extLst>
               <a:ext uri="{FF2B5EF4-FFF2-40B4-BE49-F238E27FC236}">
-                <a16:creationId xmlns:a16="http://schemas.microsoft.com/office/drawing/2014/main" xmlns="" id="{A816F084-DA92-4652-B283-F50A1A2276F5}"/>
+                <a16:creationId xmlns="" xmlns:a16="http://schemas.microsoft.com/office/drawing/2014/main" id="{A816F084-DA92-4652-B283-F50A1A2276F5}"/>
               </a:ext>
             </a:extLst>
           </p:cNvPr>
@@ -14916,7 +14937,7 @@
     </p:spTree>
     <p:extLst>
       <p:ext uri="{BB962C8B-B14F-4D97-AF65-F5344CB8AC3E}">
-        <p14:creationId xmlns:p14="http://schemas.microsoft.com/office/powerpoint/2010/main" xmlns="" val="3967804102"/>
+        <p14:creationId xmlns="" xmlns:p14="http://schemas.microsoft.com/office/powerpoint/2010/main" val="3967804102"/>
       </p:ext>
     </p:extLst>
   </p:cSld>
@@ -14924,7 +14945,7 @@
     <a:masterClrMapping/>
   </p:clrMapOvr>
   <mc:AlternateContent xmlns:mc="http://schemas.openxmlformats.org/markup-compatibility/2006">
-    <mc:Choice xmlns:p14="http://schemas.microsoft.com/office/powerpoint/2010/main" xmlns="" Requires="p14">
+    <mc:Choice xmlns="" xmlns:p14="http://schemas.microsoft.com/office/powerpoint/2010/main" Requires="p14">
       <p:transition spd="slow" p14:dur="2000" advClick="0" advTm="5000"/>
     </mc:Choice>
     <mc:Fallback>
@@ -15369,7 +15390,7 @@
           <p:cNvPr id="8" name="Slide Number">
             <a:extLst>
               <a:ext uri="{FF2B5EF4-FFF2-40B4-BE49-F238E27FC236}">
-                <a16:creationId xmlns:a16="http://schemas.microsoft.com/office/drawing/2014/main" xmlns="" id="{7379BEBA-72C0-4705-8AF6-97816F3B989B}"/>
+                <a16:creationId xmlns="" xmlns:a16="http://schemas.microsoft.com/office/drawing/2014/main" id="{7379BEBA-72C0-4705-8AF6-97816F3B989B}"/>
               </a:ext>
             </a:extLst>
           </p:cNvPr>
@@ -15409,7 +15430,7 @@
     </p:spTree>
     <p:extLst>
       <p:ext uri="{BB962C8B-B14F-4D97-AF65-F5344CB8AC3E}">
-        <p14:creationId xmlns:p14="http://schemas.microsoft.com/office/powerpoint/2010/main" xmlns="" val="1509527703"/>
+        <p14:creationId xmlns="" xmlns:p14="http://schemas.microsoft.com/office/powerpoint/2010/main" val="1509527703"/>
       </p:ext>
     </p:extLst>
   </p:cSld>
@@ -15417,7 +15438,7 @@
     <a:masterClrMapping/>
   </p:clrMapOvr>
   <mc:AlternateContent xmlns:mc="http://schemas.openxmlformats.org/markup-compatibility/2006">
-    <mc:Choice xmlns:p14="http://schemas.microsoft.com/office/powerpoint/2010/main" xmlns="" Requires="p14">
+    <mc:Choice xmlns="" xmlns:p14="http://schemas.microsoft.com/office/powerpoint/2010/main" Requires="p14">
       <p:transition spd="slow" p14:dur="2000" advClick="0" advTm="5000"/>
     </mc:Choice>
     <mc:Fallback>
@@ -16260,7 +16281,7 @@
           <p:cNvPr id="11" name="Slide Number">
             <a:extLst>
               <a:ext uri="{FF2B5EF4-FFF2-40B4-BE49-F238E27FC236}">
-                <a16:creationId xmlns:a16="http://schemas.microsoft.com/office/drawing/2014/main" xmlns="" id="{0FA1B6CD-C952-4A44-80D2-331DA0266BDB}"/>
+                <a16:creationId xmlns="" xmlns:a16="http://schemas.microsoft.com/office/drawing/2014/main" id="{0FA1B6CD-C952-4A44-80D2-331DA0266BDB}"/>
               </a:ext>
             </a:extLst>
           </p:cNvPr>
@@ -16300,7 +16321,7 @@
     </p:spTree>
     <p:extLst>
       <p:ext uri="{BB962C8B-B14F-4D97-AF65-F5344CB8AC3E}">
-        <p14:creationId xmlns:p14="http://schemas.microsoft.com/office/powerpoint/2010/main" xmlns="" val="4092459972"/>
+        <p14:creationId xmlns="" xmlns:p14="http://schemas.microsoft.com/office/powerpoint/2010/main" val="4092459972"/>
       </p:ext>
     </p:extLst>
   </p:cSld>
@@ -16308,7 +16329,7 @@
     <a:masterClrMapping/>
   </p:clrMapOvr>
   <mc:AlternateContent xmlns:mc="http://schemas.openxmlformats.org/markup-compatibility/2006">
-    <mc:Choice xmlns:p14="http://schemas.microsoft.com/office/powerpoint/2010/main" xmlns="" Requires="p14">
+    <mc:Choice xmlns="" xmlns:p14="http://schemas.microsoft.com/office/powerpoint/2010/main" Requires="p14">
       <p:transition spd="slow" p14:dur="2000" advClick="0" advTm="5000"/>
     </mc:Choice>
     <mc:Fallback>
@@ -16717,7 +16738,7 @@
     <a:masterClrMapping/>
   </p:clrMapOvr>
   <mc:AlternateContent xmlns:mc="http://schemas.openxmlformats.org/markup-compatibility/2006">
-    <mc:Choice xmlns="" xmlns:p14="http://schemas.microsoft.com/office/powerpoint/2010/main" Requires="p14">
+    <mc:Choice xmlns:p14="http://schemas.microsoft.com/office/powerpoint/2010/main" xmlns="" Requires="p14">
       <p:transition spd="slow" p14:dur="2000" advClick="0" advTm="5000"/>
     </mc:Choice>
     <mc:Fallback>
@@ -16992,7 +17013,7 @@
     <a:masterClrMapping/>
   </p:clrMapOvr>
   <mc:AlternateContent xmlns:mc="http://schemas.openxmlformats.org/markup-compatibility/2006">
-    <mc:Choice xmlns="" xmlns:p14="http://schemas.microsoft.com/office/powerpoint/2010/main" Requires="p14">
+    <mc:Choice xmlns:p14="http://schemas.microsoft.com/office/powerpoint/2010/main" xmlns="" Requires="p14">
       <p:transition spd="slow" p14:dur="2000" advClick="0" advTm="5000"/>
     </mc:Choice>
     <mc:Fallback>
@@ -17318,14 +17339,14 @@
                 <a:gridCol w="863600">
                   <a:extLst>
                     <a:ext uri="{9D8B030D-6E8A-4147-A177-3AD203B41FA5}">
-                      <a16:colId xmlns:a16="http://schemas.microsoft.com/office/drawing/2014/main" xmlns="" val="1594468805"/>
+                      <a16:colId xmlns="" xmlns:a16="http://schemas.microsoft.com/office/drawing/2014/main" val="1594468805"/>
                     </a:ext>
                   </a:extLst>
                 </a:gridCol>
                 <a:gridCol w="1727200">
                   <a:extLst>
                     <a:ext uri="{9D8B030D-6E8A-4147-A177-3AD203B41FA5}">
-                      <a16:colId xmlns:a16="http://schemas.microsoft.com/office/drawing/2014/main" xmlns="" val="683614382"/>
+                      <a16:colId xmlns="" xmlns:a16="http://schemas.microsoft.com/office/drawing/2014/main" val="683614382"/>
                     </a:ext>
                   </a:extLst>
                 </a:gridCol>
@@ -17395,7 +17416,7 @@
                 </a:tc>
                 <a:extLst>
                   <a:ext uri="{0D108BD9-81ED-4DB2-BD59-A6C34878D82A}">
-                    <a16:rowId xmlns:a16="http://schemas.microsoft.com/office/drawing/2014/main" xmlns="" val="1969825376"/>
+                    <a16:rowId xmlns="" xmlns:a16="http://schemas.microsoft.com/office/drawing/2014/main" val="1969825376"/>
                   </a:ext>
                 </a:extLst>
               </a:tr>
@@ -17444,7 +17465,7 @@
                 </a:tc>
                 <a:extLst>
                   <a:ext uri="{0D108BD9-81ED-4DB2-BD59-A6C34878D82A}">
-                    <a16:rowId xmlns:a16="http://schemas.microsoft.com/office/drawing/2014/main" xmlns="" val="2845318136"/>
+                    <a16:rowId xmlns="" xmlns:a16="http://schemas.microsoft.com/office/drawing/2014/main" val="2845318136"/>
                   </a:ext>
                 </a:extLst>
               </a:tr>
@@ -17493,7 +17514,7 @@
                 </a:tc>
                 <a:extLst>
                   <a:ext uri="{0D108BD9-81ED-4DB2-BD59-A6C34878D82A}">
-                    <a16:rowId xmlns:a16="http://schemas.microsoft.com/office/drawing/2014/main" xmlns="" val="2968156586"/>
+                    <a16:rowId xmlns="" xmlns:a16="http://schemas.microsoft.com/office/drawing/2014/main" val="2968156586"/>
                   </a:ext>
                 </a:extLst>
               </a:tr>
@@ -17542,7 +17563,7 @@
                 </a:tc>
                 <a:extLst>
                   <a:ext uri="{0D108BD9-81ED-4DB2-BD59-A6C34878D82A}">
-                    <a16:rowId xmlns:a16="http://schemas.microsoft.com/office/drawing/2014/main" xmlns="" val="1476753229"/>
+                    <a16:rowId xmlns="" xmlns:a16="http://schemas.microsoft.com/office/drawing/2014/main" val="1476753229"/>
                   </a:ext>
                 </a:extLst>
               </a:tr>
@@ -17602,14 +17623,14 @@
                 <a:gridCol w="914400">
                   <a:extLst>
                     <a:ext uri="{9D8B030D-6E8A-4147-A177-3AD203B41FA5}">
-                      <a16:colId xmlns:a16="http://schemas.microsoft.com/office/drawing/2014/main" xmlns="" val="1594468805"/>
+                      <a16:colId xmlns="" xmlns:a16="http://schemas.microsoft.com/office/drawing/2014/main" val="1594468805"/>
                     </a:ext>
                   </a:extLst>
                 </a:gridCol>
                 <a:gridCol w="1752600">
                   <a:extLst>
                     <a:ext uri="{9D8B030D-6E8A-4147-A177-3AD203B41FA5}">
-                      <a16:colId xmlns:a16="http://schemas.microsoft.com/office/drawing/2014/main" xmlns="" val="683614382"/>
+                      <a16:colId xmlns="" xmlns:a16="http://schemas.microsoft.com/office/drawing/2014/main" val="683614382"/>
                     </a:ext>
                   </a:extLst>
                 </a:gridCol>
@@ -17675,7 +17696,7 @@
                 </a:tc>
                 <a:extLst>
                   <a:ext uri="{0D108BD9-81ED-4DB2-BD59-A6C34878D82A}">
-                    <a16:rowId xmlns:a16="http://schemas.microsoft.com/office/drawing/2014/main" xmlns="" val="1969825376"/>
+                    <a16:rowId xmlns="" xmlns:a16="http://schemas.microsoft.com/office/drawing/2014/main" val="1969825376"/>
                   </a:ext>
                 </a:extLst>
               </a:tr>
@@ -17724,7 +17745,7 @@
                 </a:tc>
                 <a:extLst>
                   <a:ext uri="{0D108BD9-81ED-4DB2-BD59-A6C34878D82A}">
-                    <a16:rowId xmlns:a16="http://schemas.microsoft.com/office/drawing/2014/main" xmlns="" val="2845318136"/>
+                    <a16:rowId xmlns="" xmlns:a16="http://schemas.microsoft.com/office/drawing/2014/main" val="2845318136"/>
                   </a:ext>
                 </a:extLst>
               </a:tr>
@@ -17773,7 +17794,7 @@
                 </a:tc>
                 <a:extLst>
                   <a:ext uri="{0D108BD9-81ED-4DB2-BD59-A6C34878D82A}">
-                    <a16:rowId xmlns:a16="http://schemas.microsoft.com/office/drawing/2014/main" xmlns="" val="2968156586"/>
+                    <a16:rowId xmlns="" xmlns:a16="http://schemas.microsoft.com/office/drawing/2014/main" val="2968156586"/>
                   </a:ext>
                 </a:extLst>
               </a:tr>
@@ -17822,7 +17843,7 @@
                 </a:tc>
                 <a:extLst>
                   <a:ext uri="{0D108BD9-81ED-4DB2-BD59-A6C34878D82A}">
-                    <a16:rowId xmlns:a16="http://schemas.microsoft.com/office/drawing/2014/main" xmlns="" val="1476753229"/>
+                    <a16:rowId xmlns="" xmlns:a16="http://schemas.microsoft.com/office/drawing/2014/main" val="1476753229"/>
                   </a:ext>
                 </a:extLst>
               </a:tr>
@@ -18055,7 +18076,7 @@
           <p:nvPr>
             <p:extLst>
               <p:ext uri="{D42A27DB-BD31-4B8C-83A1-F6EECF244321}">
-                <p14:modId xmlns="" xmlns:p14="http://schemas.microsoft.com/office/powerpoint/2010/main" val="46705198"/>
+                <p14:modId xmlns:p14="http://schemas.microsoft.com/office/powerpoint/2010/main" xmlns="" val="46705198"/>
               </p:ext>
             </p:extLst>
           </p:nvPr>
@@ -19349,7 +19370,7 @@
     <a:masterClrMapping/>
   </p:clrMapOvr>
   <mc:AlternateContent xmlns:mc="http://schemas.openxmlformats.org/markup-compatibility/2006">
-    <mc:Choice xmlns="" xmlns:p14="http://schemas.microsoft.com/office/powerpoint/2010/main" Requires="p14">
+    <mc:Choice xmlns:p14="http://schemas.microsoft.com/office/powerpoint/2010/main" xmlns="" Requires="p14">
       <p:transition spd="slow" p14:dur="2000" advClick="0" advTm="5000"/>
     </mc:Choice>
     <mc:Fallback>
@@ -20001,7 +20022,7 @@
     <a:masterClrMapping/>
   </p:clrMapOvr>
   <mc:AlternateContent xmlns:mc="http://schemas.openxmlformats.org/markup-compatibility/2006">
-    <mc:Choice xmlns="" xmlns:p14="http://schemas.microsoft.com/office/powerpoint/2010/main" Requires="p14">
+    <mc:Choice xmlns:p14="http://schemas.microsoft.com/office/powerpoint/2010/main" xmlns="" Requires="p14">
       <p:transition spd="slow" p14:dur="2000" advClick="0" advTm="5000"/>
     </mc:Choice>
     <mc:Fallback>
@@ -20411,7 +20432,7 @@
     <a:masterClrMapping/>
   </p:clrMapOvr>
   <mc:AlternateContent xmlns:mc="http://schemas.openxmlformats.org/markup-compatibility/2006">
-    <mc:Choice xmlns="" xmlns:p14="http://schemas.microsoft.com/office/powerpoint/2010/main" Requires="p14">
+    <mc:Choice xmlns:p14="http://schemas.microsoft.com/office/powerpoint/2010/main" xmlns="" Requires="p14">
       <p:transition spd="slow" p14:dur="2000" advClick="0" advTm="5000"/>
     </mc:Choice>
     <mc:Fallback>
@@ -20670,14 +20691,14 @@
                 <a:gridCol w="863600">
                   <a:extLst>
                     <a:ext uri="{9D8B030D-6E8A-4147-A177-3AD203B41FA5}">
-                      <a16:colId xmlns:a16="http://schemas.microsoft.com/office/drawing/2014/main" xmlns="" val="1594468805"/>
+                      <a16:colId xmlns="" xmlns:a16="http://schemas.microsoft.com/office/drawing/2014/main" val="1594468805"/>
                     </a:ext>
                   </a:extLst>
                 </a:gridCol>
                 <a:gridCol w="1727200">
                   <a:extLst>
                     <a:ext uri="{9D8B030D-6E8A-4147-A177-3AD203B41FA5}">
-                      <a16:colId xmlns:a16="http://schemas.microsoft.com/office/drawing/2014/main" xmlns="" val="683614382"/>
+                      <a16:colId xmlns="" xmlns:a16="http://schemas.microsoft.com/office/drawing/2014/main" val="683614382"/>
                     </a:ext>
                   </a:extLst>
                 </a:gridCol>
@@ -20747,7 +20768,7 @@
                 </a:tc>
                 <a:extLst>
                   <a:ext uri="{0D108BD9-81ED-4DB2-BD59-A6C34878D82A}">
-                    <a16:rowId xmlns:a16="http://schemas.microsoft.com/office/drawing/2014/main" xmlns="" val="1969825376"/>
+                    <a16:rowId xmlns="" xmlns:a16="http://schemas.microsoft.com/office/drawing/2014/main" val="1969825376"/>
                   </a:ext>
                 </a:extLst>
               </a:tr>
@@ -20796,7 +20817,7 @@
                 </a:tc>
                 <a:extLst>
                   <a:ext uri="{0D108BD9-81ED-4DB2-BD59-A6C34878D82A}">
-                    <a16:rowId xmlns:a16="http://schemas.microsoft.com/office/drawing/2014/main" xmlns="" val="2845318136"/>
+                    <a16:rowId xmlns="" xmlns:a16="http://schemas.microsoft.com/office/drawing/2014/main" val="2845318136"/>
                   </a:ext>
                 </a:extLst>
               </a:tr>
@@ -20845,7 +20866,7 @@
                 </a:tc>
                 <a:extLst>
                   <a:ext uri="{0D108BD9-81ED-4DB2-BD59-A6C34878D82A}">
-                    <a16:rowId xmlns:a16="http://schemas.microsoft.com/office/drawing/2014/main" xmlns="" val="2968156586"/>
+                    <a16:rowId xmlns="" xmlns:a16="http://schemas.microsoft.com/office/drawing/2014/main" val="2968156586"/>
                   </a:ext>
                 </a:extLst>
               </a:tr>
@@ -20894,7 +20915,7 @@
                 </a:tc>
                 <a:extLst>
                   <a:ext uri="{0D108BD9-81ED-4DB2-BD59-A6C34878D82A}">
-                    <a16:rowId xmlns:a16="http://schemas.microsoft.com/office/drawing/2014/main" xmlns="" val="1476753229"/>
+                    <a16:rowId xmlns="" xmlns:a16="http://schemas.microsoft.com/office/drawing/2014/main" val="1476753229"/>
                   </a:ext>
                 </a:extLst>
               </a:tr>
@@ -20954,14 +20975,14 @@
                 <a:gridCol w="914400">
                   <a:extLst>
                     <a:ext uri="{9D8B030D-6E8A-4147-A177-3AD203B41FA5}">
-                      <a16:colId xmlns:a16="http://schemas.microsoft.com/office/drawing/2014/main" xmlns="" val="1594468805"/>
+                      <a16:colId xmlns="" xmlns:a16="http://schemas.microsoft.com/office/drawing/2014/main" val="1594468805"/>
                     </a:ext>
                   </a:extLst>
                 </a:gridCol>
                 <a:gridCol w="1752600">
                   <a:extLst>
                     <a:ext uri="{9D8B030D-6E8A-4147-A177-3AD203B41FA5}">
-                      <a16:colId xmlns:a16="http://schemas.microsoft.com/office/drawing/2014/main" xmlns="" val="683614382"/>
+                      <a16:colId xmlns="" xmlns:a16="http://schemas.microsoft.com/office/drawing/2014/main" val="683614382"/>
                     </a:ext>
                   </a:extLst>
                 </a:gridCol>
@@ -21027,7 +21048,7 @@
                 </a:tc>
                 <a:extLst>
                   <a:ext uri="{0D108BD9-81ED-4DB2-BD59-A6C34878D82A}">
-                    <a16:rowId xmlns:a16="http://schemas.microsoft.com/office/drawing/2014/main" xmlns="" val="1969825376"/>
+                    <a16:rowId xmlns="" xmlns:a16="http://schemas.microsoft.com/office/drawing/2014/main" val="1969825376"/>
                   </a:ext>
                 </a:extLst>
               </a:tr>
@@ -21076,7 +21097,7 @@
                 </a:tc>
                 <a:extLst>
                   <a:ext uri="{0D108BD9-81ED-4DB2-BD59-A6C34878D82A}">
-                    <a16:rowId xmlns:a16="http://schemas.microsoft.com/office/drawing/2014/main" xmlns="" val="2845318136"/>
+                    <a16:rowId xmlns="" xmlns:a16="http://schemas.microsoft.com/office/drawing/2014/main" val="2845318136"/>
                   </a:ext>
                 </a:extLst>
               </a:tr>
@@ -21125,7 +21146,7 @@
                 </a:tc>
                 <a:extLst>
                   <a:ext uri="{0D108BD9-81ED-4DB2-BD59-A6C34878D82A}">
-                    <a16:rowId xmlns:a16="http://schemas.microsoft.com/office/drawing/2014/main" xmlns="" val="2968156586"/>
+                    <a16:rowId xmlns="" xmlns:a16="http://schemas.microsoft.com/office/drawing/2014/main" val="2968156586"/>
                   </a:ext>
                 </a:extLst>
               </a:tr>
@@ -21174,7 +21195,7 @@
                 </a:tc>
                 <a:extLst>
                   <a:ext uri="{0D108BD9-81ED-4DB2-BD59-A6C34878D82A}">
-                    <a16:rowId xmlns:a16="http://schemas.microsoft.com/office/drawing/2014/main" xmlns="" val="1476753229"/>
+                    <a16:rowId xmlns="" xmlns:a16="http://schemas.microsoft.com/office/drawing/2014/main" val="1476753229"/>
                   </a:ext>
                 </a:extLst>
               </a:tr>
@@ -21407,7 +21428,7 @@
           <p:nvPr>
             <p:extLst>
               <p:ext uri="{D42A27DB-BD31-4B8C-83A1-F6EECF244321}">
-                <p14:modId xmlns="" xmlns:p14="http://schemas.microsoft.com/office/powerpoint/2010/main" val="46705198"/>
+                <p14:modId xmlns:p14="http://schemas.microsoft.com/office/powerpoint/2010/main" xmlns="" val="46705198"/>
               </p:ext>
             </p:extLst>
           </p:nvPr>
@@ -21913,7 +21934,7 @@
     <a:masterClrMapping/>
   </p:clrMapOvr>
   <mc:AlternateContent xmlns:mc="http://schemas.openxmlformats.org/markup-compatibility/2006">
-    <mc:Choice xmlns="" xmlns:p14="http://schemas.microsoft.com/office/powerpoint/2010/main" Requires="p14">
+    <mc:Choice xmlns:p14="http://schemas.microsoft.com/office/powerpoint/2010/main" xmlns="" Requires="p14">
       <p:transition spd="slow" p14:dur="2000" advClick="0" advTm="5000"/>
     </mc:Choice>
     <mc:Fallback>
@@ -22565,7 +22586,7 @@
     <a:masterClrMapping/>
   </p:clrMapOvr>
   <mc:AlternateContent xmlns:mc="http://schemas.openxmlformats.org/markup-compatibility/2006">
-    <mc:Choice xmlns="" xmlns:p14="http://schemas.microsoft.com/office/powerpoint/2010/main" Requires="p14">
+    <mc:Choice xmlns:p14="http://schemas.microsoft.com/office/powerpoint/2010/main" xmlns="" Requires="p14">
       <p:transition spd="slow" p14:dur="2000" advClick="0" advTm="5000"/>
     </mc:Choice>
     <mc:Fallback>
@@ -22721,7 +22742,7 @@
           <p:cNvPr id="5" name="Slide Number">
             <a:extLst>
               <a:ext uri="{FF2B5EF4-FFF2-40B4-BE49-F238E27FC236}">
-                <a16:creationId xmlns="" xmlns:a16="http://schemas.microsoft.com/office/drawing/2014/main" id="{6A760D59-0056-4F39-B077-DBDBE3D2927E}"/>
+                <a16:creationId xmlns:a16="http://schemas.microsoft.com/office/drawing/2014/main" xmlns="" id="{6A760D59-0056-4F39-B077-DBDBE3D2927E}"/>
               </a:ext>
             </a:extLst>
           </p:cNvPr>
@@ -22917,7 +22938,7 @@
     </p:spTree>
     <p:extLst>
       <p:ext uri="{BB962C8B-B14F-4D97-AF65-F5344CB8AC3E}">
-        <p14:creationId xmlns="" xmlns:p14="http://schemas.microsoft.com/office/powerpoint/2010/main" val="1646986932"/>
+        <p14:creationId xmlns:p14="http://schemas.microsoft.com/office/powerpoint/2010/main" xmlns="" val="1646986932"/>
       </p:ext>
     </p:extLst>
   </p:cSld>
@@ -22925,7 +22946,7 @@
     <a:masterClrMapping/>
   </p:clrMapOvr>
   <mc:AlternateContent xmlns:mc="http://schemas.openxmlformats.org/markup-compatibility/2006">
-    <mc:Choice xmlns="" xmlns:p14="http://schemas.microsoft.com/office/powerpoint/2010/main" Requires="p14">
+    <mc:Choice xmlns:p14="http://schemas.microsoft.com/office/powerpoint/2010/main" xmlns="" Requires="p14">
       <p:transition spd="slow" p14:dur="2000" advClick="0" advTm="5000"/>
     </mc:Choice>
     <mc:Fallback>
@@ -23166,11 +23187,7 @@
             </a:r>
             <a:r>
               <a:rPr lang="ru-RU" sz="3600" dirty="0" smtClean="0"/>
-              <a:t>във втората </a:t>
-            </a:r>
-            <a:r>
-              <a:rPr lang="ru-RU" sz="3600" dirty="0" smtClean="0"/>
-              <a:t>заявка</a:t>
+              <a:t>във втората заявка</a:t>
             </a:r>
           </a:p>
           <a:p>
@@ -23312,7 +23329,7 @@
     <a:masterClrMapping/>
   </p:clrMapOvr>
   <mc:AlternateContent xmlns:mc="http://schemas.openxmlformats.org/markup-compatibility/2006">
-    <mc:Choice xmlns="" xmlns:p14="http://schemas.microsoft.com/office/powerpoint/2010/main" Requires="p14">
+    <mc:Choice xmlns:p14="http://schemas.microsoft.com/office/powerpoint/2010/main" xmlns="" Requires="p14">
       <p:transition spd="slow" p14:dur="2000" advClick="0" advTm="5000"/>
     </mc:Choice>
     <mc:Fallback>
@@ -23463,11 +23480,7 @@
             </a:r>
             <a:r>
               <a:rPr lang="en-US" dirty="0" smtClean="0"/>
-              <a:t>(2</a:t>
-            </a:r>
-            <a:r>
-              <a:rPr lang="en-US" dirty="0" smtClean="0"/>
-              <a:t>)</a:t>
+              <a:t>(2)</a:t>
             </a:r>
             <a:endParaRPr lang="en-US" dirty="0"/>
           </a:p>
@@ -23495,14 +23508,14 @@
                 <a:gridCol w="863600">
                   <a:extLst>
                     <a:ext uri="{9D8B030D-6E8A-4147-A177-3AD203B41FA5}">
-                      <a16:colId xmlns:a16="http://schemas.microsoft.com/office/drawing/2014/main" xmlns="" val="1594468805"/>
+                      <a16:colId xmlns="" xmlns:a16="http://schemas.microsoft.com/office/drawing/2014/main" val="1594468805"/>
                     </a:ext>
                   </a:extLst>
                 </a:gridCol>
                 <a:gridCol w="1727200">
                   <a:extLst>
                     <a:ext uri="{9D8B030D-6E8A-4147-A177-3AD203B41FA5}">
-                      <a16:colId xmlns:a16="http://schemas.microsoft.com/office/drawing/2014/main" xmlns="" val="683614382"/>
+                      <a16:colId xmlns="" xmlns:a16="http://schemas.microsoft.com/office/drawing/2014/main" val="683614382"/>
                     </a:ext>
                   </a:extLst>
                 </a:gridCol>
@@ -23572,7 +23585,7 @@
                 </a:tc>
                 <a:extLst>
                   <a:ext uri="{0D108BD9-81ED-4DB2-BD59-A6C34878D82A}">
-                    <a16:rowId xmlns:a16="http://schemas.microsoft.com/office/drawing/2014/main" xmlns="" val="1969825376"/>
+                    <a16:rowId xmlns="" xmlns:a16="http://schemas.microsoft.com/office/drawing/2014/main" val="1969825376"/>
                   </a:ext>
                 </a:extLst>
               </a:tr>
@@ -23621,7 +23634,7 @@
                 </a:tc>
                 <a:extLst>
                   <a:ext uri="{0D108BD9-81ED-4DB2-BD59-A6C34878D82A}">
-                    <a16:rowId xmlns:a16="http://schemas.microsoft.com/office/drawing/2014/main" xmlns="" val="2845318136"/>
+                    <a16:rowId xmlns="" xmlns:a16="http://schemas.microsoft.com/office/drawing/2014/main" val="2845318136"/>
                   </a:ext>
                 </a:extLst>
               </a:tr>
@@ -23670,7 +23683,7 @@
                 </a:tc>
                 <a:extLst>
                   <a:ext uri="{0D108BD9-81ED-4DB2-BD59-A6C34878D82A}">
-                    <a16:rowId xmlns:a16="http://schemas.microsoft.com/office/drawing/2014/main" xmlns="" val="2968156586"/>
+                    <a16:rowId xmlns="" xmlns:a16="http://schemas.microsoft.com/office/drawing/2014/main" val="2968156586"/>
                   </a:ext>
                 </a:extLst>
               </a:tr>
@@ -23719,7 +23732,7 @@
                 </a:tc>
                 <a:extLst>
                   <a:ext uri="{0D108BD9-81ED-4DB2-BD59-A6C34878D82A}">
-                    <a16:rowId xmlns:a16="http://schemas.microsoft.com/office/drawing/2014/main" xmlns="" val="1476753229"/>
+                    <a16:rowId xmlns="" xmlns:a16="http://schemas.microsoft.com/office/drawing/2014/main" val="1476753229"/>
                   </a:ext>
                 </a:extLst>
               </a:tr>
@@ -23779,14 +23792,14 @@
                 <a:gridCol w="914400">
                   <a:extLst>
                     <a:ext uri="{9D8B030D-6E8A-4147-A177-3AD203B41FA5}">
-                      <a16:colId xmlns:a16="http://schemas.microsoft.com/office/drawing/2014/main" xmlns="" val="1594468805"/>
+                      <a16:colId xmlns="" xmlns:a16="http://schemas.microsoft.com/office/drawing/2014/main" val="1594468805"/>
                     </a:ext>
                   </a:extLst>
                 </a:gridCol>
                 <a:gridCol w="1752600">
                   <a:extLst>
                     <a:ext uri="{9D8B030D-6E8A-4147-A177-3AD203B41FA5}">
-                      <a16:colId xmlns:a16="http://schemas.microsoft.com/office/drawing/2014/main" xmlns="" val="683614382"/>
+                      <a16:colId xmlns="" xmlns:a16="http://schemas.microsoft.com/office/drawing/2014/main" val="683614382"/>
                     </a:ext>
                   </a:extLst>
                 </a:gridCol>
@@ -23852,7 +23865,7 @@
                 </a:tc>
                 <a:extLst>
                   <a:ext uri="{0D108BD9-81ED-4DB2-BD59-A6C34878D82A}">
-                    <a16:rowId xmlns:a16="http://schemas.microsoft.com/office/drawing/2014/main" xmlns="" val="1969825376"/>
+                    <a16:rowId xmlns="" xmlns:a16="http://schemas.microsoft.com/office/drawing/2014/main" val="1969825376"/>
                   </a:ext>
                 </a:extLst>
               </a:tr>
@@ -23901,7 +23914,7 @@
                 </a:tc>
                 <a:extLst>
                   <a:ext uri="{0D108BD9-81ED-4DB2-BD59-A6C34878D82A}">
-                    <a16:rowId xmlns:a16="http://schemas.microsoft.com/office/drawing/2014/main" xmlns="" val="2845318136"/>
+                    <a16:rowId xmlns="" xmlns:a16="http://schemas.microsoft.com/office/drawing/2014/main" val="2845318136"/>
                   </a:ext>
                 </a:extLst>
               </a:tr>
@@ -23950,7 +23963,7 @@
                 </a:tc>
                 <a:extLst>
                   <a:ext uri="{0D108BD9-81ED-4DB2-BD59-A6C34878D82A}">
-                    <a16:rowId xmlns:a16="http://schemas.microsoft.com/office/drawing/2014/main" xmlns="" val="2968156586"/>
+                    <a16:rowId xmlns="" xmlns:a16="http://schemas.microsoft.com/office/drawing/2014/main" val="2968156586"/>
                   </a:ext>
                 </a:extLst>
               </a:tr>
@@ -23999,7 +24012,7 @@
                 </a:tc>
                 <a:extLst>
                   <a:ext uri="{0D108BD9-81ED-4DB2-BD59-A6C34878D82A}">
-                    <a16:rowId xmlns:a16="http://schemas.microsoft.com/office/drawing/2014/main" xmlns="" val="1476753229"/>
+                    <a16:rowId xmlns="" xmlns:a16="http://schemas.microsoft.com/office/drawing/2014/main" val="1476753229"/>
                   </a:ext>
                 </a:extLst>
               </a:tr>
@@ -24232,7 +24245,7 @@
           <p:nvPr>
             <p:extLst>
               <p:ext uri="{D42A27DB-BD31-4B8C-83A1-F6EECF244321}">
-                <p14:modId xmlns="" xmlns:p14="http://schemas.microsoft.com/office/powerpoint/2010/main" val="46705198"/>
+                <p14:modId xmlns:p14="http://schemas.microsoft.com/office/powerpoint/2010/main" xmlns="" val="46705198"/>
               </p:ext>
             </p:extLst>
           </p:nvPr>
@@ -24492,16 +24505,6 @@
                         </a:rPr>
                         <a:t>1</a:t>
                       </a:r>
-                      <a:endParaRPr kumimoji="1" lang="en-US" sz="2200" b="0" i="0" u="none" strike="noStrike" cap="none" normalizeH="0" baseline="0" noProof="1" smtClean="0">
-                        <a:ln>
-                          <a:noFill/>
-                        </a:ln>
-                        <a:solidFill>
-                          <a:schemeClr val="tx1"/>
-                        </a:solidFill>
-                        <a:effectLst/>
-                        <a:latin typeface="+mn-lt"/>
-                      </a:endParaRPr>
                     </a:p>
                   </a:txBody>
                   <a:tcPr marL="91464" marR="91464" anchor="ctr" horzOverflow="overflow">
@@ -24699,16 +24702,6 @@
                         </a:rPr>
                         <a:t>3</a:t>
                       </a:r>
-                      <a:endParaRPr kumimoji="1" lang="en-US" sz="2200" b="0" i="0" u="none" strike="noStrike" cap="none" normalizeH="0" baseline="0" noProof="1" smtClean="0">
-                        <a:ln>
-                          <a:noFill/>
-                        </a:ln>
-                        <a:solidFill>
-                          <a:schemeClr val="tx1"/>
-                        </a:solidFill>
-                        <a:effectLst/>
-                        <a:latin typeface="+mn-lt"/>
-                      </a:endParaRPr>
                     </a:p>
                   </a:txBody>
                   <a:tcPr marL="91464" marR="91464" anchor="ctr" horzOverflow="overflow">
@@ -24955,7 +24948,7 @@
     <a:masterClrMapping/>
   </p:clrMapOvr>
   <mc:AlternateContent xmlns:mc="http://schemas.openxmlformats.org/markup-compatibility/2006">
-    <mc:Choice xmlns="" xmlns:p14="http://schemas.microsoft.com/office/powerpoint/2010/main" Requires="p14">
+    <mc:Choice xmlns:p14="http://schemas.microsoft.com/office/powerpoint/2010/main" xmlns="" Requires="p14">
       <p:transition spd="slow" p14:dur="2000" advClick="0" advTm="5000"/>
     </mc:Choice>
     <mc:Fallback>
@@ -25204,11 +25197,7 @@
             </a:r>
             <a:r>
               <a:rPr lang="en-US" dirty="0" smtClean="0"/>
-              <a:t>(3</a:t>
-            </a:r>
-            <a:r>
-              <a:rPr lang="en-US" dirty="0" smtClean="0"/>
-              <a:t>)</a:t>
+              <a:t>(3)</a:t>
             </a:r>
             <a:endParaRPr lang="en-US" dirty="0"/>
           </a:p>
@@ -25330,13 +25319,6 @@
               </a:rPr>
               <a:t>EXCEPT</a:t>
             </a:r>
-            <a:endParaRPr lang="en-US" sz="2800" b="1" noProof="1" smtClean="0">
-              <a:solidFill>
-                <a:schemeClr val="bg1"/>
-              </a:solidFill>
-              <a:latin typeface="Consolas" pitchFamily="49" charset="0"/>
-              <a:cs typeface="Consolas" pitchFamily="49" charset="0"/>
-            </a:endParaRPr>
           </a:p>
           <a:p>
             <a:pPr eaLnBrk="0" hangingPunct="0">
@@ -25383,14 +25365,7 @@
                 <a:latin typeface="Consolas" pitchFamily="49" charset="0"/>
                 <a:cs typeface="Consolas" pitchFamily="49" charset="0"/>
               </a:rPr>
-              <a:t> </a:t>
-            </a:r>
-            <a:r>
-              <a:rPr lang="en-US" sz="2800" b="1" noProof="1" smtClean="0">
-                <a:latin typeface="Consolas" pitchFamily="49" charset="0"/>
-                <a:cs typeface="Consolas" pitchFamily="49" charset="0"/>
-              </a:rPr>
-              <a:t>LocalShop</a:t>
+              <a:t> LocalShop</a:t>
             </a:r>
             <a:endParaRPr lang="en-US" sz="2800" b="1" noProof="1">
               <a:latin typeface="Consolas" pitchFamily="49" charset="0"/>
@@ -25633,7 +25608,7 @@
     <a:masterClrMapping/>
   </p:clrMapOvr>
   <mc:AlternateContent xmlns:mc="http://schemas.openxmlformats.org/markup-compatibility/2006">
-    <mc:Choice xmlns="" xmlns:p14="http://schemas.microsoft.com/office/powerpoint/2010/main" Requires="p14">
+    <mc:Choice xmlns:p14="http://schemas.microsoft.com/office/powerpoint/2010/main" xmlns="" Requires="p14">
       <p:transition spd="slow" p14:dur="2000" advClick="0" advTm="5000"/>
     </mc:Choice>
     <mc:Fallback>
@@ -25862,11 +25837,7 @@
             </a:r>
             <a:r>
               <a:rPr lang="ru-RU" sz="3600" dirty="0" smtClean="0"/>
-              <a:t>оказва </a:t>
-            </a:r>
-            <a:r>
-              <a:rPr lang="ru-RU" sz="3600" dirty="0" smtClean="0"/>
-              <a:t>какви стойности от първата таблица </a:t>
+              <a:t>оказва какви стойности от първата таблица </a:t>
             </a:r>
             <a:r>
               <a:rPr lang="ru-RU" sz="3600" b="1" dirty="0" smtClean="0">
@@ -25880,7 +25851,6 @@
               <a:rPr lang="ru-RU" sz="3600" dirty="0" smtClean="0"/>
               <a:t> на всички стойности от втората таблица</a:t>
             </a:r>
-            <a:endParaRPr lang="ru-RU" sz="3600" dirty="0" smtClean="0"/>
           </a:p>
           <a:p>
             <a:pPr lvl="1">
@@ -26001,7 +25971,7 @@
     <a:masterClrMapping/>
   </p:clrMapOvr>
   <mc:AlternateContent xmlns:mc="http://schemas.openxmlformats.org/markup-compatibility/2006">
-    <mc:Choice xmlns="" xmlns:p14="http://schemas.microsoft.com/office/powerpoint/2010/main" Requires="p14">
+    <mc:Choice xmlns:p14="http://schemas.microsoft.com/office/powerpoint/2010/main" xmlns="" Requires="p14">
       <p:transition spd="slow" p14:dur="2000" advClick="0" advTm="5000"/>
     </mc:Choice>
     <mc:Fallback>
@@ -26279,11 +26249,7 @@
             </a:r>
             <a:r>
               <a:rPr lang="en-US" smtClean="0"/>
-              <a:t> </a:t>
-            </a:r>
-            <a:r>
-              <a:rPr lang="en-US" smtClean="0"/>
-              <a:t>(2)</a:t>
+              <a:t> (2)</a:t>
             </a:r>
             <a:endParaRPr lang="en-US" dirty="0"/>
           </a:p>
@@ -26354,14 +26320,7 @@
                 <a:latin typeface="Consolas" pitchFamily="49" charset="0"/>
                 <a:cs typeface="Consolas" pitchFamily="49" charset="0"/>
               </a:rPr>
-              <a:t> </a:t>
-            </a:r>
-            <a:r>
-              <a:rPr lang="en-US" sz="2400" b="1" noProof="1" smtClean="0">
-                <a:latin typeface="Consolas" pitchFamily="49" charset="0"/>
-                <a:cs typeface="Consolas" pitchFamily="49" charset="0"/>
-              </a:rPr>
-              <a:t>StudentId FROM EnrolledCourses </a:t>
+              <a:t> StudentId FROM EnrolledCourses </a:t>
             </a:r>
             <a:endParaRPr lang="bg-BG" sz="2400" b="1" noProof="1" smtClean="0">
               <a:latin typeface="Consolas" pitchFamily="49" charset="0"/>
@@ -26389,27 +26348,7 @@
                 <a:latin typeface="Consolas" pitchFamily="49" charset="0"/>
                 <a:cs typeface="Consolas" pitchFamily="49" charset="0"/>
               </a:rPr>
-              <a:t>WHERE </a:t>
-            </a:r>
-            <a:r>
-              <a:rPr lang="en-US" sz="2400" b="1" noProof="1" smtClean="0">
-                <a:solidFill>
-                  <a:schemeClr val="bg1"/>
-                </a:solidFill>
-                <a:latin typeface="Consolas" pitchFamily="49" charset="0"/>
-                <a:cs typeface="Consolas" pitchFamily="49" charset="0"/>
-              </a:rPr>
-              <a:t>NOT </a:t>
-            </a:r>
-            <a:r>
-              <a:rPr lang="en-US" sz="2400" b="1" noProof="1" smtClean="0">
-                <a:solidFill>
-                  <a:schemeClr val="bg1"/>
-                </a:solidFill>
-                <a:latin typeface="Consolas" pitchFamily="49" charset="0"/>
-                <a:cs typeface="Consolas" pitchFamily="49" charset="0"/>
-              </a:rPr>
-              <a:t>EXISTS </a:t>
+              <a:t>WHERE NOT EXISTS </a:t>
             </a:r>
             <a:r>
               <a:rPr lang="en-US" sz="2400" b="1" noProof="1" smtClean="0">
@@ -26478,14 +26417,7 @@
                 <a:latin typeface="Consolas" pitchFamily="49" charset="0"/>
                 <a:cs typeface="Consolas" pitchFamily="49" charset="0"/>
               </a:rPr>
-              <a:t> </a:t>
-            </a:r>
-            <a:r>
-              <a:rPr lang="en-US" sz="2400" b="1" noProof="1" smtClean="0">
-                <a:latin typeface="Consolas" pitchFamily="49" charset="0"/>
-                <a:cs typeface="Consolas" pitchFamily="49" charset="0"/>
-              </a:rPr>
-              <a:t>MandatoryCourses </a:t>
+              <a:t> MandatoryCourses </a:t>
             </a:r>
             <a:endParaRPr lang="bg-BG" sz="2400" b="1" noProof="1" smtClean="0">
               <a:latin typeface="Consolas" pitchFamily="49" charset="0"/>
@@ -26520,27 +26452,7 @@
                 <a:latin typeface="Consolas" pitchFamily="49" charset="0"/>
                 <a:cs typeface="Consolas" pitchFamily="49" charset="0"/>
               </a:rPr>
-              <a:t>WHERE </a:t>
-            </a:r>
-            <a:r>
-              <a:rPr lang="en-US" sz="2400" b="1" noProof="1" smtClean="0">
-                <a:solidFill>
-                  <a:schemeClr val="bg1"/>
-                </a:solidFill>
-                <a:latin typeface="Consolas" pitchFamily="49" charset="0"/>
-                <a:cs typeface="Consolas" pitchFamily="49" charset="0"/>
-              </a:rPr>
-              <a:t>NOT </a:t>
-            </a:r>
-            <a:r>
-              <a:rPr lang="en-US" sz="2400" b="1" noProof="1" smtClean="0">
-                <a:solidFill>
-                  <a:schemeClr val="bg1"/>
-                </a:solidFill>
-                <a:latin typeface="Consolas" pitchFamily="49" charset="0"/>
-                <a:cs typeface="Consolas" pitchFamily="49" charset="0"/>
-              </a:rPr>
-              <a:t>EXISTS </a:t>
+              <a:t>WHERE NOT EXISTS </a:t>
             </a:r>
             <a:r>
               <a:rPr lang="en-US" sz="2400" b="1" noProof="1" smtClean="0">
@@ -26575,17 +26487,7 @@
                 <a:latin typeface="Consolas" pitchFamily="49" charset="0"/>
                 <a:cs typeface="Consolas" pitchFamily="49" charset="0"/>
               </a:rPr>
-              <a:t>	</a:t>
-            </a:r>
-            <a:r>
-              <a:rPr lang="bg-BG" sz="2400" b="1" noProof="1" smtClean="0">
-                <a:solidFill>
-                  <a:schemeClr val="bg1"/>
-                </a:solidFill>
-                <a:latin typeface="Consolas" pitchFamily="49" charset="0"/>
-                <a:cs typeface="Consolas" pitchFamily="49" charset="0"/>
-              </a:rPr>
-              <a:t>	</a:t>
+              <a:t>		</a:t>
             </a:r>
             <a:r>
               <a:rPr lang="en-US" sz="2400" b="1" noProof="1" smtClean="0">
@@ -26602,14 +26504,7 @@
                 <a:latin typeface="Consolas" pitchFamily="49" charset="0"/>
                 <a:cs typeface="Consolas" pitchFamily="49" charset="0"/>
               </a:rPr>
-              <a:t> </a:t>
-            </a:r>
-            <a:r>
-              <a:rPr lang="en-US" sz="2400" b="1" noProof="1" smtClean="0">
-                <a:latin typeface="Consolas" pitchFamily="49" charset="0"/>
-                <a:cs typeface="Consolas" pitchFamily="49" charset="0"/>
-              </a:rPr>
-              <a:t>* </a:t>
+              <a:t> * </a:t>
             </a:r>
             <a:r>
               <a:rPr lang="en-US" sz="2400" b="1" noProof="1" smtClean="0">
@@ -26626,21 +26521,7 @@
                 <a:latin typeface="Consolas" pitchFamily="49" charset="0"/>
                 <a:cs typeface="Consolas" pitchFamily="49" charset="0"/>
               </a:rPr>
-              <a:t>EnrolledCourses </a:t>
-            </a:r>
-            <a:r>
-              <a:rPr lang="en-US" sz="2400" b="1" noProof="1" smtClean="0">
-                <a:latin typeface="Consolas" pitchFamily="49" charset="0"/>
-                <a:cs typeface="Consolas" pitchFamily="49" charset="0"/>
-              </a:rPr>
-              <a:t>AS </a:t>
-            </a:r>
-            <a:r>
-              <a:rPr lang="en-US" sz="2400" b="1" noProof="1" smtClean="0">
-                <a:latin typeface="Consolas" pitchFamily="49" charset="0"/>
-                <a:cs typeface="Consolas" pitchFamily="49" charset="0"/>
-              </a:rPr>
-              <a:t>ec </a:t>
+              <a:t>EnrolledCourses AS ec </a:t>
             </a:r>
             <a:r>
               <a:rPr lang="bg-BG" sz="2400" b="1" noProof="1" smtClean="0">
@@ -26664,21 +26545,7 @@
                 <a:latin typeface="Consolas" pitchFamily="49" charset="0"/>
                 <a:cs typeface="Consolas" pitchFamily="49" charset="0"/>
               </a:rPr>
-              <a:t> ec.SudentId </a:t>
-            </a:r>
-            <a:r>
-              <a:rPr lang="en-US" sz="2400" b="1" noProof="1" smtClean="0">
-                <a:latin typeface="Consolas" pitchFamily="49" charset="0"/>
-                <a:cs typeface="Consolas" pitchFamily="49" charset="0"/>
-              </a:rPr>
-              <a:t>= </a:t>
-            </a:r>
-            <a:r>
-              <a:rPr lang="en-US" sz="2400" b="1" noProof="1" smtClean="0">
-                <a:latin typeface="Consolas" pitchFamily="49" charset="0"/>
-                <a:cs typeface="Consolas" pitchFamily="49" charset="0"/>
-              </a:rPr>
-              <a:t>EnrolledCourses.StudentId </a:t>
+              <a:t> ec.SudentId = EnrolledCourses.StudentId </a:t>
             </a:r>
             <a:r>
               <a:rPr lang="bg-BG" sz="2400" b="1" noProof="1" smtClean="0">
@@ -26692,21 +26559,7 @@
                 <a:latin typeface="Consolas" pitchFamily="49" charset="0"/>
                 <a:cs typeface="Consolas" pitchFamily="49" charset="0"/>
               </a:rPr>
-              <a:t>	AND ec.CourseId </a:t>
-            </a:r>
-            <a:r>
-              <a:rPr lang="en-US" sz="2400" b="1" noProof="1" smtClean="0">
-                <a:latin typeface="Consolas" pitchFamily="49" charset="0"/>
-                <a:cs typeface="Consolas" pitchFamily="49" charset="0"/>
-              </a:rPr>
-              <a:t>= </a:t>
-            </a:r>
-            <a:r>
-              <a:rPr lang="en-US" sz="2400" b="1" noProof="1" smtClean="0">
-                <a:latin typeface="Consolas" pitchFamily="49" charset="0"/>
-                <a:cs typeface="Consolas" pitchFamily="49" charset="0"/>
-              </a:rPr>
-              <a:t>NandatoryCourses.Course_id</a:t>
+              <a:t>	AND ec.CourseId = NandatoryCourses.Course_id</a:t>
             </a:r>
             <a:endParaRPr lang="bg-BG" sz="2400" b="1" noProof="1" smtClean="0">
               <a:latin typeface="Consolas" pitchFamily="49" charset="0"/>
@@ -26731,14 +26584,7 @@
                 <a:latin typeface="Consolas" pitchFamily="49" charset="0"/>
                 <a:cs typeface="Consolas" pitchFamily="49" charset="0"/>
               </a:rPr>
-              <a:t>	</a:t>
-            </a:r>
-            <a:r>
-              <a:rPr lang="bg-BG" sz="2400" b="1" noProof="1" smtClean="0">
-                <a:latin typeface="Consolas" pitchFamily="49" charset="0"/>
-                <a:cs typeface="Consolas" pitchFamily="49" charset="0"/>
-              </a:rPr>
-              <a:t>)</a:t>
+              <a:t>	)</a:t>
             </a:r>
           </a:p>
           <a:p>
@@ -26774,7 +26620,7 @@
     <a:masterClrMapping/>
   </p:clrMapOvr>
   <mc:AlternateContent xmlns:mc="http://schemas.openxmlformats.org/markup-compatibility/2006">
-    <mc:Choice xmlns="" xmlns:p14="http://schemas.microsoft.com/office/powerpoint/2010/main" Requires="p14">
+    <mc:Choice xmlns:p14="http://schemas.microsoft.com/office/powerpoint/2010/main" xmlns="" Requires="p14">
       <p:transition spd="slow" p14:dur="2000" advClick="0" advTm="5000"/>
     </mc:Choice>
     <mc:Fallback>
@@ -27027,7 +26873,7 @@
           <p:cNvPr id="9" name="Summary Box Group">
             <a:extLst>
               <a:ext uri="{FF2B5EF4-FFF2-40B4-BE49-F238E27FC236}">
-                <a16:creationId xmlns="" xmlns:a16="http://schemas.microsoft.com/office/drawing/2014/main" id="{EBAFE522-EB7D-4931-A015-9A7E8A98517D}"/>
+                <a16:creationId xmlns:a16="http://schemas.microsoft.com/office/drawing/2014/main" xmlns="" id="{EBAFE522-EB7D-4931-A015-9A7E8A98517D}"/>
               </a:ext>
             </a:extLst>
           </p:cNvPr>
@@ -27047,7 +26893,7 @@
             <p:cNvPr id="10" name="Rounded Rectangle Blue">
               <a:extLst>
                 <a:ext uri="{FF2B5EF4-FFF2-40B4-BE49-F238E27FC236}">
-                  <a16:creationId xmlns="" xmlns:a16="http://schemas.microsoft.com/office/drawing/2014/main" id="{18F78F23-3D09-4B63-8DF9-D49CFBB145EE}"/>
+                  <a16:creationId xmlns:a16="http://schemas.microsoft.com/office/drawing/2014/main" xmlns="" id="{18F78F23-3D09-4B63-8DF9-D49CFBB145EE}"/>
                 </a:ext>
               </a:extLst>
             </p:cNvPr>
@@ -27101,7 +26947,7 @@
             <p:cNvPr id="11" name="Rounded Rectangle Left">
               <a:extLst>
                 <a:ext uri="{FF2B5EF4-FFF2-40B4-BE49-F238E27FC236}">
-                  <a16:creationId xmlns="" xmlns:a16="http://schemas.microsoft.com/office/drawing/2014/main" id="{F12C06CE-2BBE-46C2-B718-813794C58DF9}"/>
+                  <a16:creationId xmlns:a16="http://schemas.microsoft.com/office/drawing/2014/main" xmlns="" id="{F12C06CE-2BBE-46C2-B718-813794C58DF9}"/>
                 </a:ext>
               </a:extLst>
             </p:cNvPr>
@@ -27161,7 +27007,7 @@
             <p:cNvPr id="12" name="Half Frame Top Right">
               <a:extLst>
                 <a:ext uri="{FF2B5EF4-FFF2-40B4-BE49-F238E27FC236}">
-                  <a16:creationId xmlns="" xmlns:a16="http://schemas.microsoft.com/office/drawing/2014/main" id="{66CDBB1E-AF3C-43FC-9F34-2DD691F81726}"/>
+                  <a16:creationId xmlns:a16="http://schemas.microsoft.com/office/drawing/2014/main" xmlns="" id="{66CDBB1E-AF3C-43FC-9F34-2DD691F81726}"/>
                 </a:ext>
               </a:extLst>
             </p:cNvPr>
@@ -27223,7 +27069,7 @@
           <p:cNvPr id="14" name="Text Placeholder Body">
             <a:extLst>
               <a:ext uri="{FF2B5EF4-FFF2-40B4-BE49-F238E27FC236}">
-                <a16:creationId xmlns="" xmlns:a16="http://schemas.microsoft.com/office/drawing/2014/main" id="{0E49D336-45B6-44D3-97C4-E28F8DEA2022}"/>
+                <a16:creationId xmlns:a16="http://schemas.microsoft.com/office/drawing/2014/main" xmlns="" id="{0E49D336-45B6-44D3-97C4-E28F8DEA2022}"/>
               </a:ext>
             </a:extLst>
           </p:cNvPr>
@@ -27354,11 +27200,6 @@
               </a:rPr>
               <a:t>Данни от повече от 2 таблици</a:t>
             </a:r>
-            <a:endParaRPr lang="bg-BG" sz="2400" dirty="0" smtClean="0">
-              <a:solidFill>
-                <a:schemeClr val="bg2"/>
-              </a:solidFill>
-            </a:endParaRPr>
           </a:p>
           <a:p>
             <a:pPr marL="360363" indent="-360000" fontAlgn="base">
@@ -27426,23 +27267,7 @@
                   <a:schemeClr val="bg2"/>
                 </a:solidFill>
               </a:rPr>
-              <a:t> </a:t>
-            </a:r>
-            <a:r>
-              <a:rPr lang="ru-RU" sz="2400" dirty="0" smtClean="0">
-                <a:solidFill>
-                  <a:schemeClr val="bg2"/>
-                </a:solidFill>
-              </a:rPr>
-              <a:t>за влагане на </a:t>
-            </a:r>
-            <a:r>
-              <a:rPr lang="ru-RU" sz="2400" dirty="0" smtClean="0">
-                <a:solidFill>
-                  <a:schemeClr val="bg2"/>
-                </a:solidFill>
-              </a:rPr>
-              <a:t>заявки</a:t>
+              <a:t> за влагане на заявки</a:t>
             </a:r>
           </a:p>
           <a:p>
@@ -27495,15 +27320,7 @@
             </a:r>
             <a:r>
               <a:rPr lang="ru-RU" sz="2600" dirty="0" smtClean="0"/>
-              <a:t>уникални </a:t>
-            </a:r>
-            <a:r>
-              <a:rPr lang="ru-RU" sz="2600" dirty="0" smtClean="0"/>
-              <a:t>редове от две или повече </a:t>
-            </a:r>
-            <a:r>
-              <a:rPr lang="ru-RU" sz="2600" dirty="0" smtClean="0"/>
-              <a:t>заявки</a:t>
+              <a:t>уникални редове от две или повече заявки</a:t>
             </a:r>
             <a:endParaRPr lang="en-US" sz="2600" dirty="0" smtClean="0"/>
           </a:p>
@@ -27544,15 +27361,7 @@
             </a:r>
             <a:r>
               <a:rPr lang="ru-RU" sz="2600" dirty="0" smtClean="0"/>
-              <a:t> </a:t>
-            </a:r>
-            <a:r>
-              <a:rPr lang="ru-RU" sz="2600" dirty="0" smtClean="0"/>
-              <a:t>редове между резултатите на две или повече </a:t>
-            </a:r>
-            <a:r>
-              <a:rPr lang="ru-RU" sz="2600" dirty="0" smtClean="0"/>
-              <a:t>заявки</a:t>
+              <a:t> редове между резултатите на две или повече заявки</a:t>
             </a:r>
           </a:p>
           <a:p>
@@ -27595,23 +27404,7 @@
             </a:r>
             <a:r>
               <a:rPr lang="ru-RU" sz="2600" dirty="0" smtClean="0"/>
-              <a:t>редове </a:t>
-            </a:r>
-            <a:r>
-              <a:rPr lang="ru-RU" sz="2600" dirty="0" smtClean="0"/>
-              <a:t>от първата </a:t>
-            </a:r>
-            <a:r>
-              <a:rPr lang="ru-RU" sz="2600" dirty="0" smtClean="0"/>
-              <a:t>заявка</a:t>
-            </a:r>
-            <a:r>
-              <a:rPr lang="ru-RU" sz="2600" dirty="0" smtClean="0"/>
-              <a:t>, които не се срещат във втората </a:t>
-            </a:r>
-            <a:r>
-              <a:rPr lang="ru-RU" sz="2600" dirty="0" smtClean="0"/>
-              <a:t>заявка</a:t>
+              <a:t>редове от първата заявка, които не се срещат във втората заявка</a:t>
             </a:r>
             <a:endParaRPr lang="en-US" sz="2600" dirty="0" smtClean="0"/>
           </a:p>
@@ -27644,19 +27437,7 @@
             </a:r>
             <a:r>
               <a:rPr lang="ru-RU" sz="2600" dirty="0" smtClean="0"/>
-              <a:t>стойности </a:t>
-            </a:r>
-            <a:r>
-              <a:rPr lang="ru-RU" sz="2600" dirty="0" smtClean="0"/>
-              <a:t>от първата таблица, </a:t>
-            </a:r>
-            <a:r>
-              <a:rPr lang="ru-RU" sz="2600" dirty="0" smtClean="0"/>
-              <a:t>съответстващи  </a:t>
-            </a:r>
-            <a:r>
-              <a:rPr lang="ru-RU" sz="2600" dirty="0" smtClean="0"/>
-              <a:t>на всички стойности от втората таблица</a:t>
+              <a:t>стойности от първата таблица, съответстващи  на всички стойности от втората таблица</a:t>
             </a:r>
             <a:r>
               <a:rPr lang="bg-BG" sz="2600" dirty="0" smtClean="0"/>
@@ -27671,7 +27452,7 @@
           <p:cNvPr id="17" name="Slide Number">
             <a:extLst>
               <a:ext uri="{FF2B5EF4-FFF2-40B4-BE49-F238E27FC236}">
-                <a16:creationId xmlns="" xmlns:a16="http://schemas.microsoft.com/office/drawing/2014/main" id="{9DE5559F-55C2-47F1-A321-B593B1EC63C1}"/>
+                <a16:creationId xmlns:a16="http://schemas.microsoft.com/office/drawing/2014/main" xmlns="" id="{9DE5559F-55C2-47F1-A321-B593B1EC63C1}"/>
               </a:ext>
             </a:extLst>
           </p:cNvPr>
@@ -27713,7 +27494,7 @@
           <p:cNvPr id="13" name="Picture SoftUni Mascot">
             <a:extLst>
               <a:ext uri="{FF2B5EF4-FFF2-40B4-BE49-F238E27FC236}">
-                <a16:creationId xmlns="" xmlns:a16="http://schemas.microsoft.com/office/drawing/2014/main" id="{CCC3A316-993C-4741-8826-E104F27650A3}"/>
+                <a16:creationId xmlns:a16="http://schemas.microsoft.com/office/drawing/2014/main" xmlns="" id="{CCC3A316-993C-4741-8826-E104F27650A3}"/>
               </a:ext>
             </a:extLst>
           </p:cNvPr>
@@ -27726,7 +27507,7 @@
           <a:blip r:embed="rId3" cstate="print">
             <a:extLst>
               <a:ext uri="{28A0092B-C50C-407E-A947-70E740481C1C}">
-                <a14:useLocalDpi xmlns="" xmlns:a14="http://schemas.microsoft.com/office/drawing/2010/main" val="0"/>
+                <a14:useLocalDpi xmlns:a14="http://schemas.microsoft.com/office/drawing/2010/main" xmlns="" val="0"/>
               </a:ext>
             </a:extLst>
           </a:blip>
@@ -27771,7 +27552,7 @@
     </p:spTree>
     <p:extLst>
       <p:ext uri="{BB962C8B-B14F-4D97-AF65-F5344CB8AC3E}">
-        <p14:creationId xmlns="" xmlns:p14="http://schemas.microsoft.com/office/powerpoint/2010/main" val="2087190546"/>
+        <p14:creationId xmlns:p14="http://schemas.microsoft.com/office/powerpoint/2010/main" xmlns="" val="2087190546"/>
       </p:ext>
     </p:extLst>
   </p:cSld>
@@ -27779,7 +27560,7 @@
     <a:masterClrMapping/>
   </p:clrMapOvr>
   <mc:AlternateContent xmlns:mc="http://schemas.openxmlformats.org/markup-compatibility/2006">
-    <mc:Choice xmlns="" xmlns:p14="http://schemas.microsoft.com/office/powerpoint/2010/main" Requires="p14">
+    <mc:Choice xmlns:p14="http://schemas.microsoft.com/office/powerpoint/2010/main" xmlns="" Requires="p14">
       <p:transition spd="slow" p14:dur="2000" advClick="0" advTm="5000"/>
     </mc:Choice>
     <mc:Fallback>
@@ -28166,7 +27947,7 @@
           <p:cNvPr id="5" name="Group 4">
             <a:extLst>
               <a:ext uri="{FF2B5EF4-FFF2-40B4-BE49-F238E27FC236}">
-                <a16:creationId xmlns="" xmlns:a16="http://schemas.microsoft.com/office/drawing/2014/main" id="{1A67F800-7980-E3CA-7188-3C478C8E98B8}"/>
+                <a16:creationId xmlns:a16="http://schemas.microsoft.com/office/drawing/2014/main" xmlns="" id="{1A67F800-7980-E3CA-7188-3C478C8E98B8}"/>
               </a:ext>
             </a:extLst>
           </p:cNvPr>
@@ -28186,7 +27967,7 @@
             <p:cNvPr id="7" name="Picture 6" descr="A picture containing text, sign, vector graphics&#10;&#10;Description automatically generated">
               <a:extLst>
                 <a:ext uri="{FF2B5EF4-FFF2-40B4-BE49-F238E27FC236}">
-                  <a16:creationId xmlns="" xmlns:a16="http://schemas.microsoft.com/office/drawing/2014/main" id="{15CE28B1-02BA-4014-E149-BF1EE09447ED}"/>
+                  <a16:creationId xmlns:a16="http://schemas.microsoft.com/office/drawing/2014/main" xmlns="" id="{15CE28B1-02BA-4014-E149-BF1EE09447ED}"/>
                 </a:ext>
               </a:extLst>
             </p:cNvPr>
@@ -28216,7 +27997,7 @@
             <p:cNvPr id="9" name="Picture 8" descr="Logo&#10;&#10;Description automatically generated">
               <a:extLst>
                 <a:ext uri="{FF2B5EF4-FFF2-40B4-BE49-F238E27FC236}">
-                  <a16:creationId xmlns="" xmlns:a16="http://schemas.microsoft.com/office/drawing/2014/main" id="{5F82FF4F-4AD2-4B3B-1445-F3C6BA268522}"/>
+                  <a16:creationId xmlns:a16="http://schemas.microsoft.com/office/drawing/2014/main" xmlns="" id="{5F82FF4F-4AD2-4B3B-1445-F3C6BA268522}"/>
                 </a:ext>
               </a:extLst>
             </p:cNvPr>
@@ -28246,7 +28027,7 @@
             <p:cNvPr id="11" name="Picture 10" descr="Logo&#10;&#10;Description automatically generated">
               <a:extLst>
                 <a:ext uri="{FF2B5EF4-FFF2-40B4-BE49-F238E27FC236}">
-                  <a16:creationId xmlns="" xmlns:a16="http://schemas.microsoft.com/office/drawing/2014/main" id="{68CCA8DB-9EFC-F9BC-57AE-81E4F843E863}"/>
+                  <a16:creationId xmlns:a16="http://schemas.microsoft.com/office/drawing/2014/main" xmlns="" id="{68CCA8DB-9EFC-F9BC-57AE-81E4F843E863}"/>
                 </a:ext>
               </a:extLst>
             </p:cNvPr>
@@ -28276,7 +28057,7 @@
             <p:cNvPr id="13" name="Picture 12" descr="Logo&#10;&#10;Description automatically generated">
               <a:extLst>
                 <a:ext uri="{FF2B5EF4-FFF2-40B4-BE49-F238E27FC236}">
-                  <a16:creationId xmlns="" xmlns:a16="http://schemas.microsoft.com/office/drawing/2014/main" id="{3FDF9297-50FA-E866-B6CE-9D64B1E892BF}"/>
+                  <a16:creationId xmlns:a16="http://schemas.microsoft.com/office/drawing/2014/main" xmlns="" id="{3FDF9297-50FA-E866-B6CE-9D64B1E892BF}"/>
                 </a:ext>
               </a:extLst>
             </p:cNvPr>
@@ -28306,7 +28087,7 @@
             <p:cNvPr id="18" name="Graphic 17">
               <a:extLst>
                 <a:ext uri="{FF2B5EF4-FFF2-40B4-BE49-F238E27FC236}">
-                  <a16:creationId xmlns="" xmlns:a16="http://schemas.microsoft.com/office/drawing/2014/main" id="{2A1BC0C9-7A7B-9C5B-B457-3E86E59EF29E}"/>
+                  <a16:creationId xmlns:a16="http://schemas.microsoft.com/office/drawing/2014/main" xmlns="" id="{2A1BC0C9-7A7B-9C5B-B457-3E86E59EF29E}"/>
                 </a:ext>
               </a:extLst>
             </p:cNvPr>
@@ -28319,7 +28100,7 @@
             <a:blip r:embed="rId7" cstate="print">
               <a:extLst>
                 <a:ext uri="{96DAC541-7B7A-43D3-8B79-37D633B846F1}">
-                  <asvg:svgBlip xmlns="" xmlns:asvg="http://schemas.microsoft.com/office/drawing/2016/SVG/main" r:embed="rId8"/>
+                  <asvg:svgBlip xmlns:asvg="http://schemas.microsoft.com/office/drawing/2016/SVG/main" xmlns="" r:embed="rId8"/>
                 </a:ext>
               </a:extLst>
             </a:blip>
@@ -28342,7 +28123,7 @@
             <p:cNvPr id="20" name="Graphic 19">
               <a:extLst>
                 <a:ext uri="{FF2B5EF4-FFF2-40B4-BE49-F238E27FC236}">
-                  <a16:creationId xmlns="" xmlns:a16="http://schemas.microsoft.com/office/drawing/2014/main" id="{DBE174DA-A182-7E57-06D4-86AFA26D484D}"/>
+                  <a16:creationId xmlns:a16="http://schemas.microsoft.com/office/drawing/2014/main" xmlns="" id="{DBE174DA-A182-7E57-06D4-86AFA26D484D}"/>
                 </a:ext>
               </a:extLst>
             </p:cNvPr>
@@ -28355,7 +28136,7 @@
             <a:blip r:embed="rId9" cstate="print">
               <a:extLst>
                 <a:ext uri="{96DAC541-7B7A-43D3-8B79-37D633B846F1}">
-                  <asvg:svgBlip xmlns="" xmlns:asvg="http://schemas.microsoft.com/office/drawing/2016/SVG/main" r:embed="rId10"/>
+                  <asvg:svgBlip xmlns:asvg="http://schemas.microsoft.com/office/drawing/2016/SVG/main" xmlns="" r:embed="rId10"/>
                 </a:ext>
               </a:extLst>
             </a:blip>
@@ -28378,7 +28159,7 @@
             <p:cNvPr id="22" name="Picture 21" descr="Logo&#10;&#10;Description automatically generated">
               <a:extLst>
                 <a:ext uri="{FF2B5EF4-FFF2-40B4-BE49-F238E27FC236}">
-                  <a16:creationId xmlns="" xmlns:a16="http://schemas.microsoft.com/office/drawing/2014/main" id="{9B7FFC36-A4BC-7A53-AB82-82C398A47538}"/>
+                  <a16:creationId xmlns:a16="http://schemas.microsoft.com/office/drawing/2014/main" xmlns="" id="{9B7FFC36-A4BC-7A53-AB82-82C398A47538}"/>
                 </a:ext>
               </a:extLst>
             </p:cNvPr>
@@ -28408,7 +28189,7 @@
             <p:cNvPr id="36" name="Group 35">
               <a:extLst>
                 <a:ext uri="{FF2B5EF4-FFF2-40B4-BE49-F238E27FC236}">
-                  <a16:creationId xmlns="" xmlns:a16="http://schemas.microsoft.com/office/drawing/2014/main" id="{3FB2AEAC-BDEE-9D5F-67A3-17CEDA699052}"/>
+                  <a16:creationId xmlns:a16="http://schemas.microsoft.com/office/drawing/2014/main" xmlns="" id="{3FB2AEAC-BDEE-9D5F-67A3-17CEDA699052}"/>
                 </a:ext>
               </a:extLst>
             </p:cNvPr>
@@ -28428,7 +28209,7 @@
               <p:cNvPr id="31" name="Straight Connector 30">
                 <a:extLst>
                   <a:ext uri="{FF2B5EF4-FFF2-40B4-BE49-F238E27FC236}">
-                    <a16:creationId xmlns="" xmlns:a16="http://schemas.microsoft.com/office/drawing/2014/main" id="{AA38ABD5-1637-DC80-A922-DF10E4F75CDE}"/>
+                    <a16:creationId xmlns:a16="http://schemas.microsoft.com/office/drawing/2014/main" xmlns="" id="{AA38ABD5-1637-DC80-A922-DF10E4F75CDE}"/>
                   </a:ext>
                 </a:extLst>
               </p:cNvPr>
@@ -28471,7 +28252,7 @@
               <p:cNvPr id="33" name="Picture 32">
                 <a:extLst>
                   <a:ext uri="{FF2B5EF4-FFF2-40B4-BE49-F238E27FC236}">
-                    <a16:creationId xmlns="" xmlns:a16="http://schemas.microsoft.com/office/drawing/2014/main" id="{617B586A-0BC5-5E32-7E67-FD277547ED69}"/>
+                    <a16:creationId xmlns:a16="http://schemas.microsoft.com/office/drawing/2014/main" xmlns="" id="{617B586A-0BC5-5E32-7E67-FD277547ED69}"/>
                   </a:ext>
                 </a:extLst>
               </p:cNvPr>
@@ -28503,7 +28284,7 @@
           <p:cNvPr id="40" name="Picture 39" descr="Logo&#10;&#10;Description automatically generated">
             <a:extLst>
               <a:ext uri="{FF2B5EF4-FFF2-40B4-BE49-F238E27FC236}">
-                <a16:creationId xmlns="" xmlns:a16="http://schemas.microsoft.com/office/drawing/2014/main" id="{9C30DD70-D438-6D27-35D3-8BB874966D84}"/>
+                <a16:creationId xmlns:a16="http://schemas.microsoft.com/office/drawing/2014/main" xmlns="" id="{9C30DD70-D438-6D27-35D3-8BB874966D84}"/>
               </a:ext>
             </a:extLst>
           </p:cNvPr>
@@ -28533,7 +28314,7 @@
           <p:cNvPr id="2" name="Google Shape;441;p37">
             <a:extLst>
               <a:ext uri="{FF2B5EF4-FFF2-40B4-BE49-F238E27FC236}">
-                <a16:creationId xmlns="" xmlns:a16="http://schemas.microsoft.com/office/drawing/2014/main" id="{2AFB472C-93C2-241B-75FA-457782840F92}"/>
+                <a16:creationId xmlns:a16="http://schemas.microsoft.com/office/drawing/2014/main" xmlns="" id="{2AFB472C-93C2-241B-75FA-457782840F92}"/>
               </a:ext>
             </a:extLst>
           </p:cNvPr>
@@ -28838,7 +28619,7 @@
           <p:cNvPr id="14" name="Картина 13">
             <a:extLst>
               <a:ext uri="{FF2B5EF4-FFF2-40B4-BE49-F238E27FC236}">
-                <a16:creationId xmlns="" xmlns:a16="http://schemas.microsoft.com/office/drawing/2014/main" id="{54B365E9-8FD0-6D5B-2DFC-723EE5DDD555}"/>
+                <a16:creationId xmlns:a16="http://schemas.microsoft.com/office/drawing/2014/main" xmlns="" id="{54B365E9-8FD0-6D5B-2DFC-723EE5DDD555}"/>
               </a:ext>
             </a:extLst>
           </p:cNvPr>
@@ -28868,7 +28649,7 @@
           <p:cNvPr id="16" name="Картина 15">
             <a:extLst>
               <a:ext uri="{FF2B5EF4-FFF2-40B4-BE49-F238E27FC236}">
-                <a16:creationId xmlns="" xmlns:a16="http://schemas.microsoft.com/office/drawing/2014/main" id="{3BD6ABFC-02BF-2D42-B42B-6929222F37B6}"/>
+                <a16:creationId xmlns:a16="http://schemas.microsoft.com/office/drawing/2014/main" xmlns="" id="{3BD6ABFC-02BF-2D42-B42B-6929222F37B6}"/>
               </a:ext>
             </a:extLst>
           </p:cNvPr>
@@ -28896,7 +28677,7 @@
     </p:spTree>
     <p:extLst>
       <p:ext uri="{BB962C8B-B14F-4D97-AF65-F5344CB8AC3E}">
-        <p14:creationId xmlns="" xmlns:p14="http://schemas.microsoft.com/office/powerpoint/2010/main" val="2144060659"/>
+        <p14:creationId xmlns:p14="http://schemas.microsoft.com/office/powerpoint/2010/main" xmlns="" val="2144060659"/>
       </p:ext>
     </p:extLst>
   </p:cSld>
@@ -28935,7 +28716,7 @@
           <p:cNvPr id="5" name="Slide Number">
             <a:extLst>
               <a:ext uri="{FF2B5EF4-FFF2-40B4-BE49-F238E27FC236}">
-                <a16:creationId xmlns="" xmlns:a16="http://schemas.microsoft.com/office/drawing/2014/main" id="{F48C3C93-90A1-4D31-BEA6-B54D1106CE31}"/>
+                <a16:creationId xmlns:a16="http://schemas.microsoft.com/office/drawing/2014/main" xmlns="" id="{F48C3C93-90A1-4D31-BEA6-B54D1106CE31}"/>
               </a:ext>
             </a:extLst>
           </p:cNvPr>
@@ -28977,7 +28758,7 @@
           <p:cNvPr id="2" name="Slide Body">
             <a:extLst>
               <a:ext uri="{FF2B5EF4-FFF2-40B4-BE49-F238E27FC236}">
-                <a16:creationId xmlns="" xmlns:a16="http://schemas.microsoft.com/office/drawing/2014/main" id="{980F49B1-E4BE-4389-A747-7AB9B71AD920}"/>
+                <a16:creationId xmlns:a16="http://schemas.microsoft.com/office/drawing/2014/main" xmlns="" id="{980F49B1-E4BE-4389-A747-7AB9B71AD920}"/>
               </a:ext>
             </a:extLst>
           </p:cNvPr>
@@ -29111,7 +28892,7 @@
           <p:cNvPr id="6" name="Picture License" descr="License">
             <a:extLst>
               <a:ext uri="{FF2B5EF4-FFF2-40B4-BE49-F238E27FC236}">
-                <a16:creationId xmlns="" xmlns:a16="http://schemas.microsoft.com/office/drawing/2014/main" id="{A10A2585-858C-4B1E-8846-27CF1C15729E}"/>
+                <a16:creationId xmlns:a16="http://schemas.microsoft.com/office/drawing/2014/main" xmlns="" id="{A10A2585-858C-4B1E-8846-27CF1C15729E}"/>
               </a:ext>
             </a:extLst>
           </p:cNvPr>
@@ -29152,7 +28933,7 @@
           <p:cNvPr id="3" name="Slide Title">
             <a:extLst>
               <a:ext uri="{FF2B5EF4-FFF2-40B4-BE49-F238E27FC236}">
-                <a16:creationId xmlns="" xmlns:a16="http://schemas.microsoft.com/office/drawing/2014/main" id="{E5F1FB41-80C3-4816-BC47-CCC50632E6E8}"/>
+                <a16:creationId xmlns:a16="http://schemas.microsoft.com/office/drawing/2014/main" xmlns="" id="{E5F1FB41-80C3-4816-BC47-CCC50632E6E8}"/>
               </a:ext>
             </a:extLst>
           </p:cNvPr>
@@ -29178,7 +28959,7 @@
     </p:spTree>
     <p:extLst>
       <p:ext uri="{BB962C8B-B14F-4D97-AF65-F5344CB8AC3E}">
-        <p14:creationId xmlns="" xmlns:p14="http://schemas.microsoft.com/office/powerpoint/2010/main" val="3506533871"/>
+        <p14:creationId xmlns:p14="http://schemas.microsoft.com/office/powerpoint/2010/main" xmlns="" val="3506533871"/>
       </p:ext>
     </p:extLst>
   </p:cSld>
@@ -29186,7 +28967,7 @@
     <a:masterClrMapping/>
   </p:clrMapOvr>
   <mc:AlternateContent xmlns:mc="http://schemas.openxmlformats.org/markup-compatibility/2006">
-    <mc:Choice xmlns="" xmlns:p14="http://schemas.microsoft.com/office/powerpoint/2010/main" Requires="p14">
+    <mc:Choice xmlns:p14="http://schemas.microsoft.com/office/powerpoint/2010/main" xmlns="" Requires="p14">
       <p:transition spd="slow" p14:dur="2000" advClick="0" advTm="5000"/>
     </mc:Choice>
     <mc:Fallback>
@@ -29298,7 +29079,7 @@
     <a:masterClrMapping/>
   </p:clrMapOvr>
   <mc:AlternateContent xmlns:mc="http://schemas.openxmlformats.org/markup-compatibility/2006">
-    <mc:Choice xmlns="" xmlns:p14="http://schemas.microsoft.com/office/powerpoint/2010/main" Requires="p14">
+    <mc:Choice xmlns:p14="http://schemas.microsoft.com/office/powerpoint/2010/main" xmlns="" Requires="p14">
       <p:transition spd="slow" p14:dur="2000" advClick="0" advTm="5000"/>
     </mc:Choice>
     <mc:Fallback>
@@ -29494,7 +29275,7 @@
     <a:masterClrMapping/>
   </p:clrMapOvr>
   <mc:AlternateContent xmlns:mc="http://schemas.openxmlformats.org/markup-compatibility/2006">
-    <mc:Choice xmlns="" xmlns:p14="http://schemas.microsoft.com/office/powerpoint/2010/main" Requires="p14">
+    <mc:Choice xmlns:p14="http://schemas.microsoft.com/office/powerpoint/2010/main" xmlns="" Requires="p14">
       <p:transition spd="slow" p14:dur="2000" advClick="0" advTm="5000"/>
     </mc:Choice>
     <mc:Fallback>
@@ -29823,7 +29604,7 @@
     <a:masterClrMapping/>
   </p:clrMapOvr>
   <mc:AlternateContent xmlns:mc="http://schemas.openxmlformats.org/markup-compatibility/2006">
-    <mc:Choice xmlns="" xmlns:p14="http://schemas.microsoft.com/office/powerpoint/2010/main" Requires="p14">
+    <mc:Choice xmlns:p14="http://schemas.microsoft.com/office/powerpoint/2010/main" xmlns="" Requires="p14">
       <p:transition spd="slow" p14:dur="2000" advClick="0" advTm="5000"/>
     </mc:Choice>
     <mc:Fallback>
@@ -30334,7 +30115,7 @@
           <p:cNvPr id="8" name="AutoShape 5">
             <a:extLst>
               <a:ext uri="{FF2B5EF4-FFF2-40B4-BE49-F238E27FC236}">
-                <a16:creationId xmlns:a16="http://schemas.microsoft.com/office/drawing/2014/main" xmlns="" id="{F571EDF2-BA8D-4C84-8360-12467530B87E}"/>
+                <a16:creationId xmlns="" xmlns:a16="http://schemas.microsoft.com/office/drawing/2014/main" id="{F571EDF2-BA8D-4C84-8360-12467530B87E}"/>
               </a:ext>
             </a:extLst>
           </p:cNvPr>
@@ -30480,7 +30261,7 @@
           <p:cNvPr id="9" name="AutoShape 5">
             <a:extLst>
               <a:ext uri="{FF2B5EF4-FFF2-40B4-BE49-F238E27FC236}">
-                <a16:creationId xmlns:a16="http://schemas.microsoft.com/office/drawing/2014/main" xmlns="" id="{F571EDF2-BA8D-4C84-8360-12467530B87E}"/>
+                <a16:creationId xmlns="" xmlns:a16="http://schemas.microsoft.com/office/drawing/2014/main" id="{F571EDF2-BA8D-4C84-8360-12467530B87E}"/>
               </a:ext>
             </a:extLst>
           </p:cNvPr>
@@ -30570,7 +30351,7 @@
     <a:masterClrMapping/>
   </p:clrMapOvr>
   <mc:AlternateContent xmlns:mc="http://schemas.openxmlformats.org/markup-compatibility/2006">
-    <mc:Choice xmlns="" xmlns:p14="http://schemas.microsoft.com/office/powerpoint/2010/main" Requires="p14">
+    <mc:Choice xmlns:p14="http://schemas.microsoft.com/office/powerpoint/2010/main" xmlns="" Requires="p14">
       <p:transition spd="slow" p14:dur="2000" advClick="0" advTm="5000"/>
     </mc:Choice>
     <mc:Fallback>
@@ -30849,7 +30630,7 @@
           <p:nvPr>
             <p:extLst>
               <p:ext uri="{D42A27DB-BD31-4B8C-83A1-F6EECF244321}">
-                <p14:modId xmlns:p14="http://schemas.microsoft.com/office/powerpoint/2010/main" xmlns="" val="1102571627"/>
+                <p14:modId xmlns="" xmlns:p14="http://schemas.microsoft.com/office/powerpoint/2010/main" val="1102571627"/>
               </p:ext>
             </p:extLst>
           </p:nvPr>
@@ -30868,21 +30649,21 @@
                 <a:gridCol w="1559860">
                   <a:extLst>
                     <a:ext uri="{9D8B030D-6E8A-4147-A177-3AD203B41FA5}">
-                      <a16:colId xmlns:a16="http://schemas.microsoft.com/office/drawing/2014/main" xmlns="" val="20000"/>
+                      <a16:colId xmlns="" xmlns:a16="http://schemas.microsoft.com/office/drawing/2014/main" val="20000"/>
                     </a:ext>
                   </a:extLst>
                 </a:gridCol>
                 <a:gridCol w="1792940">
                   <a:extLst>
                     <a:ext uri="{9D8B030D-6E8A-4147-A177-3AD203B41FA5}">
-                      <a16:colId xmlns:a16="http://schemas.microsoft.com/office/drawing/2014/main" xmlns="" val="20001"/>
+                      <a16:colId xmlns="" xmlns:a16="http://schemas.microsoft.com/office/drawing/2014/main" val="20001"/>
                     </a:ext>
                   </a:extLst>
                 </a:gridCol>
                 <a:gridCol w="1950721">
                   <a:extLst>
                     <a:ext uri="{9D8B030D-6E8A-4147-A177-3AD203B41FA5}">
-                      <a16:colId xmlns:a16="http://schemas.microsoft.com/office/drawing/2014/main" xmlns="" val="20002"/>
+                      <a16:colId xmlns="" xmlns:a16="http://schemas.microsoft.com/office/drawing/2014/main" val="20002"/>
                     </a:ext>
                   </a:extLst>
                 </a:gridCol>
@@ -31421,7 +31202,7 @@
                 </a:tc>
                 <a:extLst>
                   <a:ext uri="{0D108BD9-81ED-4DB2-BD59-A6C34878D82A}">
-                    <a16:rowId xmlns:a16="http://schemas.microsoft.com/office/drawing/2014/main" xmlns="" val="10001"/>
+                    <a16:rowId xmlns="" xmlns:a16="http://schemas.microsoft.com/office/drawing/2014/main" val="10001"/>
                   </a:ext>
                 </a:extLst>
               </a:tr>
@@ -31667,7 +31448,7 @@
                 </a:tc>
                 <a:extLst>
                   <a:ext uri="{0D108BD9-81ED-4DB2-BD59-A6C34878D82A}">
-                    <a16:rowId xmlns:a16="http://schemas.microsoft.com/office/drawing/2014/main" xmlns="" val="10002"/>
+                    <a16:rowId xmlns="" xmlns:a16="http://schemas.microsoft.com/office/drawing/2014/main" val="10002"/>
                   </a:ext>
                 </a:extLst>
               </a:tr>
@@ -32426,7 +32207,7 @@
     <a:masterClrMapping/>
   </p:clrMapOvr>
   <mc:AlternateContent xmlns:mc="http://schemas.openxmlformats.org/markup-compatibility/2006">
-    <mc:Choice xmlns="" xmlns:p14="http://schemas.microsoft.com/office/powerpoint/2010/main" Requires="p14">
+    <mc:Choice xmlns:p14="http://schemas.microsoft.com/office/powerpoint/2010/main" xmlns="" Requires="p14">
       <p:transition spd="slow" p14:dur="2000" advClick="0" advTm="5000"/>
     </mc:Choice>
     <mc:Fallback>
@@ -32486,7 +32267,7 @@
             <a:blip r:embed="rId3" cstate="print">
               <a:extLst>
                 <a:ext uri="{28A0092B-C50C-407E-A947-70E740481C1C}">
-                  <a14:useLocalDpi xmlns:a14="http://schemas.microsoft.com/office/drawing/2010/main" xmlns="" val="0"/>
+                  <a14:useLocalDpi xmlns="" xmlns:a14="http://schemas.microsoft.com/office/drawing/2010/main" val="0"/>
                 </a:ext>
               </a:extLst>
             </a:blip>
@@ -32516,7 +32297,7 @@
             <a:blip r:embed="rId4" cstate="print">
               <a:extLst>
                 <a:ext uri="{BEBA8EAE-BF5A-486C-A8C5-ECC9F3942E4B}">
-                  <a14:imgProps xmlns:a14="http://schemas.microsoft.com/office/drawing/2010/main" xmlns="">
+                  <a14:imgProps xmlns="" xmlns:a14="http://schemas.microsoft.com/office/drawing/2010/main">
                     <a14:imgLayer r:embed="rId5">
                       <a14:imgEffect>
                         <a14:brightnessContrast bright="13000"/>
@@ -32525,7 +32306,7 @@
                   </a14:imgProps>
                 </a:ext>
                 <a:ext uri="{28A0092B-C50C-407E-A947-70E740481C1C}">
-                  <a14:useLocalDpi xmlns:a14="http://schemas.microsoft.com/office/drawing/2010/main" xmlns="" val="0"/>
+                  <a14:useLocalDpi xmlns="" xmlns:a14="http://schemas.microsoft.com/office/drawing/2010/main" val="0"/>
                 </a:ext>
               </a:extLst>
             </a:blip>
@@ -32555,7 +32336,7 @@
             <a:blip r:embed="rId6" cstate="print">
               <a:extLst>
                 <a:ext uri="{BEBA8EAE-BF5A-486C-A8C5-ECC9F3942E4B}">
-                  <a14:imgProps xmlns:a14="http://schemas.microsoft.com/office/drawing/2010/main" xmlns="">
+                  <a14:imgProps xmlns="" xmlns:a14="http://schemas.microsoft.com/office/drawing/2010/main">
                     <a14:imgLayer r:embed="rId7">
                       <a14:imgEffect>
                         <a14:brightnessContrast bright="37000"/>
@@ -32564,7 +32345,7 @@
                   </a14:imgProps>
                 </a:ext>
                 <a:ext uri="{28A0092B-C50C-407E-A947-70E740481C1C}">
-                  <a14:useLocalDpi xmlns:a14="http://schemas.microsoft.com/office/drawing/2010/main" xmlns="" val="0"/>
+                  <a14:useLocalDpi xmlns="" xmlns:a14="http://schemas.microsoft.com/office/drawing/2010/main" val="0"/>
                 </a:ext>
               </a:extLst>
             </a:blip>
@@ -32588,7 +32369,7 @@
           <p:cNvPr id="4" name="Title 3">
             <a:extLst>
               <a:ext uri="{FF2B5EF4-FFF2-40B4-BE49-F238E27FC236}">
-                <a16:creationId xmlns:a16="http://schemas.microsoft.com/office/drawing/2014/main" xmlns="" id="{84B15084-1EDB-45FA-849F-A9E6D1C9F87D}"/>
+                <a16:creationId xmlns="" xmlns:a16="http://schemas.microsoft.com/office/drawing/2014/main" id="{84B15084-1EDB-45FA-849F-A9E6D1C9F87D}"/>
               </a:ext>
             </a:extLst>
           </p:cNvPr>
@@ -32617,7 +32398,7 @@
           <p:cNvPr id="7" name="Subtitle 6">
             <a:extLst>
               <a:ext uri="{FF2B5EF4-FFF2-40B4-BE49-F238E27FC236}">
-                <a16:creationId xmlns:a16="http://schemas.microsoft.com/office/drawing/2014/main" xmlns="" id="{B164C44A-7219-435E-914F-0B59FC8DBFCA}"/>
+                <a16:creationId xmlns="" xmlns:a16="http://schemas.microsoft.com/office/drawing/2014/main" id="{B164C44A-7219-435E-914F-0B59FC8DBFCA}"/>
               </a:ext>
             </a:extLst>
           </p:cNvPr>
@@ -32644,7 +32425,7 @@
     </p:spTree>
     <p:extLst>
       <p:ext uri="{BB962C8B-B14F-4D97-AF65-F5344CB8AC3E}">
-        <p14:creationId xmlns:p14="http://schemas.microsoft.com/office/powerpoint/2010/main" xmlns="" val="969028049"/>
+        <p14:creationId xmlns="" xmlns:p14="http://schemas.microsoft.com/office/powerpoint/2010/main" val="969028049"/>
       </p:ext>
     </p:extLst>
   </p:cSld>
@@ -32652,7 +32433,7 @@
     <a:masterClrMapping/>
   </p:clrMapOvr>
   <mc:AlternateContent xmlns:mc="http://schemas.openxmlformats.org/markup-compatibility/2006">
-    <mc:Choice xmlns:p14="http://schemas.microsoft.com/office/powerpoint/2010/main" xmlns="" Requires="p14">
+    <mc:Choice xmlns="" xmlns:p14="http://schemas.microsoft.com/office/powerpoint/2010/main" Requires="p14">
       <p:transition spd="slow" p14:dur="2000" advClick="0" advTm="5000"/>
     </mc:Choice>
     <mc:Fallback>
@@ -32691,7 +32472,7 @@
           <p:cNvPr id="9" name="Content Placeholder 8">
             <a:extLst>
               <a:ext uri="{FF2B5EF4-FFF2-40B4-BE49-F238E27FC236}">
-                <a16:creationId xmlns:a16="http://schemas.microsoft.com/office/drawing/2014/main" xmlns="" id="{174334DD-7BAB-4A22-AE78-E4D6B4A60AD0}"/>
+                <a16:creationId xmlns="" xmlns:a16="http://schemas.microsoft.com/office/drawing/2014/main" id="{174334DD-7BAB-4A22-AE78-E4D6B4A60AD0}"/>
               </a:ext>
             </a:extLst>
           </p:cNvPr>
@@ -32765,14 +32546,14 @@
                 <a:gridCol w="1704814">
                   <a:extLst>
                     <a:ext uri="{9D8B030D-6E8A-4147-A177-3AD203B41FA5}">
-                      <a16:colId xmlns:a16="http://schemas.microsoft.com/office/drawing/2014/main" xmlns="" val="1594468805"/>
+                      <a16:colId xmlns="" xmlns:a16="http://schemas.microsoft.com/office/drawing/2014/main" val="1594468805"/>
                     </a:ext>
                   </a:extLst>
                 </a:gridCol>
                 <a:gridCol w="2486186">
                   <a:extLst>
                     <a:ext uri="{9D8B030D-6E8A-4147-A177-3AD203B41FA5}">
-                      <a16:colId xmlns:a16="http://schemas.microsoft.com/office/drawing/2014/main" xmlns="" val="683614382"/>
+                      <a16:colId xmlns="" xmlns:a16="http://schemas.microsoft.com/office/drawing/2014/main" val="683614382"/>
                     </a:ext>
                   </a:extLst>
                 </a:gridCol>
@@ -32835,7 +32616,7 @@
                 </a:tc>
                 <a:extLst>
                   <a:ext uri="{0D108BD9-81ED-4DB2-BD59-A6C34878D82A}">
-                    <a16:rowId xmlns:a16="http://schemas.microsoft.com/office/drawing/2014/main" xmlns="" val="1969825376"/>
+                    <a16:rowId xmlns="" xmlns:a16="http://schemas.microsoft.com/office/drawing/2014/main" val="1969825376"/>
                   </a:ext>
                 </a:extLst>
               </a:tr>
@@ -32884,7 +32665,7 @@
                 </a:tc>
                 <a:extLst>
                   <a:ext uri="{0D108BD9-81ED-4DB2-BD59-A6C34878D82A}">
-                    <a16:rowId xmlns:a16="http://schemas.microsoft.com/office/drawing/2014/main" xmlns="" val="2845318136"/>
+                    <a16:rowId xmlns="" xmlns:a16="http://schemas.microsoft.com/office/drawing/2014/main" val="2845318136"/>
                   </a:ext>
                 </a:extLst>
               </a:tr>
@@ -32933,7 +32714,7 @@
                 </a:tc>
                 <a:extLst>
                   <a:ext uri="{0D108BD9-81ED-4DB2-BD59-A6C34878D82A}">
-                    <a16:rowId xmlns:a16="http://schemas.microsoft.com/office/drawing/2014/main" xmlns="" val="2968156586"/>
+                    <a16:rowId xmlns="" xmlns:a16="http://schemas.microsoft.com/office/drawing/2014/main" val="2968156586"/>
                   </a:ext>
                 </a:extLst>
               </a:tr>
@@ -32982,7 +32763,7 @@
                 </a:tc>
                 <a:extLst>
                   <a:ext uri="{0D108BD9-81ED-4DB2-BD59-A6C34878D82A}">
-                    <a16:rowId xmlns:a16="http://schemas.microsoft.com/office/drawing/2014/main" xmlns="" val="1476753229"/>
+                    <a16:rowId xmlns="" xmlns:a16="http://schemas.microsoft.com/office/drawing/2014/main" val="1476753229"/>
                   </a:ext>
                 </a:extLst>
               </a:tr>
@@ -33041,14 +32822,14 @@
                 <a:gridCol w="2590800">
                   <a:extLst>
                     <a:ext uri="{9D8B030D-6E8A-4147-A177-3AD203B41FA5}">
-                      <a16:colId xmlns:a16="http://schemas.microsoft.com/office/drawing/2014/main" xmlns="" val="1594468805"/>
+                      <a16:colId xmlns="" xmlns:a16="http://schemas.microsoft.com/office/drawing/2014/main" val="1594468805"/>
                     </a:ext>
                   </a:extLst>
                 </a:gridCol>
                 <a:gridCol w="1600200">
                   <a:extLst>
                     <a:ext uri="{9D8B030D-6E8A-4147-A177-3AD203B41FA5}">
-                      <a16:colId xmlns:a16="http://schemas.microsoft.com/office/drawing/2014/main" xmlns="" val="683614382"/>
+                      <a16:colId xmlns="" xmlns:a16="http://schemas.microsoft.com/office/drawing/2014/main" val="683614382"/>
                     </a:ext>
                   </a:extLst>
                 </a:gridCol>
@@ -33094,7 +32875,7 @@
                 </a:tc>
                 <a:extLst>
                   <a:ext uri="{0D108BD9-81ED-4DB2-BD59-A6C34878D82A}">
-                    <a16:rowId xmlns:a16="http://schemas.microsoft.com/office/drawing/2014/main" xmlns="" val="1969825376"/>
+                    <a16:rowId xmlns="" xmlns:a16="http://schemas.microsoft.com/office/drawing/2014/main" val="1969825376"/>
                   </a:ext>
                 </a:extLst>
               </a:tr>
@@ -33143,7 +32924,7 @@
                 </a:tc>
                 <a:extLst>
                   <a:ext uri="{0D108BD9-81ED-4DB2-BD59-A6C34878D82A}">
-                    <a16:rowId xmlns:a16="http://schemas.microsoft.com/office/drawing/2014/main" xmlns="" val="2845318136"/>
+                    <a16:rowId xmlns="" xmlns:a16="http://schemas.microsoft.com/office/drawing/2014/main" val="2845318136"/>
                   </a:ext>
                 </a:extLst>
               </a:tr>
@@ -33524,7 +33305,7 @@
           <p:cNvPr id="17" name="Slide Number">
             <a:extLst>
               <a:ext uri="{FF2B5EF4-FFF2-40B4-BE49-F238E27FC236}">
-                <a16:creationId xmlns:a16="http://schemas.microsoft.com/office/drawing/2014/main" xmlns="" id="{8557AFEC-E42F-4557-92F7-7DA53E20272D}"/>
+                <a16:creationId xmlns="" xmlns:a16="http://schemas.microsoft.com/office/drawing/2014/main" id="{8557AFEC-E42F-4557-92F7-7DA53E20272D}"/>
               </a:ext>
             </a:extLst>
           </p:cNvPr>
@@ -33652,7 +33433,7 @@
     </p:spTree>
     <p:extLst>
       <p:ext uri="{BB962C8B-B14F-4D97-AF65-F5344CB8AC3E}">
-        <p14:creationId xmlns:p14="http://schemas.microsoft.com/office/powerpoint/2010/main" xmlns="" val="826980726"/>
+        <p14:creationId xmlns="" xmlns:p14="http://schemas.microsoft.com/office/powerpoint/2010/main" val="826980726"/>
       </p:ext>
     </p:extLst>
   </p:cSld>
@@ -33660,7 +33441,7 @@
     <a:masterClrMapping/>
   </p:clrMapOvr>
   <mc:AlternateContent xmlns:mc="http://schemas.openxmlformats.org/markup-compatibility/2006">
-    <mc:Choice xmlns:p14="http://schemas.microsoft.com/office/powerpoint/2010/main" xmlns="" Requires="p14">
+    <mc:Choice xmlns="" xmlns:p14="http://schemas.microsoft.com/office/powerpoint/2010/main" Requires="p14">
       <p:transition spd="slow" p14:dur="2000" advClick="0" advTm="5000"/>
     </mc:Choice>
     <mc:Fallback>
@@ -34239,7 +34020,7 @@
   <a:extraClrSchemeLst/>
   <a:extLst>
     <a:ext uri="{05A4C25C-085E-4340-85A3-A5531E510DB2}">
-      <thm15:themeFamily xmlns="" xmlns:thm15="http://schemas.microsoft.com/office/thememl/2012/main" name="SoftUni" id="{D61FAD9B-6E74-4E03-BFE4-B363D484F1DA}" vid="{7089C1A3-635B-4B03-A017-DAF10A3A396B}"/>
+      <thm15:themeFamily xmlns:thm15="http://schemas.microsoft.com/office/thememl/2012/main" xmlns="" name="SoftUni" id="{D61FAD9B-6E74-4E03-BFE4-B363D484F1DA}" vid="{7089C1A3-635B-4B03-A017-DAF10A3A396B}"/>
     </a:ext>
   </a:extLst>
 </a:theme>
@@ -34534,7 +34315,7 @@
   <a:extraClrSchemeLst/>
   <a:extLst>
     <a:ext uri="{05A4C25C-085E-4340-85A3-A5531E510DB2}">
-      <thm15:themeFamily xmlns="" xmlns:thm15="http://schemas.microsoft.com/office/thememl/2012/main" name="Office Theme" id="{62F939B6-93AF-4DB8-9C6B-D6C7DFDC589F}" vid="{4A3C46E8-61CC-4603-A589-7422A47A8E4A}"/>
+      <thm15:themeFamily xmlns:thm15="http://schemas.microsoft.com/office/thememl/2012/main" xmlns="" name="Office Theme" id="{62F939B6-93AF-4DB8-9C6B-D6C7DFDC589F}" vid="{4A3C46E8-61CC-4603-A589-7422A47A8E4A}"/>
     </a:ext>
   </a:extLst>
 </a:theme>
@@ -34829,19 +34610,16 @@
   <a:extraClrSchemeLst/>
   <a:extLst>
     <a:ext uri="{05A4C25C-085E-4340-85A3-A5531E510DB2}">
-      <thm15:themeFamily xmlns="" xmlns:thm15="http://schemas.microsoft.com/office/thememl/2012/main" name="Office Theme" id="{62F939B6-93AF-4DB8-9C6B-D6C7DFDC589F}" vid="{4A3C46E8-61CC-4603-A589-7422A47A8E4A}"/>
+      <thm15:themeFamily xmlns:thm15="http://schemas.microsoft.com/office/thememl/2012/main" xmlns="" name="Office Theme" id="{62F939B6-93AF-4DB8-9C6B-D6C7DFDC589F}" vid="{4A3C46E8-61CC-4603-A589-7422A47A8E4A}"/>
     </a:ext>
   </a:extLst>
 </a:theme>
 </file>
 
 <file path=customXml/item1.xml><?xml version="1.0" encoding="utf-8"?>
-<?mso-contentType ?>
-<FormTemplates xmlns="http://schemas.microsoft.com/sharepoint/v3/contenttype/forms">
-  <Display>DocumentLibraryForm</Display>
-  <Edit>DocumentLibraryForm</Edit>
-  <New>DocumentLibraryForm</New>
-</FormTemplates>
+<p:properties xmlns:p="http://schemas.microsoft.com/office/2006/metadata/properties" xmlns:xsi="http://www.w3.org/2001/XMLSchema-instance" xmlns:pc="http://schemas.microsoft.com/office/infopath/2007/PartnerControls">
+  <documentManagement/>
+</p:properties>
 </file>
 
 <file path=customXml/item2.xml><?xml version="1.0" encoding="utf-8"?>
@@ -35017,15 +34795,26 @@
 </file>
 
 <file path=customXml/item3.xml><?xml version="1.0" encoding="utf-8"?>
-<p:properties xmlns:p="http://schemas.microsoft.com/office/2006/metadata/properties" xmlns:xsi="http://www.w3.org/2001/XMLSchema-instance" xmlns:pc="http://schemas.microsoft.com/office/infopath/2007/PartnerControls">
-  <documentManagement/>
-</p:properties>
+<?mso-contentType ?>
+<FormTemplates xmlns="http://schemas.microsoft.com/sharepoint/v3/contenttype/forms">
+  <Display>DocumentLibraryForm</Display>
+  <Edit>DocumentLibraryForm</Edit>
+  <New>DocumentLibraryForm</New>
+</FormTemplates>
 </file>
 
 <file path=customXml/itemProps1.xml><?xml version="1.0" encoding="utf-8"?>
-<ds:datastoreItem xmlns:ds="http://schemas.openxmlformats.org/officeDocument/2006/customXml" ds:itemID="{68A20BEC-F81B-49CD-951D-E62C4BAE7796}">
+<ds:datastoreItem xmlns:ds="http://schemas.openxmlformats.org/officeDocument/2006/customXml" ds:itemID="{5E2F4A33-1866-4BB8-8A35-8D6BDFE8D9F5}">
   <ds:schemaRefs>
-    <ds:schemaRef ds:uri="http://schemas.microsoft.com/sharepoint/v3/contenttype/forms"/>
+    <ds:schemaRef ds:uri="http://schemas.microsoft.com/office/infopath/2007/PartnerControls"/>
+    <ds:schemaRef ds:uri="http://purl.org/dc/dcmitype/"/>
+    <ds:schemaRef ds:uri="http://schemas.microsoft.com/office/2006/documentManagement/types"/>
+    <ds:schemaRef ds:uri="http://schemas.microsoft.com/office/2006/metadata/properties"/>
+    <ds:schemaRef ds:uri="http://www.w3.org/XML/1998/namespace"/>
+    <ds:schemaRef ds:uri="4f985cec-e092-4bcf-a1e1-b816bd0221d8"/>
+    <ds:schemaRef ds:uri="http://schemas.openxmlformats.org/package/2006/metadata/core-properties"/>
+    <ds:schemaRef ds:uri="http://purl.org/dc/terms/"/>
+    <ds:schemaRef ds:uri="http://purl.org/dc/elements/1.1/"/>
   </ds:schemaRefs>
 </ds:datastoreItem>
 </file>
@@ -35049,17 +34838,9 @@
 </file>
 
 <file path=customXml/itemProps3.xml><?xml version="1.0" encoding="utf-8"?>
-<ds:datastoreItem xmlns:ds="http://schemas.openxmlformats.org/officeDocument/2006/customXml" ds:itemID="{5E2F4A33-1866-4BB8-8A35-8D6BDFE8D9F5}">
+<ds:datastoreItem xmlns:ds="http://schemas.openxmlformats.org/officeDocument/2006/customXml" ds:itemID="{68A20BEC-F81B-49CD-951D-E62C4BAE7796}">
   <ds:schemaRefs>
-    <ds:schemaRef ds:uri="http://schemas.microsoft.com/office/infopath/2007/PartnerControls"/>
-    <ds:schemaRef ds:uri="http://purl.org/dc/dcmitype/"/>
-    <ds:schemaRef ds:uri="http://schemas.microsoft.com/office/2006/documentManagement/types"/>
-    <ds:schemaRef ds:uri="http://schemas.microsoft.com/office/2006/metadata/properties"/>
-    <ds:schemaRef ds:uri="http://www.w3.org/XML/1998/namespace"/>
-    <ds:schemaRef ds:uri="4f985cec-e092-4bcf-a1e1-b816bd0221d8"/>
-    <ds:schemaRef ds:uri="http://schemas.openxmlformats.org/package/2006/metadata/core-properties"/>
-    <ds:schemaRef ds:uri="http://purl.org/dc/terms/"/>
-    <ds:schemaRef ds:uri="http://purl.org/dc/elements/1.1/"/>
+    <ds:schemaRef ds:uri="http://schemas.microsoft.com/sharepoint/v3/contenttype/forms"/>
   </ds:schemaRefs>
 </ds:datastoreItem>
 </file>
</xml_diff>